<commit_message>
add R code and F distribution tables
</commit_message>
<xml_diff>
--- a/Lecture 6- Correlation/Lecture 6.2 - Correlation.pptx
+++ b/Lecture 6- Correlation/Lecture 6.2 - Correlation.pptx
@@ -58,7 +58,7 @@
   <p:sldSz cx="9144000" cy="6858000" type="screen4x3"/>
   <p:notesSz cx="6858000" cy="9144000"/>
   <p:custDataLst>
-    <p:tags r:id="rId47"/>
+    <p:tags r:id="rId48"/>
   </p:custDataLst>
   <p:defaultTextStyle>
     <a:defPPr>
@@ -187,7 +187,7 @@
   </p:defaultTextStyle>
   <p:extLst>
     <p:ext uri="{EFAFB233-063F-42B5-8137-9DF3F51BA10A}">
-      <p15:sldGuideLst xmlns:p15="http://schemas.microsoft.com/office/powerpoint/2012/main">
+      <p15:sldGuideLst xmlns:p15="http://schemas.microsoft.com/office/powerpoint/2012/main" xmlns="">
         <p15:guide id="1" orient="horz" pos="2160">
           <p15:clr>
             <a:srgbClr val="A4A3A4"/>
@@ -596,7 +596,7 @@
             <a:tailEnd/>
           </a:ln>
           <a:extLst>
-            <a:ext uri="{909E8E84-426E-40DD-AFC4-6F175D3DCCD1}">
+            <a:ext uri="{909E8E84-426E-40dd-AFC4-6F175D3DCCD1}">
               <a14:hiddenFill xmlns:a14="http://schemas.microsoft.com/office/drawing/2010/main">
                 <a:solidFill>
                   <a:srgbClr val="FFFFFF"/>
@@ -944,14 +944,14 @@
           <a:noFill/>
           <a:ln/>
           <a:extLst>
-            <a:ext uri="{909E8E84-426E-40DD-AFC4-6F175D3DCCD1}">
+            <a:ext uri="{909E8E84-426E-40dd-AFC4-6F175D3DCCD1}">
               <a14:hiddenFill xmlns:a14="http://schemas.microsoft.com/office/drawing/2010/main">
                 <a:solidFill>
                   <a:srgbClr val="FFFFFF"/>
                 </a:solidFill>
               </a14:hiddenFill>
             </a:ext>
-            <a:ext uri="{91240B29-F687-4F45-9708-019B960494DF}">
+            <a:ext uri="{91240B29-F687-4f45-9708-019B960494DF}">
               <a14:hiddenLine xmlns:a14="http://schemas.microsoft.com/office/drawing/2010/main" w="9525">
                 <a:solidFill>
                   <a:srgbClr val="000000"/>
@@ -1111,14 +1111,14 @@
           <a:noFill/>
           <a:ln/>
           <a:extLst>
-            <a:ext uri="{909E8E84-426E-40DD-AFC4-6F175D3DCCD1}">
+            <a:ext uri="{909E8E84-426E-40dd-AFC4-6F175D3DCCD1}">
               <a14:hiddenFill xmlns:a14="http://schemas.microsoft.com/office/drawing/2010/main">
                 <a:solidFill>
                   <a:srgbClr val="FFFFFF"/>
                 </a:solidFill>
               </a14:hiddenFill>
             </a:ext>
-            <a:ext uri="{91240B29-F687-4F45-9708-019B960494DF}">
+            <a:ext uri="{91240B29-F687-4f45-9708-019B960494DF}">
               <a14:hiddenLine xmlns:a14="http://schemas.microsoft.com/office/drawing/2010/main" w="9525">
                 <a:solidFill>
                   <a:srgbClr val="000000"/>
@@ -1198,14 +1198,14 @@
           <a:noFill/>
           <a:ln/>
           <a:extLst>
-            <a:ext uri="{909E8E84-426E-40DD-AFC4-6F175D3DCCD1}">
+            <a:ext uri="{909E8E84-426E-40dd-AFC4-6F175D3DCCD1}">
               <a14:hiddenFill xmlns:a14="http://schemas.microsoft.com/office/drawing/2010/main">
                 <a:solidFill>
                   <a:srgbClr val="FFFFFF"/>
                 </a:solidFill>
               </a14:hiddenFill>
             </a:ext>
-            <a:ext uri="{91240B29-F687-4F45-9708-019B960494DF}">
+            <a:ext uri="{91240B29-F687-4f45-9708-019B960494DF}">
               <a14:hiddenLine xmlns:a14="http://schemas.microsoft.com/office/drawing/2010/main" w="9525">
                 <a:solidFill>
                   <a:srgbClr val="000000"/>
@@ -1241,14 +1241,14 @@
           <a:noFill/>
           <a:ln/>
           <a:extLst>
-            <a:ext uri="{909E8E84-426E-40DD-AFC4-6F175D3DCCD1}">
+            <a:ext uri="{909E8E84-426E-40dd-AFC4-6F175D3DCCD1}">
               <a14:hiddenFill xmlns:a14="http://schemas.microsoft.com/office/drawing/2010/main">
                 <a:solidFill>
                   <a:srgbClr val="FFFFFF"/>
                 </a:solidFill>
               </a14:hiddenFill>
             </a:ext>
-            <a:ext uri="{91240B29-F687-4F45-9708-019B960494DF}">
+            <a:ext uri="{91240B29-F687-4f45-9708-019B960494DF}">
               <a14:hiddenLine xmlns:a14="http://schemas.microsoft.com/office/drawing/2010/main" w="9525">
                 <a:solidFill>
                   <a:srgbClr val="000000"/>
@@ -1438,14 +1438,14 @@
           <a:noFill/>
           <a:ln/>
           <a:extLst>
-            <a:ext uri="{909E8E84-426E-40DD-AFC4-6F175D3DCCD1}">
+            <a:ext uri="{909E8E84-426E-40dd-AFC4-6F175D3DCCD1}">
               <a14:hiddenFill xmlns:a14="http://schemas.microsoft.com/office/drawing/2010/main">
                 <a:solidFill>
                   <a:srgbClr val="FFFFFF"/>
                 </a:solidFill>
               </a14:hiddenFill>
             </a:ext>
-            <a:ext uri="{91240B29-F687-4F45-9708-019B960494DF}">
+            <a:ext uri="{91240B29-F687-4f45-9708-019B960494DF}">
               <a14:hiddenLine xmlns:a14="http://schemas.microsoft.com/office/drawing/2010/main" w="9525">
                 <a:solidFill>
                   <a:srgbClr val="000000"/>
@@ -1481,14 +1481,14 @@
           <a:noFill/>
           <a:ln/>
           <a:extLst>
-            <a:ext uri="{909E8E84-426E-40DD-AFC4-6F175D3DCCD1}">
+            <a:ext uri="{909E8E84-426E-40dd-AFC4-6F175D3DCCD1}">
               <a14:hiddenFill xmlns:a14="http://schemas.microsoft.com/office/drawing/2010/main">
                 <a:solidFill>
                   <a:srgbClr val="FFFFFF"/>
                 </a:solidFill>
               </a14:hiddenFill>
             </a:ext>
-            <a:ext uri="{91240B29-F687-4F45-9708-019B960494DF}">
+            <a:ext uri="{91240B29-F687-4f45-9708-019B960494DF}">
               <a14:hiddenLine xmlns:a14="http://schemas.microsoft.com/office/drawing/2010/main" w="9525">
                 <a:solidFill>
                   <a:srgbClr val="000000"/>
@@ -1678,14 +1678,14 @@
           <a:noFill/>
           <a:ln/>
           <a:extLst>
-            <a:ext uri="{909E8E84-426E-40DD-AFC4-6F175D3DCCD1}">
+            <a:ext uri="{909E8E84-426E-40dd-AFC4-6F175D3DCCD1}">
               <a14:hiddenFill xmlns:a14="http://schemas.microsoft.com/office/drawing/2010/main">
                 <a:solidFill>
                   <a:srgbClr val="FFFFFF"/>
                 </a:solidFill>
               </a14:hiddenFill>
             </a:ext>
-            <a:ext uri="{91240B29-F687-4F45-9708-019B960494DF}">
+            <a:ext uri="{91240B29-F687-4f45-9708-019B960494DF}">
               <a14:hiddenLine xmlns:a14="http://schemas.microsoft.com/office/drawing/2010/main" w="9525">
                 <a:solidFill>
                   <a:srgbClr val="000000"/>
@@ -1721,14 +1721,14 @@
           <a:noFill/>
           <a:ln/>
           <a:extLst>
-            <a:ext uri="{909E8E84-426E-40DD-AFC4-6F175D3DCCD1}">
+            <a:ext uri="{909E8E84-426E-40dd-AFC4-6F175D3DCCD1}">
               <a14:hiddenFill xmlns:a14="http://schemas.microsoft.com/office/drawing/2010/main">
                 <a:solidFill>
                   <a:srgbClr val="FFFFFF"/>
                 </a:solidFill>
               </a14:hiddenFill>
             </a:ext>
-            <a:ext uri="{91240B29-F687-4F45-9708-019B960494DF}">
+            <a:ext uri="{91240B29-F687-4f45-9708-019B960494DF}">
               <a14:hiddenLine xmlns:a14="http://schemas.microsoft.com/office/drawing/2010/main" w="9525">
                 <a:solidFill>
                   <a:srgbClr val="000000"/>
@@ -1918,14 +1918,14 @@
           <a:noFill/>
           <a:ln/>
           <a:extLst>
-            <a:ext uri="{909E8E84-426E-40DD-AFC4-6F175D3DCCD1}">
+            <a:ext uri="{909E8E84-426E-40dd-AFC4-6F175D3DCCD1}">
               <a14:hiddenFill xmlns:a14="http://schemas.microsoft.com/office/drawing/2010/main">
                 <a:solidFill>
                   <a:srgbClr val="FFFFFF"/>
                 </a:solidFill>
               </a14:hiddenFill>
             </a:ext>
-            <a:ext uri="{91240B29-F687-4F45-9708-019B960494DF}">
+            <a:ext uri="{91240B29-F687-4f45-9708-019B960494DF}">
               <a14:hiddenLine xmlns:a14="http://schemas.microsoft.com/office/drawing/2010/main" w="9525">
                 <a:solidFill>
                   <a:srgbClr val="000000"/>
@@ -1961,14 +1961,14 @@
           <a:noFill/>
           <a:ln/>
           <a:extLst>
-            <a:ext uri="{909E8E84-426E-40DD-AFC4-6F175D3DCCD1}">
+            <a:ext uri="{909E8E84-426E-40dd-AFC4-6F175D3DCCD1}">
               <a14:hiddenFill xmlns:a14="http://schemas.microsoft.com/office/drawing/2010/main">
                 <a:solidFill>
                   <a:srgbClr val="FFFFFF"/>
                 </a:solidFill>
               </a14:hiddenFill>
             </a:ext>
-            <a:ext uri="{91240B29-F687-4F45-9708-019B960494DF}">
+            <a:ext uri="{91240B29-F687-4f45-9708-019B960494DF}">
               <a14:hiddenLine xmlns:a14="http://schemas.microsoft.com/office/drawing/2010/main" w="9525">
                 <a:solidFill>
                   <a:srgbClr val="000000"/>
@@ -2158,14 +2158,14 @@
           <a:noFill/>
           <a:ln/>
           <a:extLst>
-            <a:ext uri="{909E8E84-426E-40DD-AFC4-6F175D3DCCD1}">
+            <a:ext uri="{909E8E84-426E-40dd-AFC4-6F175D3DCCD1}">
               <a14:hiddenFill xmlns:a14="http://schemas.microsoft.com/office/drawing/2010/main">
                 <a:solidFill>
                   <a:srgbClr val="FFFFFF"/>
                 </a:solidFill>
               </a14:hiddenFill>
             </a:ext>
-            <a:ext uri="{91240B29-F687-4F45-9708-019B960494DF}">
+            <a:ext uri="{91240B29-F687-4f45-9708-019B960494DF}">
               <a14:hiddenLine xmlns:a14="http://schemas.microsoft.com/office/drawing/2010/main" w="9525">
                 <a:solidFill>
                   <a:srgbClr val="000000"/>
@@ -2201,14 +2201,14 @@
           <a:noFill/>
           <a:ln/>
           <a:extLst>
-            <a:ext uri="{909E8E84-426E-40DD-AFC4-6F175D3DCCD1}">
+            <a:ext uri="{909E8E84-426E-40dd-AFC4-6F175D3DCCD1}">
               <a14:hiddenFill xmlns:a14="http://schemas.microsoft.com/office/drawing/2010/main">
                 <a:solidFill>
                   <a:srgbClr val="FFFFFF"/>
                 </a:solidFill>
               </a14:hiddenFill>
             </a:ext>
-            <a:ext uri="{91240B29-F687-4F45-9708-019B960494DF}">
+            <a:ext uri="{91240B29-F687-4f45-9708-019B960494DF}">
               <a14:hiddenLine xmlns:a14="http://schemas.microsoft.com/office/drawing/2010/main" w="9525">
                 <a:solidFill>
                   <a:srgbClr val="000000"/>
@@ -2398,14 +2398,14 @@
           <a:noFill/>
           <a:ln/>
           <a:extLst>
-            <a:ext uri="{909E8E84-426E-40DD-AFC4-6F175D3DCCD1}">
+            <a:ext uri="{909E8E84-426E-40dd-AFC4-6F175D3DCCD1}">
               <a14:hiddenFill xmlns:a14="http://schemas.microsoft.com/office/drawing/2010/main">
                 <a:solidFill>
                   <a:srgbClr val="FFFFFF"/>
                 </a:solidFill>
               </a14:hiddenFill>
             </a:ext>
-            <a:ext uri="{91240B29-F687-4F45-9708-019B960494DF}">
+            <a:ext uri="{91240B29-F687-4f45-9708-019B960494DF}">
               <a14:hiddenLine xmlns:a14="http://schemas.microsoft.com/office/drawing/2010/main" w="9525">
                 <a:solidFill>
                   <a:srgbClr val="000000"/>
@@ -2441,14 +2441,14 @@
           <a:noFill/>
           <a:ln/>
           <a:extLst>
-            <a:ext uri="{909E8E84-426E-40DD-AFC4-6F175D3DCCD1}">
+            <a:ext uri="{909E8E84-426E-40dd-AFC4-6F175D3DCCD1}">
               <a14:hiddenFill xmlns:a14="http://schemas.microsoft.com/office/drawing/2010/main">
                 <a:solidFill>
                   <a:srgbClr val="FFFFFF"/>
                 </a:solidFill>
               </a14:hiddenFill>
             </a:ext>
-            <a:ext uri="{91240B29-F687-4F45-9708-019B960494DF}">
+            <a:ext uri="{91240B29-F687-4f45-9708-019B960494DF}">
               <a14:hiddenLine xmlns:a14="http://schemas.microsoft.com/office/drawing/2010/main" w="9525">
                 <a:solidFill>
                   <a:srgbClr val="000000"/>
@@ -2638,14 +2638,14 @@
           <a:noFill/>
           <a:ln/>
           <a:extLst>
-            <a:ext uri="{909E8E84-426E-40DD-AFC4-6F175D3DCCD1}">
+            <a:ext uri="{909E8E84-426E-40dd-AFC4-6F175D3DCCD1}">
               <a14:hiddenFill xmlns:a14="http://schemas.microsoft.com/office/drawing/2010/main">
                 <a:solidFill>
                   <a:srgbClr val="FFFFFF"/>
                 </a:solidFill>
               </a14:hiddenFill>
             </a:ext>
-            <a:ext uri="{91240B29-F687-4F45-9708-019B960494DF}">
+            <a:ext uri="{91240B29-F687-4f45-9708-019B960494DF}">
               <a14:hiddenLine xmlns:a14="http://schemas.microsoft.com/office/drawing/2010/main" w="9525">
                 <a:solidFill>
                   <a:srgbClr val="000000"/>
@@ -2681,14 +2681,14 @@
           <a:noFill/>
           <a:ln/>
           <a:extLst>
-            <a:ext uri="{909E8E84-426E-40DD-AFC4-6F175D3DCCD1}">
+            <a:ext uri="{909E8E84-426E-40dd-AFC4-6F175D3DCCD1}">
               <a14:hiddenFill xmlns:a14="http://schemas.microsoft.com/office/drawing/2010/main">
                 <a:solidFill>
                   <a:srgbClr val="FFFFFF"/>
                 </a:solidFill>
               </a14:hiddenFill>
             </a:ext>
-            <a:ext uri="{91240B29-F687-4F45-9708-019B960494DF}">
+            <a:ext uri="{91240B29-F687-4f45-9708-019B960494DF}">
               <a14:hiddenLine xmlns:a14="http://schemas.microsoft.com/office/drawing/2010/main" w="9525">
                 <a:solidFill>
                   <a:srgbClr val="000000"/>
@@ -2878,14 +2878,14 @@
           <a:noFill/>
           <a:ln/>
           <a:extLst>
-            <a:ext uri="{909E8E84-426E-40DD-AFC4-6F175D3DCCD1}">
+            <a:ext uri="{909E8E84-426E-40dd-AFC4-6F175D3DCCD1}">
               <a14:hiddenFill xmlns:a14="http://schemas.microsoft.com/office/drawing/2010/main">
                 <a:solidFill>
                   <a:srgbClr val="FFFFFF"/>
                 </a:solidFill>
               </a14:hiddenFill>
             </a:ext>
-            <a:ext uri="{91240B29-F687-4F45-9708-019B960494DF}">
+            <a:ext uri="{91240B29-F687-4f45-9708-019B960494DF}">
               <a14:hiddenLine xmlns:a14="http://schemas.microsoft.com/office/drawing/2010/main" w="9525">
                 <a:solidFill>
                   <a:srgbClr val="000000"/>
@@ -2921,14 +2921,14 @@
           <a:noFill/>
           <a:ln/>
           <a:extLst>
-            <a:ext uri="{909E8E84-426E-40DD-AFC4-6F175D3DCCD1}">
+            <a:ext uri="{909E8E84-426E-40dd-AFC4-6F175D3DCCD1}">
               <a14:hiddenFill xmlns:a14="http://schemas.microsoft.com/office/drawing/2010/main">
                 <a:solidFill>
                   <a:srgbClr val="FFFFFF"/>
                 </a:solidFill>
               </a14:hiddenFill>
             </a:ext>
-            <a:ext uri="{91240B29-F687-4F45-9708-019B960494DF}">
+            <a:ext uri="{91240B29-F687-4f45-9708-019B960494DF}">
               <a14:hiddenLine xmlns:a14="http://schemas.microsoft.com/office/drawing/2010/main" w="9525">
                 <a:solidFill>
                   <a:srgbClr val="000000"/>
@@ -3118,14 +3118,14 @@
           <a:noFill/>
           <a:ln/>
           <a:extLst>
-            <a:ext uri="{909E8E84-426E-40DD-AFC4-6F175D3DCCD1}">
+            <a:ext uri="{909E8E84-426E-40dd-AFC4-6F175D3DCCD1}">
               <a14:hiddenFill xmlns:a14="http://schemas.microsoft.com/office/drawing/2010/main">
                 <a:solidFill>
                   <a:srgbClr val="FFFFFF"/>
                 </a:solidFill>
               </a14:hiddenFill>
             </a:ext>
-            <a:ext uri="{91240B29-F687-4F45-9708-019B960494DF}">
+            <a:ext uri="{91240B29-F687-4f45-9708-019B960494DF}">
               <a14:hiddenLine xmlns:a14="http://schemas.microsoft.com/office/drawing/2010/main" w="9525">
                 <a:solidFill>
                   <a:srgbClr val="000000"/>
@@ -3161,14 +3161,14 @@
           <a:noFill/>
           <a:ln/>
           <a:extLst>
-            <a:ext uri="{909E8E84-426E-40DD-AFC4-6F175D3DCCD1}">
+            <a:ext uri="{909E8E84-426E-40dd-AFC4-6F175D3DCCD1}">
               <a14:hiddenFill xmlns:a14="http://schemas.microsoft.com/office/drawing/2010/main">
                 <a:solidFill>
                   <a:srgbClr val="FFFFFF"/>
                 </a:solidFill>
               </a14:hiddenFill>
             </a:ext>
-            <a:ext uri="{91240B29-F687-4F45-9708-019B960494DF}">
+            <a:ext uri="{91240B29-F687-4f45-9708-019B960494DF}">
               <a14:hiddenLine xmlns:a14="http://schemas.microsoft.com/office/drawing/2010/main" w="9525">
                 <a:solidFill>
                   <a:srgbClr val="000000"/>
@@ -3358,14 +3358,14 @@
           <a:noFill/>
           <a:ln/>
           <a:extLst>
-            <a:ext uri="{909E8E84-426E-40DD-AFC4-6F175D3DCCD1}">
+            <a:ext uri="{909E8E84-426E-40dd-AFC4-6F175D3DCCD1}">
               <a14:hiddenFill xmlns:a14="http://schemas.microsoft.com/office/drawing/2010/main">
                 <a:solidFill>
                   <a:srgbClr val="FFFFFF"/>
                 </a:solidFill>
               </a14:hiddenFill>
             </a:ext>
-            <a:ext uri="{91240B29-F687-4F45-9708-019B960494DF}">
+            <a:ext uri="{91240B29-F687-4f45-9708-019B960494DF}">
               <a14:hiddenLine xmlns:a14="http://schemas.microsoft.com/office/drawing/2010/main" w="9525">
                 <a:solidFill>
                   <a:srgbClr val="000000"/>
@@ -3401,14 +3401,14 @@
           <a:noFill/>
           <a:ln/>
           <a:extLst>
-            <a:ext uri="{909E8E84-426E-40DD-AFC4-6F175D3DCCD1}">
+            <a:ext uri="{909E8E84-426E-40dd-AFC4-6F175D3DCCD1}">
               <a14:hiddenFill xmlns:a14="http://schemas.microsoft.com/office/drawing/2010/main">
                 <a:solidFill>
                   <a:srgbClr val="FFFFFF"/>
                 </a:solidFill>
               </a14:hiddenFill>
             </a:ext>
-            <a:ext uri="{91240B29-F687-4F45-9708-019B960494DF}">
+            <a:ext uri="{91240B29-F687-4f45-9708-019B960494DF}">
               <a14:hiddenLine xmlns:a14="http://schemas.microsoft.com/office/drawing/2010/main" w="9525">
                 <a:solidFill>
                   <a:srgbClr val="000000"/>
@@ -3584,14 +3584,14 @@
           <a:noFill/>
           <a:ln/>
           <a:extLst>
-            <a:ext uri="{909E8E84-426E-40DD-AFC4-6F175D3DCCD1}">
+            <a:ext uri="{909E8E84-426E-40dd-AFC4-6F175D3DCCD1}">
               <a14:hiddenFill xmlns:a14="http://schemas.microsoft.com/office/drawing/2010/main">
                 <a:solidFill>
                   <a:srgbClr val="FFFFFF"/>
                 </a:solidFill>
               </a14:hiddenFill>
             </a:ext>
-            <a:ext uri="{91240B29-F687-4F45-9708-019B960494DF}">
+            <a:ext uri="{91240B29-F687-4f45-9708-019B960494DF}">
               <a14:hiddenLine xmlns:a14="http://schemas.microsoft.com/office/drawing/2010/main" w="9525">
                 <a:solidFill>
                   <a:srgbClr val="000000"/>
@@ -3751,14 +3751,14 @@
           <a:noFill/>
           <a:ln/>
           <a:extLst>
-            <a:ext uri="{909E8E84-426E-40DD-AFC4-6F175D3DCCD1}">
+            <a:ext uri="{909E8E84-426E-40dd-AFC4-6F175D3DCCD1}">
               <a14:hiddenFill xmlns:a14="http://schemas.microsoft.com/office/drawing/2010/main">
                 <a:solidFill>
                   <a:srgbClr val="FFFFFF"/>
                 </a:solidFill>
               </a14:hiddenFill>
             </a:ext>
-            <a:ext uri="{91240B29-F687-4F45-9708-019B960494DF}">
+            <a:ext uri="{91240B29-F687-4f45-9708-019B960494DF}">
               <a14:hiddenLine xmlns:a14="http://schemas.microsoft.com/office/drawing/2010/main" w="9525">
                 <a:solidFill>
                   <a:srgbClr val="000000"/>
@@ -3838,14 +3838,14 @@
           <a:noFill/>
           <a:ln/>
           <a:extLst>
-            <a:ext uri="{909E8E84-426E-40DD-AFC4-6F175D3DCCD1}">
+            <a:ext uri="{909E8E84-426E-40dd-AFC4-6F175D3DCCD1}">
               <a14:hiddenFill xmlns:a14="http://schemas.microsoft.com/office/drawing/2010/main">
                 <a:solidFill>
                   <a:srgbClr val="FFFFFF"/>
                 </a:solidFill>
               </a14:hiddenFill>
             </a:ext>
-            <a:ext uri="{91240B29-F687-4F45-9708-019B960494DF}">
+            <a:ext uri="{91240B29-F687-4f45-9708-019B960494DF}">
               <a14:hiddenLine xmlns:a14="http://schemas.microsoft.com/office/drawing/2010/main" w="9525">
                 <a:solidFill>
                   <a:srgbClr val="000000"/>
@@ -3881,14 +3881,14 @@
           <a:noFill/>
           <a:ln/>
           <a:extLst>
-            <a:ext uri="{909E8E84-426E-40DD-AFC4-6F175D3DCCD1}">
+            <a:ext uri="{909E8E84-426E-40dd-AFC4-6F175D3DCCD1}">
               <a14:hiddenFill xmlns:a14="http://schemas.microsoft.com/office/drawing/2010/main">
                 <a:solidFill>
                   <a:srgbClr val="FFFFFF"/>
                 </a:solidFill>
               </a14:hiddenFill>
             </a:ext>
-            <a:ext uri="{91240B29-F687-4F45-9708-019B960494DF}">
+            <a:ext uri="{91240B29-F687-4f45-9708-019B960494DF}">
               <a14:hiddenLine xmlns:a14="http://schemas.microsoft.com/office/drawing/2010/main" w="9525">
                 <a:solidFill>
                   <a:srgbClr val="000000"/>
@@ -4078,14 +4078,14 @@
           <a:noFill/>
           <a:ln/>
           <a:extLst>
-            <a:ext uri="{909E8E84-426E-40DD-AFC4-6F175D3DCCD1}">
+            <a:ext uri="{909E8E84-426E-40dd-AFC4-6F175D3DCCD1}">
               <a14:hiddenFill xmlns:a14="http://schemas.microsoft.com/office/drawing/2010/main">
                 <a:solidFill>
                   <a:srgbClr val="FFFFFF"/>
                 </a:solidFill>
               </a14:hiddenFill>
             </a:ext>
-            <a:ext uri="{91240B29-F687-4F45-9708-019B960494DF}">
+            <a:ext uri="{91240B29-F687-4f45-9708-019B960494DF}">
               <a14:hiddenLine xmlns:a14="http://schemas.microsoft.com/office/drawing/2010/main" w="9525">
                 <a:solidFill>
                   <a:srgbClr val="000000"/>
@@ -4121,14 +4121,14 @@
           <a:noFill/>
           <a:ln/>
           <a:extLst>
-            <a:ext uri="{909E8E84-426E-40DD-AFC4-6F175D3DCCD1}">
+            <a:ext uri="{909E8E84-426E-40dd-AFC4-6F175D3DCCD1}">
               <a14:hiddenFill xmlns:a14="http://schemas.microsoft.com/office/drawing/2010/main">
                 <a:solidFill>
                   <a:srgbClr val="FFFFFF"/>
                 </a:solidFill>
               </a14:hiddenFill>
             </a:ext>
-            <a:ext uri="{91240B29-F687-4F45-9708-019B960494DF}">
+            <a:ext uri="{91240B29-F687-4f45-9708-019B960494DF}">
               <a14:hiddenLine xmlns:a14="http://schemas.microsoft.com/office/drawing/2010/main" w="9525">
                 <a:solidFill>
                   <a:srgbClr val="000000"/>
@@ -4318,14 +4318,14 @@
           <a:noFill/>
           <a:ln/>
           <a:extLst>
-            <a:ext uri="{909E8E84-426E-40DD-AFC4-6F175D3DCCD1}">
+            <a:ext uri="{909E8E84-426E-40dd-AFC4-6F175D3DCCD1}">
               <a14:hiddenFill xmlns:a14="http://schemas.microsoft.com/office/drawing/2010/main">
                 <a:solidFill>
                   <a:srgbClr val="FFFFFF"/>
                 </a:solidFill>
               </a14:hiddenFill>
             </a:ext>
-            <a:ext uri="{91240B29-F687-4F45-9708-019B960494DF}">
+            <a:ext uri="{91240B29-F687-4f45-9708-019B960494DF}">
               <a14:hiddenLine xmlns:a14="http://schemas.microsoft.com/office/drawing/2010/main" w="9525">
                 <a:solidFill>
                   <a:srgbClr val="000000"/>
@@ -4361,14 +4361,14 @@
           <a:noFill/>
           <a:ln/>
           <a:extLst>
-            <a:ext uri="{909E8E84-426E-40DD-AFC4-6F175D3DCCD1}">
+            <a:ext uri="{909E8E84-426E-40dd-AFC4-6F175D3DCCD1}">
               <a14:hiddenFill xmlns:a14="http://schemas.microsoft.com/office/drawing/2010/main">
                 <a:solidFill>
                   <a:srgbClr val="FFFFFF"/>
                 </a:solidFill>
               </a14:hiddenFill>
             </a:ext>
-            <a:ext uri="{91240B29-F687-4F45-9708-019B960494DF}">
+            <a:ext uri="{91240B29-F687-4f45-9708-019B960494DF}">
               <a14:hiddenLine xmlns:a14="http://schemas.microsoft.com/office/drawing/2010/main" w="9525">
                 <a:solidFill>
                   <a:srgbClr val="000000"/>
@@ -4558,14 +4558,14 @@
           <a:noFill/>
           <a:ln/>
           <a:extLst>
-            <a:ext uri="{909E8E84-426E-40DD-AFC4-6F175D3DCCD1}">
+            <a:ext uri="{909E8E84-426E-40dd-AFC4-6F175D3DCCD1}">
               <a14:hiddenFill xmlns:a14="http://schemas.microsoft.com/office/drawing/2010/main">
                 <a:solidFill>
                   <a:srgbClr val="FFFFFF"/>
                 </a:solidFill>
               </a14:hiddenFill>
             </a:ext>
-            <a:ext uri="{91240B29-F687-4F45-9708-019B960494DF}">
+            <a:ext uri="{91240B29-F687-4f45-9708-019B960494DF}">
               <a14:hiddenLine xmlns:a14="http://schemas.microsoft.com/office/drawing/2010/main" w="9525">
                 <a:solidFill>
                   <a:srgbClr val="000000"/>
@@ -4601,14 +4601,14 @@
           <a:noFill/>
           <a:ln/>
           <a:extLst>
-            <a:ext uri="{909E8E84-426E-40DD-AFC4-6F175D3DCCD1}">
+            <a:ext uri="{909E8E84-426E-40dd-AFC4-6F175D3DCCD1}">
               <a14:hiddenFill xmlns:a14="http://schemas.microsoft.com/office/drawing/2010/main">
                 <a:solidFill>
                   <a:srgbClr val="FFFFFF"/>
                 </a:solidFill>
               </a14:hiddenFill>
             </a:ext>
-            <a:ext uri="{91240B29-F687-4F45-9708-019B960494DF}">
+            <a:ext uri="{91240B29-F687-4f45-9708-019B960494DF}">
               <a14:hiddenLine xmlns:a14="http://schemas.microsoft.com/office/drawing/2010/main" w="9525">
                 <a:solidFill>
                   <a:srgbClr val="000000"/>
@@ -4798,14 +4798,14 @@
           <a:noFill/>
           <a:ln/>
           <a:extLst>
-            <a:ext uri="{909E8E84-426E-40DD-AFC4-6F175D3DCCD1}">
+            <a:ext uri="{909E8E84-426E-40dd-AFC4-6F175D3DCCD1}">
               <a14:hiddenFill xmlns:a14="http://schemas.microsoft.com/office/drawing/2010/main">
                 <a:solidFill>
                   <a:srgbClr val="FFFFFF"/>
                 </a:solidFill>
               </a14:hiddenFill>
             </a:ext>
-            <a:ext uri="{91240B29-F687-4F45-9708-019B960494DF}">
+            <a:ext uri="{91240B29-F687-4f45-9708-019B960494DF}">
               <a14:hiddenLine xmlns:a14="http://schemas.microsoft.com/office/drawing/2010/main" w="9525">
                 <a:solidFill>
                   <a:srgbClr val="000000"/>
@@ -4841,14 +4841,14 @@
           <a:noFill/>
           <a:ln/>
           <a:extLst>
-            <a:ext uri="{909E8E84-426E-40DD-AFC4-6F175D3DCCD1}">
+            <a:ext uri="{909E8E84-426E-40dd-AFC4-6F175D3DCCD1}">
               <a14:hiddenFill xmlns:a14="http://schemas.microsoft.com/office/drawing/2010/main">
                 <a:solidFill>
                   <a:srgbClr val="FFFFFF"/>
                 </a:solidFill>
               </a14:hiddenFill>
             </a:ext>
-            <a:ext uri="{91240B29-F687-4F45-9708-019B960494DF}">
+            <a:ext uri="{91240B29-F687-4f45-9708-019B960494DF}">
               <a14:hiddenLine xmlns:a14="http://schemas.microsoft.com/office/drawing/2010/main" w="9525">
                 <a:solidFill>
                   <a:srgbClr val="000000"/>
@@ -5038,14 +5038,14 @@
           <a:noFill/>
           <a:ln/>
           <a:extLst>
-            <a:ext uri="{909E8E84-426E-40DD-AFC4-6F175D3DCCD1}">
+            <a:ext uri="{909E8E84-426E-40dd-AFC4-6F175D3DCCD1}">
               <a14:hiddenFill xmlns:a14="http://schemas.microsoft.com/office/drawing/2010/main">
                 <a:solidFill>
                   <a:srgbClr val="FFFFFF"/>
                 </a:solidFill>
               </a14:hiddenFill>
             </a:ext>
-            <a:ext uri="{91240B29-F687-4F45-9708-019B960494DF}">
+            <a:ext uri="{91240B29-F687-4f45-9708-019B960494DF}">
               <a14:hiddenLine xmlns:a14="http://schemas.microsoft.com/office/drawing/2010/main" w="9525">
                 <a:solidFill>
                   <a:srgbClr val="000000"/>
@@ -5081,14 +5081,14 @@
           <a:noFill/>
           <a:ln/>
           <a:extLst>
-            <a:ext uri="{909E8E84-426E-40DD-AFC4-6F175D3DCCD1}">
+            <a:ext uri="{909E8E84-426E-40dd-AFC4-6F175D3DCCD1}">
               <a14:hiddenFill xmlns:a14="http://schemas.microsoft.com/office/drawing/2010/main">
                 <a:solidFill>
                   <a:srgbClr val="FFFFFF"/>
                 </a:solidFill>
               </a14:hiddenFill>
             </a:ext>
-            <a:ext uri="{91240B29-F687-4F45-9708-019B960494DF}">
+            <a:ext uri="{91240B29-F687-4f45-9708-019B960494DF}">
               <a14:hiddenLine xmlns:a14="http://schemas.microsoft.com/office/drawing/2010/main" w="9525">
                 <a:solidFill>
                   <a:srgbClr val="000000"/>
@@ -5278,14 +5278,14 @@
           <a:noFill/>
           <a:ln/>
           <a:extLst>
-            <a:ext uri="{909E8E84-426E-40DD-AFC4-6F175D3DCCD1}">
+            <a:ext uri="{909E8E84-426E-40dd-AFC4-6F175D3DCCD1}">
               <a14:hiddenFill xmlns:a14="http://schemas.microsoft.com/office/drawing/2010/main">
                 <a:solidFill>
                   <a:srgbClr val="FFFFFF"/>
                 </a:solidFill>
               </a14:hiddenFill>
             </a:ext>
-            <a:ext uri="{91240B29-F687-4F45-9708-019B960494DF}">
+            <a:ext uri="{91240B29-F687-4f45-9708-019B960494DF}">
               <a14:hiddenLine xmlns:a14="http://schemas.microsoft.com/office/drawing/2010/main" w="9525">
                 <a:solidFill>
                   <a:srgbClr val="000000"/>
@@ -5321,14 +5321,14 @@
           <a:noFill/>
           <a:ln/>
           <a:extLst>
-            <a:ext uri="{909E8E84-426E-40DD-AFC4-6F175D3DCCD1}">
+            <a:ext uri="{909E8E84-426E-40dd-AFC4-6F175D3DCCD1}">
               <a14:hiddenFill xmlns:a14="http://schemas.microsoft.com/office/drawing/2010/main">
                 <a:solidFill>
                   <a:srgbClr val="FFFFFF"/>
                 </a:solidFill>
               </a14:hiddenFill>
             </a:ext>
-            <a:ext uri="{91240B29-F687-4F45-9708-019B960494DF}">
+            <a:ext uri="{91240B29-F687-4f45-9708-019B960494DF}">
               <a14:hiddenLine xmlns:a14="http://schemas.microsoft.com/office/drawing/2010/main" w="9525">
                 <a:solidFill>
                   <a:srgbClr val="000000"/>
@@ -5518,14 +5518,14 @@
           <a:noFill/>
           <a:ln/>
           <a:extLst>
-            <a:ext uri="{909E8E84-426E-40DD-AFC4-6F175D3DCCD1}">
+            <a:ext uri="{909E8E84-426E-40dd-AFC4-6F175D3DCCD1}">
               <a14:hiddenFill xmlns:a14="http://schemas.microsoft.com/office/drawing/2010/main">
                 <a:solidFill>
                   <a:srgbClr val="FFFFFF"/>
                 </a:solidFill>
               </a14:hiddenFill>
             </a:ext>
-            <a:ext uri="{91240B29-F687-4F45-9708-019B960494DF}">
+            <a:ext uri="{91240B29-F687-4f45-9708-019B960494DF}">
               <a14:hiddenLine xmlns:a14="http://schemas.microsoft.com/office/drawing/2010/main" w="9525">
                 <a:solidFill>
                   <a:srgbClr val="000000"/>
@@ -5561,14 +5561,14 @@
           <a:noFill/>
           <a:ln/>
           <a:extLst>
-            <a:ext uri="{909E8E84-426E-40DD-AFC4-6F175D3DCCD1}">
+            <a:ext uri="{909E8E84-426E-40dd-AFC4-6F175D3DCCD1}">
               <a14:hiddenFill xmlns:a14="http://schemas.microsoft.com/office/drawing/2010/main">
                 <a:solidFill>
                   <a:srgbClr val="FFFFFF"/>
                 </a:solidFill>
               </a14:hiddenFill>
             </a:ext>
-            <a:ext uri="{91240B29-F687-4F45-9708-019B960494DF}">
+            <a:ext uri="{91240B29-F687-4f45-9708-019B960494DF}">
               <a14:hiddenLine xmlns:a14="http://schemas.microsoft.com/office/drawing/2010/main" w="9525">
                 <a:solidFill>
                   <a:srgbClr val="000000"/>
@@ -5758,14 +5758,14 @@
           <a:noFill/>
           <a:ln/>
           <a:extLst>
-            <a:ext uri="{909E8E84-426E-40DD-AFC4-6F175D3DCCD1}">
+            <a:ext uri="{909E8E84-426E-40dd-AFC4-6F175D3DCCD1}">
               <a14:hiddenFill xmlns:a14="http://schemas.microsoft.com/office/drawing/2010/main">
                 <a:solidFill>
                   <a:srgbClr val="FFFFFF"/>
                 </a:solidFill>
               </a14:hiddenFill>
             </a:ext>
-            <a:ext uri="{91240B29-F687-4F45-9708-019B960494DF}">
+            <a:ext uri="{91240B29-F687-4f45-9708-019B960494DF}">
               <a14:hiddenLine xmlns:a14="http://schemas.microsoft.com/office/drawing/2010/main" w="9525">
                 <a:solidFill>
                   <a:srgbClr val="000000"/>
@@ -5801,14 +5801,14 @@
           <a:noFill/>
           <a:ln/>
           <a:extLst>
-            <a:ext uri="{909E8E84-426E-40DD-AFC4-6F175D3DCCD1}">
+            <a:ext uri="{909E8E84-426E-40dd-AFC4-6F175D3DCCD1}">
               <a14:hiddenFill xmlns:a14="http://schemas.microsoft.com/office/drawing/2010/main">
                 <a:solidFill>
                   <a:srgbClr val="FFFFFF"/>
                 </a:solidFill>
               </a14:hiddenFill>
             </a:ext>
-            <a:ext uri="{91240B29-F687-4F45-9708-019B960494DF}">
+            <a:ext uri="{91240B29-F687-4f45-9708-019B960494DF}">
               <a14:hiddenLine xmlns:a14="http://schemas.microsoft.com/office/drawing/2010/main" w="9525">
                 <a:solidFill>
                   <a:srgbClr val="000000"/>
@@ -5998,14 +5998,14 @@
           <a:noFill/>
           <a:ln/>
           <a:extLst>
-            <a:ext uri="{909E8E84-426E-40DD-AFC4-6F175D3DCCD1}">
+            <a:ext uri="{909E8E84-426E-40dd-AFC4-6F175D3DCCD1}">
               <a14:hiddenFill xmlns:a14="http://schemas.microsoft.com/office/drawing/2010/main">
                 <a:solidFill>
                   <a:srgbClr val="FFFFFF"/>
                 </a:solidFill>
               </a14:hiddenFill>
             </a:ext>
-            <a:ext uri="{91240B29-F687-4F45-9708-019B960494DF}">
+            <a:ext uri="{91240B29-F687-4f45-9708-019B960494DF}">
               <a14:hiddenLine xmlns:a14="http://schemas.microsoft.com/office/drawing/2010/main" w="9525">
                 <a:solidFill>
                   <a:srgbClr val="000000"/>
@@ -6041,14 +6041,14 @@
           <a:noFill/>
           <a:ln/>
           <a:extLst>
-            <a:ext uri="{909E8E84-426E-40DD-AFC4-6F175D3DCCD1}">
+            <a:ext uri="{909E8E84-426E-40dd-AFC4-6F175D3DCCD1}">
               <a14:hiddenFill xmlns:a14="http://schemas.microsoft.com/office/drawing/2010/main">
                 <a:solidFill>
                   <a:srgbClr val="FFFFFF"/>
                 </a:solidFill>
               </a14:hiddenFill>
             </a:ext>
-            <a:ext uri="{91240B29-F687-4F45-9708-019B960494DF}">
+            <a:ext uri="{91240B29-F687-4f45-9708-019B960494DF}">
               <a14:hiddenLine xmlns:a14="http://schemas.microsoft.com/office/drawing/2010/main" w="9525">
                 <a:solidFill>
                   <a:srgbClr val="000000"/>
@@ -6238,14 +6238,14 @@
           <a:noFill/>
           <a:ln/>
           <a:extLst>
-            <a:ext uri="{909E8E84-426E-40DD-AFC4-6F175D3DCCD1}">
+            <a:ext uri="{909E8E84-426E-40dd-AFC4-6F175D3DCCD1}">
               <a14:hiddenFill xmlns:a14="http://schemas.microsoft.com/office/drawing/2010/main">
                 <a:solidFill>
                   <a:srgbClr val="FFFFFF"/>
                 </a:solidFill>
               </a14:hiddenFill>
             </a:ext>
-            <a:ext uri="{91240B29-F687-4F45-9708-019B960494DF}">
+            <a:ext uri="{91240B29-F687-4f45-9708-019B960494DF}">
               <a14:hiddenLine xmlns:a14="http://schemas.microsoft.com/office/drawing/2010/main" w="9525">
                 <a:solidFill>
                   <a:srgbClr val="000000"/>
@@ -6281,14 +6281,14 @@
           <a:noFill/>
           <a:ln/>
           <a:extLst>
-            <a:ext uri="{909E8E84-426E-40DD-AFC4-6F175D3DCCD1}">
+            <a:ext uri="{909E8E84-426E-40dd-AFC4-6F175D3DCCD1}">
               <a14:hiddenFill xmlns:a14="http://schemas.microsoft.com/office/drawing/2010/main">
                 <a:solidFill>
                   <a:srgbClr val="FFFFFF"/>
                 </a:solidFill>
               </a14:hiddenFill>
             </a:ext>
-            <a:ext uri="{91240B29-F687-4F45-9708-019B960494DF}">
+            <a:ext uri="{91240B29-F687-4f45-9708-019B960494DF}">
               <a14:hiddenLine xmlns:a14="http://schemas.microsoft.com/office/drawing/2010/main" w="9525">
                 <a:solidFill>
                   <a:srgbClr val="000000"/>
@@ -6478,14 +6478,14 @@
           <a:noFill/>
           <a:ln/>
           <a:extLst>
-            <a:ext uri="{909E8E84-426E-40DD-AFC4-6F175D3DCCD1}">
+            <a:ext uri="{909E8E84-426E-40dd-AFC4-6F175D3DCCD1}">
               <a14:hiddenFill xmlns:a14="http://schemas.microsoft.com/office/drawing/2010/main">
                 <a:solidFill>
                   <a:srgbClr val="FFFFFF"/>
                 </a:solidFill>
               </a14:hiddenFill>
             </a:ext>
-            <a:ext uri="{91240B29-F687-4F45-9708-019B960494DF}">
+            <a:ext uri="{91240B29-F687-4f45-9708-019B960494DF}">
               <a14:hiddenLine xmlns:a14="http://schemas.microsoft.com/office/drawing/2010/main" w="9525">
                 <a:solidFill>
                   <a:srgbClr val="000000"/>
@@ -6521,14 +6521,14 @@
           <a:noFill/>
           <a:ln/>
           <a:extLst>
-            <a:ext uri="{909E8E84-426E-40DD-AFC4-6F175D3DCCD1}">
+            <a:ext uri="{909E8E84-426E-40dd-AFC4-6F175D3DCCD1}">
               <a14:hiddenFill xmlns:a14="http://schemas.microsoft.com/office/drawing/2010/main">
                 <a:solidFill>
                   <a:srgbClr val="FFFFFF"/>
                 </a:solidFill>
               </a14:hiddenFill>
             </a:ext>
-            <a:ext uri="{91240B29-F687-4F45-9708-019B960494DF}">
+            <a:ext uri="{91240B29-F687-4f45-9708-019B960494DF}">
               <a14:hiddenLine xmlns:a14="http://schemas.microsoft.com/office/drawing/2010/main" w="9525">
                 <a:solidFill>
                   <a:srgbClr val="000000"/>
@@ -6718,14 +6718,14 @@
           <a:noFill/>
           <a:ln/>
           <a:extLst>
-            <a:ext uri="{909E8E84-426E-40DD-AFC4-6F175D3DCCD1}">
+            <a:ext uri="{909E8E84-426E-40dd-AFC4-6F175D3DCCD1}">
               <a14:hiddenFill xmlns:a14="http://schemas.microsoft.com/office/drawing/2010/main">
                 <a:solidFill>
                   <a:srgbClr val="FFFFFF"/>
                 </a:solidFill>
               </a14:hiddenFill>
             </a:ext>
-            <a:ext uri="{91240B29-F687-4F45-9708-019B960494DF}">
+            <a:ext uri="{91240B29-F687-4f45-9708-019B960494DF}">
               <a14:hiddenLine xmlns:a14="http://schemas.microsoft.com/office/drawing/2010/main" w="9525">
                 <a:solidFill>
                   <a:srgbClr val="000000"/>
@@ -6761,14 +6761,14 @@
           <a:noFill/>
           <a:ln/>
           <a:extLst>
-            <a:ext uri="{909E8E84-426E-40DD-AFC4-6F175D3DCCD1}">
+            <a:ext uri="{909E8E84-426E-40dd-AFC4-6F175D3DCCD1}">
               <a14:hiddenFill xmlns:a14="http://schemas.microsoft.com/office/drawing/2010/main">
                 <a:solidFill>
                   <a:srgbClr val="FFFFFF"/>
                 </a:solidFill>
               </a14:hiddenFill>
             </a:ext>
-            <a:ext uri="{91240B29-F687-4F45-9708-019B960494DF}">
+            <a:ext uri="{91240B29-F687-4f45-9708-019B960494DF}">
               <a14:hiddenLine xmlns:a14="http://schemas.microsoft.com/office/drawing/2010/main" w="9525">
                 <a:solidFill>
                   <a:srgbClr val="000000"/>
@@ -6958,14 +6958,14 @@
           <a:noFill/>
           <a:ln/>
           <a:extLst>
-            <a:ext uri="{909E8E84-426E-40DD-AFC4-6F175D3DCCD1}">
+            <a:ext uri="{909E8E84-426E-40dd-AFC4-6F175D3DCCD1}">
               <a14:hiddenFill xmlns:a14="http://schemas.microsoft.com/office/drawing/2010/main">
                 <a:solidFill>
                   <a:srgbClr val="FFFFFF"/>
                 </a:solidFill>
               </a14:hiddenFill>
             </a:ext>
-            <a:ext uri="{91240B29-F687-4F45-9708-019B960494DF}">
+            <a:ext uri="{91240B29-F687-4f45-9708-019B960494DF}">
               <a14:hiddenLine xmlns:a14="http://schemas.microsoft.com/office/drawing/2010/main" w="9525">
                 <a:solidFill>
                   <a:srgbClr val="000000"/>
@@ -7001,14 +7001,14 @@
           <a:noFill/>
           <a:ln/>
           <a:extLst>
-            <a:ext uri="{909E8E84-426E-40DD-AFC4-6F175D3DCCD1}">
+            <a:ext uri="{909E8E84-426E-40dd-AFC4-6F175D3DCCD1}">
               <a14:hiddenFill xmlns:a14="http://schemas.microsoft.com/office/drawing/2010/main">
                 <a:solidFill>
                   <a:srgbClr val="FFFFFF"/>
                 </a:solidFill>
               </a14:hiddenFill>
             </a:ext>
-            <a:ext uri="{91240B29-F687-4F45-9708-019B960494DF}">
+            <a:ext uri="{91240B29-F687-4f45-9708-019B960494DF}">
               <a14:hiddenLine xmlns:a14="http://schemas.microsoft.com/office/drawing/2010/main" w="9525">
                 <a:solidFill>
                   <a:srgbClr val="000000"/>
@@ -7198,14 +7198,14 @@
           <a:noFill/>
           <a:ln/>
           <a:extLst>
-            <a:ext uri="{909E8E84-426E-40DD-AFC4-6F175D3DCCD1}">
+            <a:ext uri="{909E8E84-426E-40dd-AFC4-6F175D3DCCD1}">
               <a14:hiddenFill xmlns:a14="http://schemas.microsoft.com/office/drawing/2010/main">
                 <a:solidFill>
                   <a:srgbClr val="FFFFFF"/>
                 </a:solidFill>
               </a14:hiddenFill>
             </a:ext>
-            <a:ext uri="{91240B29-F687-4F45-9708-019B960494DF}">
+            <a:ext uri="{91240B29-F687-4f45-9708-019B960494DF}">
               <a14:hiddenLine xmlns:a14="http://schemas.microsoft.com/office/drawing/2010/main" w="9525">
                 <a:solidFill>
                   <a:srgbClr val="000000"/>
@@ -7241,14 +7241,14 @@
           <a:noFill/>
           <a:ln/>
           <a:extLst>
-            <a:ext uri="{909E8E84-426E-40DD-AFC4-6F175D3DCCD1}">
+            <a:ext uri="{909E8E84-426E-40dd-AFC4-6F175D3DCCD1}">
               <a14:hiddenFill xmlns:a14="http://schemas.microsoft.com/office/drawing/2010/main">
                 <a:solidFill>
                   <a:srgbClr val="FFFFFF"/>
                 </a:solidFill>
               </a14:hiddenFill>
             </a:ext>
-            <a:ext uri="{91240B29-F687-4F45-9708-019B960494DF}">
+            <a:ext uri="{91240B29-F687-4f45-9708-019B960494DF}">
               <a14:hiddenLine xmlns:a14="http://schemas.microsoft.com/office/drawing/2010/main" w="9525">
                 <a:solidFill>
                   <a:srgbClr val="000000"/>
@@ -7544,14 +7544,14 @@
           <a:noFill/>
           <a:ln/>
           <a:extLst>
-            <a:ext uri="{909E8E84-426E-40DD-AFC4-6F175D3DCCD1}">
+            <a:ext uri="{909E8E84-426E-40dd-AFC4-6F175D3DCCD1}">
               <a14:hiddenFill xmlns:a14="http://schemas.microsoft.com/office/drawing/2010/main">
                 <a:solidFill>
                   <a:srgbClr val="FFFFFF"/>
                 </a:solidFill>
               </a14:hiddenFill>
             </a:ext>
-            <a:ext uri="{91240B29-F687-4F45-9708-019B960494DF}">
+            <a:ext uri="{91240B29-F687-4f45-9708-019B960494DF}">
               <a14:hiddenLine xmlns:a14="http://schemas.microsoft.com/office/drawing/2010/main" w="9525">
                 <a:solidFill>
                   <a:srgbClr val="000000"/>
@@ -7587,14 +7587,14 @@
           <a:noFill/>
           <a:ln/>
           <a:extLst>
-            <a:ext uri="{909E8E84-426E-40DD-AFC4-6F175D3DCCD1}">
+            <a:ext uri="{909E8E84-426E-40dd-AFC4-6F175D3DCCD1}">
               <a14:hiddenFill xmlns:a14="http://schemas.microsoft.com/office/drawing/2010/main">
                 <a:solidFill>
                   <a:srgbClr val="FFFFFF"/>
                 </a:solidFill>
               </a14:hiddenFill>
             </a:ext>
-            <a:ext uri="{91240B29-F687-4F45-9708-019B960494DF}">
+            <a:ext uri="{91240B29-F687-4f45-9708-019B960494DF}">
               <a14:hiddenLine xmlns:a14="http://schemas.microsoft.com/office/drawing/2010/main" w="9525">
                 <a:solidFill>
                   <a:srgbClr val="000000"/>
@@ -7784,14 +7784,14 @@
           <a:noFill/>
           <a:ln/>
           <a:extLst>
-            <a:ext uri="{909E8E84-426E-40DD-AFC4-6F175D3DCCD1}">
+            <a:ext uri="{909E8E84-426E-40dd-AFC4-6F175D3DCCD1}">
               <a14:hiddenFill xmlns:a14="http://schemas.microsoft.com/office/drawing/2010/main">
                 <a:solidFill>
                   <a:srgbClr val="FFFFFF"/>
                 </a:solidFill>
               </a14:hiddenFill>
             </a:ext>
-            <a:ext uri="{91240B29-F687-4F45-9708-019B960494DF}">
+            <a:ext uri="{91240B29-F687-4f45-9708-019B960494DF}">
               <a14:hiddenLine xmlns:a14="http://schemas.microsoft.com/office/drawing/2010/main" w="9525">
                 <a:solidFill>
                   <a:srgbClr val="000000"/>
@@ -7827,14 +7827,14 @@
           <a:noFill/>
           <a:ln/>
           <a:extLst>
-            <a:ext uri="{909E8E84-426E-40DD-AFC4-6F175D3DCCD1}">
+            <a:ext uri="{909E8E84-426E-40dd-AFC4-6F175D3DCCD1}">
               <a14:hiddenFill xmlns:a14="http://schemas.microsoft.com/office/drawing/2010/main">
                 <a:solidFill>
                   <a:srgbClr val="FFFFFF"/>
                 </a:solidFill>
               </a14:hiddenFill>
             </a:ext>
-            <a:ext uri="{91240B29-F687-4F45-9708-019B960494DF}">
+            <a:ext uri="{91240B29-F687-4f45-9708-019B960494DF}">
               <a14:hiddenLine xmlns:a14="http://schemas.microsoft.com/office/drawing/2010/main" w="9525">
                 <a:solidFill>
                   <a:srgbClr val="000000"/>
@@ -8024,14 +8024,14 @@
           <a:noFill/>
           <a:ln/>
           <a:extLst>
-            <a:ext uri="{909E8E84-426E-40DD-AFC4-6F175D3DCCD1}">
+            <a:ext uri="{909E8E84-426E-40dd-AFC4-6F175D3DCCD1}">
               <a14:hiddenFill xmlns:a14="http://schemas.microsoft.com/office/drawing/2010/main">
                 <a:solidFill>
                   <a:srgbClr val="FFFFFF"/>
                 </a:solidFill>
               </a14:hiddenFill>
             </a:ext>
-            <a:ext uri="{91240B29-F687-4F45-9708-019B960494DF}">
+            <a:ext uri="{91240B29-F687-4f45-9708-019B960494DF}">
               <a14:hiddenLine xmlns:a14="http://schemas.microsoft.com/office/drawing/2010/main" w="9525">
                 <a:solidFill>
                   <a:srgbClr val="000000"/>
@@ -8067,14 +8067,14 @@
           <a:noFill/>
           <a:ln/>
           <a:extLst>
-            <a:ext uri="{909E8E84-426E-40DD-AFC4-6F175D3DCCD1}">
+            <a:ext uri="{909E8E84-426E-40dd-AFC4-6F175D3DCCD1}">
               <a14:hiddenFill xmlns:a14="http://schemas.microsoft.com/office/drawing/2010/main">
                 <a:solidFill>
                   <a:srgbClr val="FFFFFF"/>
                 </a:solidFill>
               </a14:hiddenFill>
             </a:ext>
-            <a:ext uri="{91240B29-F687-4F45-9708-019B960494DF}">
+            <a:ext uri="{91240B29-F687-4f45-9708-019B960494DF}">
               <a14:hiddenLine xmlns:a14="http://schemas.microsoft.com/office/drawing/2010/main" w="9525">
                 <a:solidFill>
                   <a:srgbClr val="000000"/>
@@ -8264,14 +8264,14 @@
           <a:noFill/>
           <a:ln/>
           <a:extLst>
-            <a:ext uri="{909E8E84-426E-40DD-AFC4-6F175D3DCCD1}">
+            <a:ext uri="{909E8E84-426E-40dd-AFC4-6F175D3DCCD1}">
               <a14:hiddenFill xmlns:a14="http://schemas.microsoft.com/office/drawing/2010/main">
                 <a:solidFill>
                   <a:srgbClr val="FFFFFF"/>
                 </a:solidFill>
               </a14:hiddenFill>
             </a:ext>
-            <a:ext uri="{91240B29-F687-4F45-9708-019B960494DF}">
+            <a:ext uri="{91240B29-F687-4f45-9708-019B960494DF}">
               <a14:hiddenLine xmlns:a14="http://schemas.microsoft.com/office/drawing/2010/main" w="9525">
                 <a:solidFill>
                   <a:srgbClr val="000000"/>
@@ -8307,14 +8307,14 @@
           <a:noFill/>
           <a:ln/>
           <a:extLst>
-            <a:ext uri="{909E8E84-426E-40DD-AFC4-6F175D3DCCD1}">
+            <a:ext uri="{909E8E84-426E-40dd-AFC4-6F175D3DCCD1}">
               <a14:hiddenFill xmlns:a14="http://schemas.microsoft.com/office/drawing/2010/main">
                 <a:solidFill>
                   <a:srgbClr val="FFFFFF"/>
                 </a:solidFill>
               </a14:hiddenFill>
             </a:ext>
-            <a:ext uri="{91240B29-F687-4F45-9708-019B960494DF}">
+            <a:ext uri="{91240B29-F687-4f45-9708-019B960494DF}">
               <a14:hiddenLine xmlns:a14="http://schemas.microsoft.com/office/drawing/2010/main" w="9525">
                 <a:solidFill>
                   <a:srgbClr val="000000"/>
@@ -8504,14 +8504,14 @@
           <a:noFill/>
           <a:ln/>
           <a:extLst>
-            <a:ext uri="{909E8E84-426E-40DD-AFC4-6F175D3DCCD1}">
+            <a:ext uri="{909E8E84-426E-40dd-AFC4-6F175D3DCCD1}">
               <a14:hiddenFill xmlns:a14="http://schemas.microsoft.com/office/drawing/2010/main">
                 <a:solidFill>
                   <a:srgbClr val="FFFFFF"/>
                 </a:solidFill>
               </a14:hiddenFill>
             </a:ext>
-            <a:ext uri="{91240B29-F687-4F45-9708-019B960494DF}">
+            <a:ext uri="{91240B29-F687-4f45-9708-019B960494DF}">
               <a14:hiddenLine xmlns:a14="http://schemas.microsoft.com/office/drawing/2010/main" w="9525">
                 <a:solidFill>
                   <a:srgbClr val="000000"/>
@@ -8547,14 +8547,14 @@
           <a:noFill/>
           <a:ln/>
           <a:extLst>
-            <a:ext uri="{909E8E84-426E-40DD-AFC4-6F175D3DCCD1}">
+            <a:ext uri="{909E8E84-426E-40dd-AFC4-6F175D3DCCD1}">
               <a14:hiddenFill xmlns:a14="http://schemas.microsoft.com/office/drawing/2010/main">
                 <a:solidFill>
                   <a:srgbClr val="FFFFFF"/>
                 </a:solidFill>
               </a14:hiddenFill>
             </a:ext>
-            <a:ext uri="{91240B29-F687-4F45-9708-019B960494DF}">
+            <a:ext uri="{91240B29-F687-4f45-9708-019B960494DF}">
               <a14:hiddenLine xmlns:a14="http://schemas.microsoft.com/office/drawing/2010/main" w="9525">
                 <a:solidFill>
                   <a:srgbClr val="000000"/>
@@ -8744,14 +8744,14 @@
           <a:noFill/>
           <a:ln/>
           <a:extLst>
-            <a:ext uri="{909E8E84-426E-40DD-AFC4-6F175D3DCCD1}">
+            <a:ext uri="{909E8E84-426E-40dd-AFC4-6F175D3DCCD1}">
               <a14:hiddenFill xmlns:a14="http://schemas.microsoft.com/office/drawing/2010/main">
                 <a:solidFill>
                   <a:srgbClr val="FFFFFF"/>
                 </a:solidFill>
               </a14:hiddenFill>
             </a:ext>
-            <a:ext uri="{91240B29-F687-4F45-9708-019B960494DF}">
+            <a:ext uri="{91240B29-F687-4f45-9708-019B960494DF}">
               <a14:hiddenLine xmlns:a14="http://schemas.microsoft.com/office/drawing/2010/main" w="9525">
                 <a:solidFill>
                   <a:srgbClr val="000000"/>
@@ -8787,14 +8787,14 @@
           <a:noFill/>
           <a:ln/>
           <a:extLst>
-            <a:ext uri="{909E8E84-426E-40DD-AFC4-6F175D3DCCD1}">
+            <a:ext uri="{909E8E84-426E-40dd-AFC4-6F175D3DCCD1}">
               <a14:hiddenFill xmlns:a14="http://schemas.microsoft.com/office/drawing/2010/main">
                 <a:solidFill>
                   <a:srgbClr val="FFFFFF"/>
                 </a:solidFill>
               </a14:hiddenFill>
             </a:ext>
-            <a:ext uri="{91240B29-F687-4F45-9708-019B960494DF}">
+            <a:ext uri="{91240B29-F687-4f45-9708-019B960494DF}">
               <a14:hiddenLine xmlns:a14="http://schemas.microsoft.com/office/drawing/2010/main" w="9525">
                 <a:solidFill>
                   <a:srgbClr val="000000"/>
@@ -8984,14 +8984,14 @@
           <a:noFill/>
           <a:ln/>
           <a:extLst>
-            <a:ext uri="{909E8E84-426E-40DD-AFC4-6F175D3DCCD1}">
+            <a:ext uri="{909E8E84-426E-40dd-AFC4-6F175D3DCCD1}">
               <a14:hiddenFill xmlns:a14="http://schemas.microsoft.com/office/drawing/2010/main">
                 <a:solidFill>
                   <a:srgbClr val="FFFFFF"/>
                 </a:solidFill>
               </a14:hiddenFill>
             </a:ext>
-            <a:ext uri="{91240B29-F687-4F45-9708-019B960494DF}">
+            <a:ext uri="{91240B29-F687-4f45-9708-019B960494DF}">
               <a14:hiddenLine xmlns:a14="http://schemas.microsoft.com/office/drawing/2010/main" w="9525">
                 <a:solidFill>
                   <a:srgbClr val="000000"/>
@@ -9027,14 +9027,14 @@
           <a:noFill/>
           <a:ln/>
           <a:extLst>
-            <a:ext uri="{909E8E84-426E-40DD-AFC4-6F175D3DCCD1}">
+            <a:ext uri="{909E8E84-426E-40dd-AFC4-6F175D3DCCD1}">
               <a14:hiddenFill xmlns:a14="http://schemas.microsoft.com/office/drawing/2010/main">
                 <a:solidFill>
                   <a:srgbClr val="FFFFFF"/>
                 </a:solidFill>
               </a14:hiddenFill>
             </a:ext>
-            <a:ext uri="{91240B29-F687-4F45-9708-019B960494DF}">
+            <a:ext uri="{91240B29-F687-4f45-9708-019B960494DF}">
               <a14:hiddenLine xmlns:a14="http://schemas.microsoft.com/office/drawing/2010/main" w="9525">
                 <a:solidFill>
                   <a:srgbClr val="000000"/>
@@ -9224,14 +9224,14 @@
           <a:noFill/>
           <a:ln/>
           <a:extLst>
-            <a:ext uri="{909E8E84-426E-40DD-AFC4-6F175D3DCCD1}">
+            <a:ext uri="{909E8E84-426E-40dd-AFC4-6F175D3DCCD1}">
               <a14:hiddenFill xmlns:a14="http://schemas.microsoft.com/office/drawing/2010/main">
                 <a:solidFill>
                   <a:srgbClr val="FFFFFF"/>
                 </a:solidFill>
               </a14:hiddenFill>
             </a:ext>
-            <a:ext uri="{91240B29-F687-4F45-9708-019B960494DF}">
+            <a:ext uri="{91240B29-F687-4f45-9708-019B960494DF}">
               <a14:hiddenLine xmlns:a14="http://schemas.microsoft.com/office/drawing/2010/main" w="9525">
                 <a:solidFill>
                   <a:srgbClr val="000000"/>
@@ -9267,14 +9267,14 @@
           <a:noFill/>
           <a:ln/>
           <a:extLst>
-            <a:ext uri="{909E8E84-426E-40DD-AFC4-6F175D3DCCD1}">
+            <a:ext uri="{909E8E84-426E-40dd-AFC4-6F175D3DCCD1}">
               <a14:hiddenFill xmlns:a14="http://schemas.microsoft.com/office/drawing/2010/main">
                 <a:solidFill>
                   <a:srgbClr val="FFFFFF"/>
                 </a:solidFill>
               </a14:hiddenFill>
             </a:ext>
-            <a:ext uri="{91240B29-F687-4F45-9708-019B960494DF}">
+            <a:ext uri="{91240B29-F687-4f45-9708-019B960494DF}">
               <a14:hiddenLine xmlns:a14="http://schemas.microsoft.com/office/drawing/2010/main" w="9525">
                 <a:solidFill>
                   <a:srgbClr val="000000"/>
@@ -9464,14 +9464,14 @@
           <a:noFill/>
           <a:ln/>
           <a:extLst>
-            <a:ext uri="{909E8E84-426E-40DD-AFC4-6F175D3DCCD1}">
+            <a:ext uri="{909E8E84-426E-40dd-AFC4-6F175D3DCCD1}">
               <a14:hiddenFill xmlns:a14="http://schemas.microsoft.com/office/drawing/2010/main">
                 <a:solidFill>
                   <a:srgbClr val="FFFFFF"/>
                 </a:solidFill>
               </a14:hiddenFill>
             </a:ext>
-            <a:ext uri="{91240B29-F687-4F45-9708-019B960494DF}">
+            <a:ext uri="{91240B29-F687-4f45-9708-019B960494DF}">
               <a14:hiddenLine xmlns:a14="http://schemas.microsoft.com/office/drawing/2010/main" w="9525">
                 <a:solidFill>
                   <a:srgbClr val="000000"/>
@@ -9507,14 +9507,14 @@
           <a:noFill/>
           <a:ln/>
           <a:extLst>
-            <a:ext uri="{909E8E84-426E-40DD-AFC4-6F175D3DCCD1}">
+            <a:ext uri="{909E8E84-426E-40dd-AFC4-6F175D3DCCD1}">
               <a14:hiddenFill xmlns:a14="http://schemas.microsoft.com/office/drawing/2010/main">
                 <a:solidFill>
                   <a:srgbClr val="FFFFFF"/>
                 </a:solidFill>
               </a14:hiddenFill>
             </a:ext>
-            <a:ext uri="{91240B29-F687-4F45-9708-019B960494DF}">
+            <a:ext uri="{91240B29-F687-4f45-9708-019B960494DF}">
               <a14:hiddenLine xmlns:a14="http://schemas.microsoft.com/office/drawing/2010/main" w="9525">
                 <a:solidFill>
                   <a:srgbClr val="000000"/>
@@ -11102,14 +11102,14 @@
             <a:noFill/>
           </a:ln>
           <a:extLst>
-            <a:ext uri="{909E8E84-426E-40DD-AFC4-6F175D3DCCD1}">
+            <a:ext uri="{909E8E84-426E-40dd-AFC4-6F175D3DCCD1}">
               <a14:hiddenFill xmlns:a14="http://schemas.microsoft.com/office/drawing/2010/main">
                 <a:solidFill>
                   <a:srgbClr val="FFFFFF"/>
                 </a:solidFill>
               </a14:hiddenFill>
             </a:ext>
-            <a:ext uri="{91240B29-F687-4F45-9708-019B960494DF}">
+            <a:ext uri="{91240B29-F687-4f45-9708-019B960494DF}">
               <a14:hiddenLine xmlns:a14="http://schemas.microsoft.com/office/drawing/2010/main" w="9525">
                 <a:solidFill>
                   <a:srgbClr val="000000"/>
@@ -11160,14 +11160,14 @@
             <a:noFill/>
           </a:ln>
           <a:extLst>
-            <a:ext uri="{909E8E84-426E-40DD-AFC4-6F175D3DCCD1}">
+            <a:ext uri="{909E8E84-426E-40dd-AFC4-6F175D3DCCD1}">
               <a14:hiddenFill xmlns:a14="http://schemas.microsoft.com/office/drawing/2010/main">
                 <a:solidFill>
                   <a:srgbClr val="FFFFFF"/>
                 </a:solidFill>
               </a14:hiddenFill>
             </a:ext>
-            <a:ext uri="{91240B29-F687-4F45-9708-019B960494DF}">
+            <a:ext uri="{91240B29-F687-4f45-9708-019B960494DF}">
               <a14:hiddenLine xmlns:a14="http://schemas.microsoft.com/office/drawing/2010/main" w="9525">
                 <a:solidFill>
                   <a:srgbClr val="000000"/>
@@ -11397,14 +11397,14 @@
             <a:noFill/>
           </a:ln>
           <a:extLst>
-            <a:ext uri="{909E8E84-426E-40DD-AFC4-6F175D3DCCD1}">
+            <a:ext uri="{909E8E84-426E-40dd-AFC4-6F175D3DCCD1}">
               <a14:hiddenFill xmlns:a14="http://schemas.microsoft.com/office/drawing/2010/main">
                 <a:solidFill>
                   <a:srgbClr val="FFFFFF"/>
                 </a:solidFill>
               </a14:hiddenFill>
             </a:ext>
-            <a:ext uri="{91240B29-F687-4F45-9708-019B960494DF}">
+            <a:ext uri="{91240B29-F687-4f45-9708-019B960494DF}">
               <a14:hiddenLine xmlns:a14="http://schemas.microsoft.com/office/drawing/2010/main" w="9525">
                 <a:solidFill>
                   <a:srgbClr val="000000"/>
@@ -11884,31 +11884,31 @@
           <a:p>
             <a:pPr algn="ctr" eaLnBrk="1" hangingPunct="1"/>
             <a:r>
-              <a:rPr lang="en-US" altLang="zh-Hans" dirty="0">
+              <a:rPr lang="en-US" altLang="zh-CHS" dirty="0">
                 <a:ea typeface="ＭＳ Ｐゴシック" charset="-128"/>
               </a:rPr>
               <a:t>Lecture</a:t>
             </a:r>
             <a:r>
-              <a:rPr lang="zh-Hans" altLang="en-US" dirty="0">
+              <a:rPr lang="zh-CHS" altLang="en-US" dirty="0">
                 <a:ea typeface="ＭＳ Ｐゴシック" charset="-128"/>
               </a:rPr>
               <a:t> </a:t>
             </a:r>
             <a:r>
-              <a:rPr lang="en-US" altLang="zh-Hans" dirty="0">
+              <a:rPr lang="en-US" altLang="zh-CHS" dirty="0">
                 <a:ea typeface="ＭＳ Ｐゴシック" charset="-128"/>
               </a:rPr>
               <a:t>6.2</a:t>
             </a:r>
             <a:r>
-              <a:rPr lang="zh-Hans" altLang="en-US" dirty="0">
+              <a:rPr lang="zh-CHS" altLang="en-US" dirty="0">
                 <a:ea typeface="ＭＳ Ｐゴシック" charset="-128"/>
               </a:rPr>
               <a:t> </a:t>
             </a:r>
             <a:r>
-              <a:rPr lang="en-US" altLang="zh-Hans" dirty="0">
+              <a:rPr lang="en-US" altLang="zh-CHS" dirty="0">
                 <a:ea typeface="ＭＳ Ｐゴシック" charset="-128"/>
               </a:rPr>
               <a:t>Correlation</a:t>
@@ -11945,21 +11945,21 @@
               <a:defRPr/>
             </a:pPr>
             <a:r>
-              <a:rPr lang="en-US" altLang="zh-Hans" dirty="0">
+              <a:rPr lang="en-US" altLang="zh-CHS" dirty="0">
                 <a:ea typeface="ＭＳ Ｐゴシック" pitchFamily="-111" charset="-128"/>
                 <a:cs typeface="+mn-cs"/>
               </a:rPr>
               <a:t>Jibo</a:t>
             </a:r>
             <a:r>
-              <a:rPr lang="zh-Hans" altLang="en-US" dirty="0">
+              <a:rPr lang="zh-CHS" altLang="en-US" dirty="0">
                 <a:ea typeface="ＭＳ Ｐゴシック" pitchFamily="-111" charset="-128"/>
                 <a:cs typeface="+mn-cs"/>
               </a:rPr>
               <a:t> </a:t>
             </a:r>
             <a:r>
-              <a:rPr lang="en-US" altLang="zh-Hans" dirty="0">
+              <a:rPr lang="en-US" altLang="zh-CHS" dirty="0">
                 <a:ea typeface="ＭＳ Ｐゴシック" pitchFamily="-111" charset="-128"/>
                 <a:cs typeface="+mn-cs"/>
               </a:rPr>
@@ -11973,21 +11973,21 @@
               <a:defRPr/>
             </a:pPr>
             <a:r>
-              <a:rPr lang="en-US" altLang="zh-Hans" dirty="0">
+              <a:rPr lang="en-US" altLang="zh-CHS" dirty="0">
                 <a:ea typeface="ＭＳ Ｐゴシック" pitchFamily="-111" charset="-128"/>
                 <a:cs typeface="+mn-cs"/>
               </a:rPr>
               <a:t>Associate</a:t>
             </a:r>
             <a:r>
-              <a:rPr lang="zh-Hans" altLang="en-US" dirty="0">
+              <a:rPr lang="zh-CHS" altLang="en-US" dirty="0">
                 <a:ea typeface="ＭＳ Ｐゴシック" pitchFamily="-111" charset="-128"/>
                 <a:cs typeface="+mn-cs"/>
               </a:rPr>
               <a:t> </a:t>
             </a:r>
             <a:r>
-              <a:rPr lang="en-US" altLang="zh-Hans" dirty="0">
+              <a:rPr lang="en-US" altLang="zh-CHS" dirty="0">
                 <a:ea typeface="ＭＳ Ｐゴシック" pitchFamily="-111" charset="-128"/>
                 <a:cs typeface="+mn-cs"/>
               </a:rPr>
@@ -12001,35 +12001,35 @@
               <a:defRPr/>
             </a:pPr>
             <a:r>
-              <a:rPr lang="en-US" altLang="zh-Hans" dirty="0">
+              <a:rPr lang="en-US" altLang="zh-CHS" dirty="0">
                 <a:ea typeface="ＭＳ Ｐゴシック" pitchFamily="-111" charset="-128"/>
                 <a:cs typeface="+mn-cs"/>
               </a:rPr>
               <a:t>Wichita</a:t>
             </a:r>
             <a:r>
-              <a:rPr lang="zh-Hans" altLang="en-US" dirty="0">
+              <a:rPr lang="zh-CHS" altLang="en-US" dirty="0">
                 <a:ea typeface="ＭＳ Ｐゴシック" pitchFamily="-111" charset="-128"/>
                 <a:cs typeface="+mn-cs"/>
               </a:rPr>
               <a:t> </a:t>
             </a:r>
             <a:r>
-              <a:rPr lang="en-US" altLang="zh-Hans" dirty="0">
+              <a:rPr lang="en-US" altLang="zh-CHS" dirty="0">
                 <a:ea typeface="ＭＳ Ｐゴシック" pitchFamily="-111" charset="-128"/>
                 <a:cs typeface="+mn-cs"/>
               </a:rPr>
               <a:t>State</a:t>
             </a:r>
             <a:r>
-              <a:rPr lang="zh-Hans" altLang="en-US" dirty="0">
+              <a:rPr lang="zh-CHS" altLang="en-US" dirty="0">
                 <a:ea typeface="ＭＳ Ｐゴシック" pitchFamily="-111" charset="-128"/>
                 <a:cs typeface="+mn-cs"/>
               </a:rPr>
               <a:t> </a:t>
             </a:r>
             <a:r>
-              <a:rPr lang="en-US" altLang="zh-Hans" dirty="0">
+              <a:rPr lang="en-US" altLang="zh-CHS" dirty="0">
                 <a:ea typeface="ＭＳ Ｐゴシック" pitchFamily="-111" charset="-128"/>
                 <a:cs typeface="+mn-cs"/>
               </a:rPr>
@@ -12043,7 +12043,7 @@
               <a:defRPr/>
             </a:pPr>
             <a:r>
-              <a:rPr lang="en-US" altLang="zh-Hans" dirty="0" err="1">
+              <a:rPr lang="en-US" altLang="zh-CHS" dirty="0" err="1">
                 <a:ea typeface="ＭＳ Ｐゴシック" pitchFamily="-111" charset="-128"/>
                 <a:cs typeface="+mn-cs"/>
               </a:rPr>
@@ -12069,14 +12069,14 @@
         <p:spPr bwMode="auto">
           <a:noFill/>
           <a:extLst>
-            <a:ext uri="{909E8E84-426E-40DD-AFC4-6F175D3DCCD1}">
+            <a:ext uri="{909E8E84-426E-40dd-AFC4-6F175D3DCCD1}">
               <a14:hiddenFill xmlns:a14="http://schemas.microsoft.com/office/drawing/2010/main">
                 <a:solidFill>
                   <a:srgbClr val="FFFFFF"/>
                 </a:solidFill>
               </a14:hiddenFill>
             </a:ext>
-            <a:ext uri="{91240B29-F687-4F45-9708-019B960494DF}">
+            <a:ext uri="{91240B29-F687-4f45-9708-019B960494DF}">
               <a14:hiddenLine xmlns:a14="http://schemas.microsoft.com/office/drawing/2010/main" w="9525">
                 <a:solidFill>
                   <a:srgbClr val="000000"/>
@@ -12411,14 +12411,14 @@
         <p:spPr bwMode="auto">
           <a:noFill/>
           <a:extLst>
-            <a:ext uri="{909E8E84-426E-40DD-AFC4-6F175D3DCCD1}">
+            <a:ext uri="{909E8E84-426E-40dd-AFC4-6F175D3DCCD1}">
               <a14:hiddenFill xmlns:a14="http://schemas.microsoft.com/office/drawing/2010/main">
                 <a:solidFill>
                   <a:srgbClr val="FFFFFF"/>
                 </a:solidFill>
               </a14:hiddenFill>
             </a:ext>
-            <a:ext uri="{91240B29-F687-4F45-9708-019B960494DF}">
+            <a:ext uri="{91240B29-F687-4f45-9708-019B960494DF}">
               <a14:hiddenLine xmlns:a14="http://schemas.microsoft.com/office/drawing/2010/main" w="9525">
                 <a:solidFill>
                   <a:srgbClr val="000000"/>
@@ -12580,7 +12580,7 @@
           <a:graphicData uri="http://schemas.openxmlformats.org/presentationml/2006/ole">
             <mc:AlternateContent xmlns:mc="http://schemas.openxmlformats.org/markup-compatibility/2006">
               <mc:Choice xmlns:v="urn:schemas-microsoft-com:vml" Requires="v">
-                <p:oleObj spid="_x0000_s5259" name="Equation" r:id="rId4" imgW="127000" imgH="203200" progId="Equation.DSMT4">
+                <p:oleObj spid="_x0000_s5268" name="Equation" r:id="rId4" imgW="127000" imgH="203200" progId="Equation.DSMT4">
                   <p:embed/>
                 </p:oleObj>
               </mc:Choice>
@@ -12637,7 +12637,7 @@
           <a:graphicData uri="http://schemas.openxmlformats.org/presentationml/2006/ole">
             <mc:AlternateContent xmlns:mc="http://schemas.openxmlformats.org/markup-compatibility/2006">
               <mc:Choice xmlns:v="urn:schemas-microsoft-com:vml" Requires="v">
-                <p:oleObj spid="_x0000_s5260" name="Equation" r:id="rId6" imgW="736600" imgH="431800" progId="Equation.DSMT4">
+                <p:oleObj spid="_x0000_s5269" name="Equation" r:id="rId6" imgW="736600" imgH="431800" progId="Equation.DSMT4">
                   <p:embed/>
                 </p:oleObj>
               </mc:Choice>
@@ -12794,14 +12794,14 @@
         <p:spPr bwMode="auto">
           <a:noFill/>
           <a:extLst>
-            <a:ext uri="{909E8E84-426E-40DD-AFC4-6F175D3DCCD1}">
+            <a:ext uri="{909E8E84-426E-40dd-AFC4-6F175D3DCCD1}">
               <a14:hiddenFill xmlns:a14="http://schemas.microsoft.com/office/drawing/2010/main">
                 <a:solidFill>
                   <a:srgbClr val="FFFFFF"/>
                 </a:solidFill>
               </a14:hiddenFill>
             </a:ext>
-            <a:ext uri="{91240B29-F687-4F45-9708-019B960494DF}">
+            <a:ext uri="{91240B29-F687-4f45-9708-019B960494DF}">
               <a14:hiddenLine xmlns:a14="http://schemas.microsoft.com/office/drawing/2010/main" w="9525">
                 <a:solidFill>
                   <a:srgbClr val="000000"/>
@@ -13015,14 +13015,14 @@
         <p:spPr bwMode="auto">
           <a:noFill/>
           <a:extLst>
-            <a:ext uri="{909E8E84-426E-40DD-AFC4-6F175D3DCCD1}">
+            <a:ext uri="{909E8E84-426E-40dd-AFC4-6F175D3DCCD1}">
               <a14:hiddenFill xmlns:a14="http://schemas.microsoft.com/office/drawing/2010/main">
                 <a:solidFill>
                   <a:srgbClr val="FFFFFF"/>
                 </a:solidFill>
               </a14:hiddenFill>
             </a:ext>
-            <a:ext uri="{91240B29-F687-4F45-9708-019B960494DF}">
+            <a:ext uri="{91240B29-F687-4f45-9708-019B960494DF}">
               <a14:hiddenLine xmlns:a14="http://schemas.microsoft.com/office/drawing/2010/main" w="9525">
                 <a:solidFill>
                   <a:srgbClr val="000000"/>
@@ -13196,14 +13196,14 @@
             <a:noFill/>
           </a:ln>
           <a:extLst>
-            <a:ext uri="{909E8E84-426E-40DD-AFC4-6F175D3DCCD1}">
+            <a:ext uri="{909E8E84-426E-40dd-AFC4-6F175D3DCCD1}">
               <a14:hiddenFill xmlns:a14="http://schemas.microsoft.com/office/drawing/2010/main">
                 <a:solidFill>
                   <a:schemeClr val="accent1"/>
                 </a:solidFill>
               </a14:hiddenFill>
             </a:ext>
-            <a:ext uri="{91240B29-F687-4F45-9708-019B960494DF}">
+            <a:ext uri="{91240B29-F687-4f45-9708-019B960494DF}">
               <a14:hiddenLine xmlns:a14="http://schemas.microsoft.com/office/drawing/2010/main" w="9525">
                 <a:solidFill>
                   <a:schemeClr val="tx1"/>
@@ -13269,7 +13269,7 @@
               <a:t>Example </a:t>
             </a:r>
             <a:r>
-              <a:rPr lang="en-US" altLang="zh-Hans" sz="2800" dirty="0">
+              <a:rPr lang="en-US" altLang="zh-CHS" sz="2800" dirty="0">
                 <a:ea typeface="ＭＳ Ｐゴシック" charset="-128"/>
               </a:rPr>
               <a:t>6</a:t>
@@ -13307,14 +13307,14 @@
         <p:spPr bwMode="auto">
           <a:noFill/>
           <a:extLst>
-            <a:ext uri="{909E8E84-426E-40DD-AFC4-6F175D3DCCD1}">
+            <a:ext uri="{909E8E84-426E-40dd-AFC4-6F175D3DCCD1}">
               <a14:hiddenFill xmlns:a14="http://schemas.microsoft.com/office/drawing/2010/main">
                 <a:solidFill>
                   <a:srgbClr val="FFFFFF"/>
                 </a:solidFill>
               </a14:hiddenFill>
             </a:ext>
-            <a:ext uri="{91240B29-F687-4F45-9708-019B960494DF}">
+            <a:ext uri="{91240B29-F687-4f45-9708-019B960494DF}">
               <a14:hiddenLine xmlns:a14="http://schemas.microsoft.com/office/drawing/2010/main" w="9525">
                 <a:solidFill>
                   <a:srgbClr val="000000"/>
@@ -13475,14 +13475,14 @@
             <a:noFill/>
           </a:ln>
           <a:extLst>
-            <a:ext uri="{909E8E84-426E-40DD-AFC4-6F175D3DCCD1}">
+            <a:ext uri="{909E8E84-426E-40dd-AFC4-6F175D3DCCD1}">
               <a14:hiddenFill xmlns:a14="http://schemas.microsoft.com/office/drawing/2010/main">
                 <a:solidFill>
                   <a:srgbClr val="FFFFFF"/>
                 </a:solidFill>
               </a14:hiddenFill>
             </a:ext>
-            <a:ext uri="{91240B29-F687-4F45-9708-019B960494DF}">
+            <a:ext uri="{91240B29-F687-4f45-9708-019B960494DF}">
               <a14:hiddenLine xmlns:a14="http://schemas.microsoft.com/office/drawing/2010/main" w="9525">
                 <a:solidFill>
                   <a:srgbClr val="000000"/>
@@ -13685,14 +13685,14 @@
             <a:noFill/>
           </a:ln>
           <a:extLst>
-            <a:ext uri="{909E8E84-426E-40DD-AFC4-6F175D3DCCD1}">
+            <a:ext uri="{909E8E84-426E-40dd-AFC4-6F175D3DCCD1}">
               <a14:hiddenFill xmlns:a14="http://schemas.microsoft.com/office/drawing/2010/main">
                 <a:solidFill>
                   <a:schemeClr val="accent1"/>
                 </a:solidFill>
               </a14:hiddenFill>
             </a:ext>
-            <a:ext uri="{91240B29-F687-4F45-9708-019B960494DF}">
+            <a:ext uri="{91240B29-F687-4f45-9708-019B960494DF}">
               <a14:hiddenLine xmlns:a14="http://schemas.microsoft.com/office/drawing/2010/main" w="9525">
                 <a:solidFill>
                   <a:schemeClr val="tx1"/>
@@ -13758,7 +13758,7 @@
               <a:t>Example </a:t>
             </a:r>
             <a:r>
-              <a:rPr lang="en-US" altLang="zh-Hans" sz="2800" dirty="0">
+              <a:rPr lang="en-US" altLang="zh-CHS" sz="2800" dirty="0">
                 <a:ea typeface="ＭＳ Ｐゴシック" charset="-128"/>
               </a:rPr>
               <a:t>6</a:t>
@@ -13924,14 +13924,14 @@
         <p:spPr bwMode="auto">
           <a:noFill/>
           <a:extLst>
-            <a:ext uri="{909E8E84-426E-40DD-AFC4-6F175D3DCCD1}">
+            <a:ext uri="{909E8E84-426E-40dd-AFC4-6F175D3DCCD1}">
               <a14:hiddenFill xmlns:a14="http://schemas.microsoft.com/office/drawing/2010/main">
                 <a:solidFill>
                   <a:srgbClr val="FFFFFF"/>
                 </a:solidFill>
               </a14:hiddenFill>
             </a:ext>
-            <a:ext uri="{91240B29-F687-4F45-9708-019B960494DF}">
+            <a:ext uri="{91240B29-F687-4f45-9708-019B960494DF}">
               <a14:hiddenLine xmlns:a14="http://schemas.microsoft.com/office/drawing/2010/main" w="9525">
                 <a:solidFill>
                   <a:srgbClr val="000000"/>
@@ -14093,7 +14093,7 @@
           <a:graphicData uri="http://schemas.openxmlformats.org/presentationml/2006/ole">
             <mc:AlternateContent xmlns:mc="http://schemas.openxmlformats.org/markup-compatibility/2006">
               <mc:Choice xmlns:v="urn:schemas-microsoft-com:vml" Requires="v">
-                <p:oleObj spid="_x0000_s6215" name="Equation" r:id="rId4" imgW="1993900" imgH="431800" progId="Equation.DSMT4">
+                <p:oleObj spid="_x0000_s6220" name="Equation" r:id="rId4" imgW="1993900" imgH="431800" progId="Equation.DSMT4">
                   <p:embed/>
                 </p:oleObj>
               </mc:Choice>
@@ -14303,7 +14303,7 @@
               <a:t>In Example </a:t>
             </a:r>
             <a:r>
-              <a:rPr lang="en-US" altLang="zh-Hans" sz="2200" dirty="0">
+              <a:rPr lang="en-US" altLang="zh-CHS" sz="2200" dirty="0">
                 <a:ea typeface="ＭＳ Ｐゴシック" charset="-128"/>
               </a:rPr>
               <a:t>6</a:t>
@@ -14353,14 +14353,14 @@
         <p:spPr bwMode="auto">
           <a:noFill/>
           <a:extLst>
-            <a:ext uri="{909E8E84-426E-40DD-AFC4-6F175D3DCCD1}">
+            <a:ext uri="{909E8E84-426E-40dd-AFC4-6F175D3DCCD1}">
               <a14:hiddenFill xmlns:a14="http://schemas.microsoft.com/office/drawing/2010/main">
                 <a:solidFill>
                   <a:srgbClr val="FFFFFF"/>
                 </a:solidFill>
               </a14:hiddenFill>
             </a:ext>
-            <a:ext uri="{91240B29-F687-4F45-9708-019B960494DF}">
+            <a:ext uri="{91240B29-F687-4f45-9708-019B960494DF}">
               <a14:hiddenLine xmlns:a14="http://schemas.microsoft.com/office/drawing/2010/main" w="9525">
                 <a:solidFill>
                   <a:srgbClr val="000000"/>
@@ -14522,7 +14522,7 @@
           <a:graphicData uri="http://schemas.openxmlformats.org/presentationml/2006/ole">
             <mc:AlternateContent xmlns:mc="http://schemas.openxmlformats.org/markup-compatibility/2006">
               <mc:Choice xmlns:v="urn:schemas-microsoft-com:vml" Requires="v">
-                <p:oleObj spid="_x0000_s14402" name="Equation" r:id="rId4" imgW="1181100" imgH="215900" progId="Equation.DSMT4">
+                <p:oleObj spid="_x0000_s14407" name="Equation" r:id="rId4" imgW="1181100" imgH="215900" progId="Equation.DSMT4">
                   <p:embed/>
                 </p:oleObj>
               </mc:Choice>
@@ -14737,7 +14737,7 @@
               <a:t>for Example </a:t>
             </a:r>
             <a:r>
-              <a:rPr lang="en-US" altLang="zh-Hans" sz="1600" dirty="0"/>
+              <a:rPr lang="en-US" altLang="zh-CHS" sz="1600" dirty="0"/>
               <a:t>6</a:t>
             </a:r>
             <a:r>
@@ -14775,14 +14775,14 @@
             <a:noFill/>
           </a:ln>
           <a:extLst>
-            <a:ext uri="{909E8E84-426E-40DD-AFC4-6F175D3DCCD1}">
+            <a:ext uri="{909E8E84-426E-40dd-AFC4-6F175D3DCCD1}">
               <a14:hiddenFill xmlns:a14="http://schemas.microsoft.com/office/drawing/2010/main">
                 <a:solidFill>
                   <a:srgbClr val="FFFFFF"/>
                 </a:solidFill>
               </a14:hiddenFill>
             </a:ext>
-            <a:ext uri="{91240B29-F687-4F45-9708-019B960494DF}">
+            <a:ext uri="{91240B29-F687-4f45-9708-019B960494DF}">
               <a14:hiddenLine xmlns:a14="http://schemas.microsoft.com/office/drawing/2010/main" w="9525">
                 <a:solidFill>
                   <a:srgbClr val="000000"/>
@@ -15073,14 +15073,14 @@
         <p:spPr bwMode="auto">
           <a:noFill/>
           <a:extLst>
-            <a:ext uri="{909E8E84-426E-40DD-AFC4-6F175D3DCCD1}">
+            <a:ext uri="{909E8E84-426E-40dd-AFC4-6F175D3DCCD1}">
               <a14:hiddenFill xmlns:a14="http://schemas.microsoft.com/office/drawing/2010/main">
                 <a:solidFill>
                   <a:srgbClr val="FFFFFF"/>
                 </a:solidFill>
               </a14:hiddenFill>
             </a:ext>
-            <a:ext uri="{91240B29-F687-4F45-9708-019B960494DF}">
+            <a:ext uri="{91240B29-F687-4f45-9708-019B960494DF}">
               <a14:hiddenLine xmlns:a14="http://schemas.microsoft.com/office/drawing/2010/main" w="9525">
                 <a:solidFill>
                   <a:srgbClr val="000000"/>
@@ -15242,7 +15242,7 @@
           <a:graphicData uri="http://schemas.openxmlformats.org/presentationml/2006/ole">
             <mc:AlternateContent xmlns:mc="http://schemas.openxmlformats.org/markup-compatibility/2006">
               <mc:Choice xmlns:v="urn:schemas-microsoft-com:vml" Requires="v">
-                <p:oleObj spid="_x0000_s15621" name="Equation" r:id="rId4" imgW="546100" imgH="215900" progId="Equation.DSMT4">
+                <p:oleObj spid="_x0000_s15638" name="Equation" r:id="rId4" imgW="546100" imgH="215900" progId="Equation.DSMT4">
                   <p:embed/>
                 </p:oleObj>
               </mc:Choice>
@@ -15299,7 +15299,7 @@
           <a:graphicData uri="http://schemas.openxmlformats.org/presentationml/2006/ole">
             <mc:AlternateContent xmlns:mc="http://schemas.openxmlformats.org/markup-compatibility/2006">
               <mc:Choice xmlns:v="urn:schemas-microsoft-com:vml" Requires="v">
-                <p:oleObj spid="_x0000_s15622" name="Equation" r:id="rId6" imgW="533400" imgH="215900" progId="Equation.DSMT4">
+                <p:oleObj spid="_x0000_s15639" name="Equation" r:id="rId6" imgW="533400" imgH="215900" progId="Equation.DSMT4">
                   <p:embed/>
                 </p:oleObj>
               </mc:Choice>
@@ -15356,7 +15356,7 @@
           <a:graphicData uri="http://schemas.openxmlformats.org/presentationml/2006/ole">
             <mc:AlternateContent xmlns:mc="http://schemas.openxmlformats.org/markup-compatibility/2006">
               <mc:Choice xmlns:v="urn:schemas-microsoft-com:vml" Requires="v">
-                <p:oleObj spid="_x0000_s15623" name="Equation" r:id="rId8" imgW="584200" imgH="152400" progId="Equation.DSMT4">
+                <p:oleObj spid="_x0000_s15640" name="Equation" r:id="rId8" imgW="584200" imgH="152400" progId="Equation.DSMT4">
                   <p:embed/>
                 </p:oleObj>
               </mc:Choice>
@@ -15413,7 +15413,7 @@
           <a:graphicData uri="http://schemas.openxmlformats.org/presentationml/2006/ole">
             <mc:AlternateContent xmlns:mc="http://schemas.openxmlformats.org/markup-compatibility/2006">
               <mc:Choice xmlns:v="urn:schemas-microsoft-com:vml" Requires="v">
-                <p:oleObj spid="_x0000_s15624" name="Equation" r:id="rId10" imgW="584200" imgH="152400" progId="Equation.DSMT4">
+                <p:oleObj spid="_x0000_s15641" name="Equation" r:id="rId10" imgW="584200" imgH="152400" progId="Equation.DSMT4">
                   <p:embed/>
                 </p:oleObj>
               </mc:Choice>
@@ -15593,14 +15593,14 @@
         <p:spPr bwMode="auto">
           <a:noFill/>
           <a:extLst>
-            <a:ext uri="{909E8E84-426E-40DD-AFC4-6F175D3DCCD1}">
+            <a:ext uri="{909E8E84-426E-40dd-AFC4-6F175D3DCCD1}">
               <a14:hiddenFill xmlns:a14="http://schemas.microsoft.com/office/drawing/2010/main">
                 <a:solidFill>
                   <a:srgbClr val="FFFFFF"/>
                 </a:solidFill>
               </a14:hiddenFill>
             </a:ext>
-            <a:ext uri="{91240B29-F687-4F45-9708-019B960494DF}">
+            <a:ext uri="{91240B29-F687-4f45-9708-019B960494DF}">
               <a14:hiddenLine xmlns:a14="http://schemas.microsoft.com/office/drawing/2010/main" w="9525">
                 <a:solidFill>
                   <a:srgbClr val="000000"/>
@@ -15761,14 +15761,14 @@
             <a:noFill/>
           </a:ln>
           <a:extLst>
-            <a:ext uri="{909E8E84-426E-40DD-AFC4-6F175D3DCCD1}">
+            <a:ext uri="{909E8E84-426E-40dd-AFC4-6F175D3DCCD1}">
               <a14:hiddenFill xmlns:a14="http://schemas.microsoft.com/office/drawing/2010/main">
                 <a:solidFill>
                   <a:srgbClr val="FFFFFF"/>
                 </a:solidFill>
               </a14:hiddenFill>
             </a:ext>
-            <a:ext uri="{91240B29-F687-4F45-9708-019B960494DF}">
+            <a:ext uri="{91240B29-F687-4f45-9708-019B960494DF}">
               <a14:hiddenLine xmlns:a14="http://schemas.microsoft.com/office/drawing/2010/main" w="9525">
                 <a:solidFill>
                   <a:srgbClr val="000000"/>
@@ -15996,14 +15996,14 @@
             <a:noFill/>
           </a:ln>
           <a:extLst>
-            <a:ext uri="{909E8E84-426E-40DD-AFC4-6F175D3DCCD1}">
+            <a:ext uri="{909E8E84-426E-40dd-AFC4-6F175D3DCCD1}">
               <a14:hiddenFill xmlns:a14="http://schemas.microsoft.com/office/drawing/2010/main">
                 <a:solidFill>
                   <a:schemeClr val="accent1"/>
                 </a:solidFill>
               </a14:hiddenFill>
             </a:ext>
-            <a:ext uri="{91240B29-F687-4F45-9708-019B960494DF}">
+            <a:ext uri="{91240B29-F687-4f45-9708-019B960494DF}">
               <a14:hiddenLine xmlns:a14="http://schemas.microsoft.com/office/drawing/2010/main" w="9525">
                 <a:solidFill>
                   <a:schemeClr val="tx1"/>
@@ -16233,14 +16233,14 @@
         <p:spPr bwMode="auto">
           <a:noFill/>
           <a:extLst>
-            <a:ext uri="{909E8E84-426E-40DD-AFC4-6F175D3DCCD1}">
+            <a:ext uri="{909E8E84-426E-40dd-AFC4-6F175D3DCCD1}">
               <a14:hiddenFill xmlns:a14="http://schemas.microsoft.com/office/drawing/2010/main">
                 <a:solidFill>
                   <a:srgbClr val="FFFFFF"/>
                 </a:solidFill>
               </a14:hiddenFill>
             </a:ext>
-            <a:ext uri="{91240B29-F687-4F45-9708-019B960494DF}">
+            <a:ext uri="{91240B29-F687-4f45-9708-019B960494DF}">
               <a14:hiddenLine xmlns:a14="http://schemas.microsoft.com/office/drawing/2010/main" w="9525">
                 <a:solidFill>
                   <a:srgbClr val="000000"/>
@@ -16414,14 +16414,14 @@
             <a:noFill/>
           </a:ln>
           <a:extLst>
-            <a:ext uri="{909E8E84-426E-40DD-AFC4-6F175D3DCCD1}">
+            <a:ext uri="{909E8E84-426E-40dd-AFC4-6F175D3DCCD1}">
               <a14:hiddenFill xmlns:a14="http://schemas.microsoft.com/office/drawing/2010/main">
                 <a:solidFill>
                   <a:schemeClr val="accent1"/>
                 </a:solidFill>
               </a14:hiddenFill>
             </a:ext>
-            <a:ext uri="{91240B29-F687-4F45-9708-019B960494DF}">
+            <a:ext uri="{91240B29-F687-4f45-9708-019B960494DF}">
               <a14:hiddenLine xmlns:a14="http://schemas.microsoft.com/office/drawing/2010/main" w="9525">
                 <a:solidFill>
                   <a:schemeClr val="tx1"/>
@@ -16439,6 +16439,13 @@
   <p:clrMapOvr>
     <a:masterClrMapping/>
   </p:clrMapOvr>
+  <p:timing>
+    <p:tnLst>
+      <p:par>
+        <p:cTn xmlns:p14="http://schemas.microsoft.com/office/powerpoint/2010/main" id="1" dur="indefinite" restart="never" nodeType="tmRoot"/>
+      </p:par>
+    </p:tnLst>
+  </p:timing>
 </p:sld>
 </file>
 
@@ -16599,14 +16606,14 @@
         <p:spPr bwMode="auto">
           <a:noFill/>
           <a:extLst>
-            <a:ext uri="{909E8E84-426E-40DD-AFC4-6F175D3DCCD1}">
+            <a:ext uri="{909E8E84-426E-40dd-AFC4-6F175D3DCCD1}">
               <a14:hiddenFill xmlns:a14="http://schemas.microsoft.com/office/drawing/2010/main">
                 <a:solidFill>
                   <a:srgbClr val="FFFFFF"/>
                 </a:solidFill>
               </a14:hiddenFill>
             </a:ext>
-            <a:ext uri="{91240B29-F687-4F45-9708-019B960494DF}">
+            <a:ext uri="{91240B29-F687-4f45-9708-019B960494DF}">
               <a14:hiddenLine xmlns:a14="http://schemas.microsoft.com/office/drawing/2010/main" w="9525">
                 <a:solidFill>
                   <a:srgbClr val="000000"/>
@@ -16780,14 +16787,14 @@
             <a:noFill/>
           </a:ln>
           <a:extLst>
-            <a:ext uri="{909E8E84-426E-40DD-AFC4-6F175D3DCCD1}">
+            <a:ext uri="{909E8E84-426E-40dd-AFC4-6F175D3DCCD1}">
               <a14:hiddenFill xmlns:a14="http://schemas.microsoft.com/office/drawing/2010/main">
                 <a:solidFill>
                   <a:schemeClr val="accent1"/>
                 </a:solidFill>
               </a14:hiddenFill>
             </a:ext>
-            <a:ext uri="{91240B29-F687-4F45-9708-019B960494DF}">
+            <a:ext uri="{91240B29-F687-4f45-9708-019B960494DF}">
               <a14:hiddenLine xmlns:a14="http://schemas.microsoft.com/office/drawing/2010/main" w="9525">
                 <a:solidFill>
                   <a:schemeClr val="tx1"/>
@@ -16805,6 +16812,13 @@
   <p:clrMapOvr>
     <a:masterClrMapping/>
   </p:clrMapOvr>
+  <p:timing>
+    <p:tnLst>
+      <p:par>
+        <p:cTn xmlns:p14="http://schemas.microsoft.com/office/powerpoint/2010/main" id="1" dur="indefinite" restart="never" nodeType="tmRoot"/>
+      </p:par>
+    </p:tnLst>
+  </p:timing>
 </p:sld>
 </file>
 
@@ -17031,14 +17045,14 @@
         <p:spPr bwMode="auto">
           <a:noFill/>
           <a:extLst>
-            <a:ext uri="{909E8E84-426E-40DD-AFC4-6F175D3DCCD1}">
+            <a:ext uri="{909E8E84-426E-40dd-AFC4-6F175D3DCCD1}">
               <a14:hiddenFill xmlns:a14="http://schemas.microsoft.com/office/drawing/2010/main">
                 <a:solidFill>
                   <a:srgbClr val="FFFFFF"/>
                 </a:solidFill>
               </a14:hiddenFill>
             </a:ext>
-            <a:ext uri="{91240B29-F687-4F45-9708-019B960494DF}">
+            <a:ext uri="{91240B29-F687-4f45-9708-019B960494DF}">
               <a14:hiddenLine xmlns:a14="http://schemas.microsoft.com/office/drawing/2010/main" w="9525">
                 <a:solidFill>
                   <a:srgbClr val="000000"/>
@@ -17293,14 +17307,14 @@
         <p:spPr bwMode="auto">
           <a:noFill/>
           <a:extLst>
-            <a:ext uri="{909E8E84-426E-40DD-AFC4-6F175D3DCCD1}">
+            <a:ext uri="{909E8E84-426E-40dd-AFC4-6F175D3DCCD1}">
               <a14:hiddenFill xmlns:a14="http://schemas.microsoft.com/office/drawing/2010/main">
                 <a:solidFill>
                   <a:srgbClr val="FFFFFF"/>
                 </a:solidFill>
               </a14:hiddenFill>
             </a:ext>
-            <a:ext uri="{91240B29-F687-4F45-9708-019B960494DF}">
+            <a:ext uri="{91240B29-F687-4f45-9708-019B960494DF}">
               <a14:hiddenLine xmlns:a14="http://schemas.microsoft.com/office/drawing/2010/main" w="9525">
                 <a:solidFill>
                   <a:srgbClr val="000000"/>
@@ -17474,14 +17488,14 @@
             <a:noFill/>
           </a:ln>
           <a:extLst>
-            <a:ext uri="{909E8E84-426E-40DD-AFC4-6F175D3DCCD1}">
+            <a:ext uri="{909E8E84-426E-40dd-AFC4-6F175D3DCCD1}">
               <a14:hiddenFill xmlns:a14="http://schemas.microsoft.com/office/drawing/2010/main">
                 <a:solidFill>
                   <a:schemeClr val="accent1"/>
                 </a:solidFill>
               </a14:hiddenFill>
             </a:ext>
-            <a:ext uri="{91240B29-F687-4F45-9708-019B960494DF}">
+            <a:ext uri="{91240B29-F687-4f45-9708-019B960494DF}">
               <a14:hiddenLine xmlns:a14="http://schemas.microsoft.com/office/drawing/2010/main" w="9525">
                 <a:solidFill>
                   <a:schemeClr val="tx1"/>
@@ -17499,6 +17513,13 @@
   <p:clrMapOvr>
     <a:masterClrMapping/>
   </p:clrMapOvr>
+  <p:timing>
+    <p:tnLst>
+      <p:par>
+        <p:cTn xmlns:p14="http://schemas.microsoft.com/office/powerpoint/2010/main" id="1" dur="indefinite" restart="never" nodeType="tmRoot"/>
+      </p:par>
+    </p:tnLst>
+  </p:timing>
 </p:sld>
 </file>
 
@@ -17612,14 +17633,14 @@
         <p:spPr bwMode="auto">
           <a:noFill/>
           <a:extLst>
-            <a:ext uri="{909E8E84-426E-40DD-AFC4-6F175D3DCCD1}">
+            <a:ext uri="{909E8E84-426E-40dd-AFC4-6F175D3DCCD1}">
               <a14:hiddenFill xmlns:a14="http://schemas.microsoft.com/office/drawing/2010/main">
                 <a:solidFill>
                   <a:srgbClr val="FFFFFF"/>
                 </a:solidFill>
               </a14:hiddenFill>
             </a:ext>
-            <a:ext uri="{91240B29-F687-4F45-9708-019B960494DF}">
+            <a:ext uri="{91240B29-F687-4f45-9708-019B960494DF}">
               <a14:hiddenLine xmlns:a14="http://schemas.microsoft.com/office/drawing/2010/main" w="9525">
                 <a:solidFill>
                   <a:srgbClr val="000000"/>
@@ -17793,14 +17814,14 @@
             <a:noFill/>
           </a:ln>
           <a:extLst>
-            <a:ext uri="{909E8E84-426E-40DD-AFC4-6F175D3DCCD1}">
+            <a:ext uri="{909E8E84-426E-40dd-AFC4-6F175D3DCCD1}">
               <a14:hiddenFill xmlns:a14="http://schemas.microsoft.com/office/drawing/2010/main">
                 <a:solidFill>
                   <a:schemeClr val="accent1"/>
                 </a:solidFill>
               </a14:hiddenFill>
             </a:ext>
-            <a:ext uri="{91240B29-F687-4F45-9708-019B960494DF}">
+            <a:ext uri="{91240B29-F687-4f45-9708-019B960494DF}">
               <a14:hiddenLine xmlns:a14="http://schemas.microsoft.com/office/drawing/2010/main" w="9525">
                 <a:solidFill>
                   <a:schemeClr val="tx1"/>
@@ -17818,6 +17839,13 @@
   <p:clrMapOvr>
     <a:masterClrMapping/>
   </p:clrMapOvr>
+  <p:timing>
+    <p:tnLst>
+      <p:par>
+        <p:cTn xmlns:p14="http://schemas.microsoft.com/office/powerpoint/2010/main" id="1" dur="indefinite" restart="never" nodeType="tmRoot"/>
+      </p:par>
+    </p:tnLst>
+  </p:timing>
 </p:sld>
 </file>
 
@@ -17843,7 +17871,7 @@
           <p:cNvPr id="5" name="Title 4">
             <a:extLst>
               <a:ext uri="{FF2B5EF4-FFF2-40B4-BE49-F238E27FC236}">
-                <a16:creationId xmlns:a16="http://schemas.microsoft.com/office/drawing/2014/main" id="{9340556A-634D-E44F-A4D7-C88613D88CAF}"/>
+                <a16:creationId xmlns:a16="http://schemas.microsoft.com/office/drawing/2014/main" xmlns="" id="{9340556A-634D-E44F-A4D7-C88613D88CAF}"/>
               </a:ext>
             </a:extLst>
           </p:cNvPr>
@@ -17874,7 +17902,7 @@
           <p:cNvPr id="6" name="Subtitle 5">
             <a:extLst>
               <a:ext uri="{FF2B5EF4-FFF2-40B4-BE49-F238E27FC236}">
-                <a16:creationId xmlns:a16="http://schemas.microsoft.com/office/drawing/2014/main" id="{73D2F005-1BF1-CC48-8D30-5C7CF131F208}"/>
+                <a16:creationId xmlns:a16="http://schemas.microsoft.com/office/drawing/2014/main" xmlns="" id="{73D2F005-1BF1-CC48-8D30-5C7CF131F208}"/>
               </a:ext>
             </a:extLst>
           </p:cNvPr>
@@ -17891,35 +17919,35 @@
           <a:lstStyle/>
           <a:p>
             <a:r>
-              <a:rPr lang="en-US" altLang="zh-Hans" dirty="0"/>
+              <a:rPr lang="en-US" altLang="zh-CHS" dirty="0"/>
               <a:t>For</a:t>
             </a:r>
             <a:r>
-              <a:rPr lang="zh-Hans" altLang="en-US" dirty="0"/>
+              <a:rPr lang="zh-CHS" altLang="en-US" dirty="0"/>
               <a:t> </a:t>
             </a:r>
             <a:r>
-              <a:rPr lang="en-US" altLang="zh-Hans" dirty="0"/>
+              <a:rPr lang="en-US" altLang="zh-CHS" dirty="0"/>
               <a:t>non-parametric</a:t>
             </a:r>
             <a:r>
-              <a:rPr lang="zh-Hans" altLang="en-US" dirty="0"/>
+              <a:rPr lang="zh-CHS" altLang="en-US" dirty="0"/>
               <a:t> </a:t>
             </a:r>
             <a:r>
-              <a:rPr lang="en-US" altLang="zh-Hans" dirty="0"/>
+              <a:rPr lang="en-US" altLang="zh-CHS" dirty="0"/>
               <a:t>data,</a:t>
             </a:r>
             <a:r>
-              <a:rPr lang="zh-Hans" altLang="en-US" dirty="0"/>
+              <a:rPr lang="zh-CHS" altLang="en-US" dirty="0"/>
               <a:t> </a:t>
             </a:r>
             <a:r>
-              <a:rPr lang="en-US" altLang="zh-Hans" dirty="0"/>
+              <a:rPr lang="en-US" altLang="zh-CHS" dirty="0"/>
               <a:t>Spearman</a:t>
             </a:r>
             <a:r>
-              <a:rPr lang="zh-Hans" altLang="en-US" dirty="0"/>
+              <a:rPr lang="zh-CHS" altLang="en-US" dirty="0"/>
               <a:t> </a:t>
             </a:r>
             <a:r>
@@ -17942,7 +17970,7 @@
           <p:cNvPr id="4" name="Slide Number Placeholder 3">
             <a:extLst>
               <a:ext uri="{FF2B5EF4-FFF2-40B4-BE49-F238E27FC236}">
-                <a16:creationId xmlns:a16="http://schemas.microsoft.com/office/drawing/2014/main" id="{EE5467BF-2EC5-E64D-977E-94261661C9DC}"/>
+                <a16:creationId xmlns:a16="http://schemas.microsoft.com/office/drawing/2014/main" xmlns="" id="{EE5467BF-2EC5-E64D-977E-94261661C9DC}"/>
               </a:ext>
             </a:extLst>
           </p:cNvPr>
@@ -17982,6 +18010,13 @@
   <p:clrMapOvr>
     <a:masterClrMapping/>
   </p:clrMapOvr>
+  <p:timing>
+    <p:tnLst>
+      <p:par>
+        <p:cTn xmlns:p14="http://schemas.microsoft.com/office/powerpoint/2010/main" id="1" dur="indefinite" restart="never" nodeType="tmRoot"/>
+      </p:par>
+    </p:tnLst>
+  </p:timing>
 </p:sld>
 </file>
 
@@ -18186,14 +18221,14 @@
         <p:spPr bwMode="auto">
           <a:noFill/>
           <a:extLst>
-            <a:ext uri="{909E8E84-426E-40DD-AFC4-6F175D3DCCD1}">
+            <a:ext uri="{909E8E84-426E-40dd-AFC4-6F175D3DCCD1}">
               <a14:hiddenFill xmlns:a14="http://schemas.microsoft.com/office/drawing/2010/main">
                 <a:solidFill>
                   <a:srgbClr val="FFFFFF"/>
                 </a:solidFill>
               </a14:hiddenFill>
             </a:ext>
-            <a:ext uri="{91240B29-F687-4F45-9708-019B960494DF}">
+            <a:ext uri="{91240B29-F687-4f45-9708-019B960494DF}">
               <a14:hiddenLine xmlns:a14="http://schemas.microsoft.com/office/drawing/2010/main" w="9525">
                 <a:solidFill>
                   <a:srgbClr val="000000"/>
@@ -18355,7 +18390,7 @@
           <a:graphicData uri="http://schemas.openxmlformats.org/presentationml/2006/ole">
             <mc:AlternateContent xmlns:mc="http://schemas.openxmlformats.org/markup-compatibility/2006">
               <mc:Choice xmlns:v="urn:schemas-microsoft-com:vml" Requires="v">
-                <p:oleObj spid="_x0000_s7239" name="Equation" r:id="rId4" imgW="863600" imgH="419100" progId="Equation.DSMT4">
+                <p:oleObj spid="_x0000_s7244" name="Equation" r:id="rId4" imgW="863600" imgH="419100" progId="Equation.DSMT4">
                   <p:embed/>
                 </p:oleObj>
               </mc:Choice>
@@ -18395,6 +18430,13 @@
   <p:clrMapOvr>
     <a:masterClrMapping/>
   </p:clrMapOvr>
+  <p:timing>
+    <p:tnLst>
+      <p:par>
+        <p:cTn xmlns:p14="http://schemas.microsoft.com/office/powerpoint/2010/main" id="1" dur="indefinite" restart="never" nodeType="tmRoot"/>
+      </p:par>
+    </p:tnLst>
+  </p:timing>
 </p:sld>
 </file>
 
@@ -18483,7 +18525,31 @@
               <a:rPr lang="en-US" altLang="en-US" sz="1800" dirty="0">
                 <a:ea typeface="ＭＳ Ｐゴシック" charset="-128"/>
               </a:rPr>
-              <a:t>To measure motivation, an animal behavior psychologist ranked the time it took six mice that were deprived of food and water to complete two tasks: one reinforced with food (food task) and a second with water (water task). He ranked the mice based on their times, with the fastest time being ranked 1 and so on for each test. The researcher hypothesized that mice would finish at a similar rank for each test. Figure 15.15 displays the results of this hypothetical study</a:t>
+              <a:t>To measure motivation, an animal behavior psychologist ranked the time it took </a:t>
+            </a:r>
+            <a:r>
+              <a:rPr lang="en-US" altLang="en-US" sz="1800" dirty="0" smtClean="0">
+                <a:ea typeface="ＭＳ Ｐゴシック" charset="-128"/>
+              </a:rPr>
+              <a:t>eight</a:t>
+            </a:r>
+            <a:r>
+              <a:rPr lang="en-US" altLang="en-US" sz="1800" dirty="0" smtClean="0">
+                <a:ea typeface="ＭＳ Ｐゴシック" charset="-128"/>
+              </a:rPr>
+              <a:t> </a:t>
+            </a:r>
+            <a:r>
+              <a:rPr lang="en-US" altLang="en-US" sz="1800" dirty="0" smtClean="0">
+                <a:ea typeface="ＭＳ Ｐゴシック" charset="-128"/>
+              </a:rPr>
+              <a:t>mice </a:t>
+            </a:r>
+            <a:r>
+              <a:rPr lang="en-US" altLang="en-US" sz="1800" dirty="0">
+                <a:ea typeface="ＭＳ Ｐゴシック" charset="-128"/>
+              </a:rPr>
+              <a:t>that were deprived of food and water to complete two tasks: one reinforced with food (food task) and a second with water (water task). He ranked the mice based on their times, with the fastest time being ranked 1 and so on for each test. The researcher hypothesized that mice would finish at a similar rank for each test. Figure 15.15 displays the results of this hypothetical study</a:t>
             </a:r>
           </a:p>
         </p:txBody>
@@ -18501,14 +18567,14 @@
         <p:spPr bwMode="auto">
           <a:noFill/>
           <a:extLst>
-            <a:ext uri="{909E8E84-426E-40DD-AFC4-6F175D3DCCD1}">
+            <a:ext uri="{909E8E84-426E-40dd-AFC4-6F175D3DCCD1}">
               <a14:hiddenFill xmlns:a14="http://schemas.microsoft.com/office/drawing/2010/main">
                 <a:solidFill>
                   <a:srgbClr val="FFFFFF"/>
                 </a:solidFill>
               </a14:hiddenFill>
             </a:ext>
-            <a:ext uri="{91240B29-F687-4F45-9708-019B960494DF}">
+            <a:ext uri="{91240B29-F687-4f45-9708-019B960494DF}">
               <a14:hiddenLine xmlns:a14="http://schemas.microsoft.com/office/drawing/2010/main" w="9525">
                 <a:solidFill>
                   <a:srgbClr val="000000"/>
@@ -18682,14 +18748,14 @@
             <a:noFill/>
           </a:ln>
           <a:extLst>
-            <a:ext uri="{909E8E84-426E-40DD-AFC4-6F175D3DCCD1}">
+            <a:ext uri="{909E8E84-426E-40dd-AFC4-6F175D3DCCD1}">
               <a14:hiddenFill xmlns:a14="http://schemas.microsoft.com/office/drawing/2010/main">
                 <a:solidFill>
                   <a:schemeClr val="accent1"/>
                 </a:solidFill>
               </a14:hiddenFill>
             </a:ext>
-            <a:ext uri="{91240B29-F687-4F45-9708-019B960494DF}">
+            <a:ext uri="{91240B29-F687-4f45-9708-019B960494DF}">
               <a14:hiddenLine xmlns:a14="http://schemas.microsoft.com/office/drawing/2010/main" w="9525">
                 <a:solidFill>
                   <a:schemeClr val="tx1"/>
@@ -18707,6 +18773,13 @@
   <p:clrMapOvr>
     <a:masterClrMapping/>
   </p:clrMapOvr>
+  <p:timing>
+    <p:tnLst>
+      <p:par>
+        <p:cTn xmlns:p14="http://schemas.microsoft.com/office/powerpoint/2010/main" id="1" dur="indefinite" restart="never" nodeType="tmRoot"/>
+      </p:par>
+    </p:tnLst>
+  </p:timing>
 </p:sld>
 </file>
 
@@ -18829,7 +18902,7 @@
           <a:graphicData uri="http://schemas.openxmlformats.org/presentationml/2006/ole">
             <mc:AlternateContent xmlns:mc="http://schemas.openxmlformats.org/markup-compatibility/2006">
               <mc:Choice xmlns:v="urn:schemas-microsoft-com:vml" Requires="v">
-                <p:oleObj spid="_x0000_s1176" name="Equation" r:id="rId4" imgW="1765300" imgH="444500" progId="Equation.3">
+                <p:oleObj spid="_x0000_s1185" name="Equation" r:id="rId4" imgW="1765300" imgH="444500" progId="Equation.3">
                   <p:embed/>
                 </p:oleObj>
               </mc:Choice>
@@ -18871,14 +18944,14 @@
                       </a:ln>
                       <a:effectLst/>
                       <a:extLst>
-                        <a:ext uri="{909E8E84-426E-40DD-AFC4-6F175D3DCCD1}">
+                        <a:ext uri="{909E8E84-426E-40dd-AFC4-6F175D3DCCD1}">
                           <a14:hiddenFill xmlns:a14="http://schemas.microsoft.com/office/drawing/2010/main">
                             <a:solidFill>
                               <a:schemeClr val="accent1"/>
                             </a:solidFill>
                           </a14:hiddenFill>
                         </a:ext>
-                        <a:ext uri="{91240B29-F687-4F45-9708-019B960494DF}">
+                        <a:ext uri="{91240B29-F687-4f45-9708-019B960494DF}">
                           <a14:hiddenLine xmlns:a14="http://schemas.microsoft.com/office/drawing/2010/main" w="9525">
                             <a:solidFill>
                               <a:schemeClr val="tx1"/>
@@ -18888,7 +18961,7 @@
                             <a:tailEnd/>
                           </a14:hiddenLine>
                         </a:ext>
-                        <a:ext uri="{AF507438-7753-43E0-B8FC-AC1667EBCBE1}">
+                        <a:ext uri="{AF507438-7753-43e0-B8FC-AC1667EBCBE1}">
                           <a14:hiddenEffects xmlns:a14="http://schemas.microsoft.com/office/drawing/2010/main">
                             <a:effectLst>
                               <a:outerShdw dist="35921" dir="2700000" algn="ctr" rotWithShape="0">
@@ -18924,7 +18997,7 @@
           <a:graphicData uri="http://schemas.openxmlformats.org/presentationml/2006/ole">
             <mc:AlternateContent xmlns:mc="http://schemas.openxmlformats.org/markup-compatibility/2006">
               <mc:Choice xmlns:v="urn:schemas-microsoft-com:vml" Requires="v">
-                <p:oleObj spid="_x0000_s1177" name="Equation" r:id="rId6" imgW="762000" imgH="368300" progId="Equation.3">
+                <p:oleObj spid="_x0000_s1186" name="Equation" r:id="rId6" imgW="762000" imgH="368300" progId="Equation.3">
                   <p:embed/>
                 </p:oleObj>
               </mc:Choice>
@@ -18966,14 +19039,14 @@
                       </a:ln>
                       <a:effectLst/>
                       <a:extLst>
-                        <a:ext uri="{909E8E84-426E-40DD-AFC4-6F175D3DCCD1}">
+                        <a:ext uri="{909E8E84-426E-40dd-AFC4-6F175D3DCCD1}">
                           <a14:hiddenFill xmlns:a14="http://schemas.microsoft.com/office/drawing/2010/main">
                             <a:solidFill>
                               <a:schemeClr val="accent1"/>
                             </a:solidFill>
                           </a14:hiddenFill>
                         </a:ext>
-                        <a:ext uri="{91240B29-F687-4F45-9708-019B960494DF}">
+                        <a:ext uri="{91240B29-F687-4f45-9708-019B960494DF}">
                           <a14:hiddenLine xmlns:a14="http://schemas.microsoft.com/office/drawing/2010/main" w="9525">
                             <a:solidFill>
                               <a:schemeClr val="tx1"/>
@@ -18983,7 +19056,7 @@
                             <a:tailEnd/>
                           </a14:hiddenLine>
                         </a:ext>
-                        <a:ext uri="{AF507438-7753-43E0-B8FC-AC1667EBCBE1}">
+                        <a:ext uri="{AF507438-7753-43e0-B8FC-AC1667EBCBE1}">
                           <a14:hiddenEffects xmlns:a14="http://schemas.microsoft.com/office/drawing/2010/main">
                             <a:effectLst>
                               <a:outerShdw dist="35921" dir="2700000" algn="ctr" rotWithShape="0">
@@ -19120,14 +19193,14 @@
         <p:spPr bwMode="auto">
           <a:noFill/>
           <a:extLst>
-            <a:ext uri="{909E8E84-426E-40DD-AFC4-6F175D3DCCD1}">
+            <a:ext uri="{909E8E84-426E-40dd-AFC4-6F175D3DCCD1}">
               <a14:hiddenFill xmlns:a14="http://schemas.microsoft.com/office/drawing/2010/main">
                 <a:solidFill>
                   <a:srgbClr val="FFFFFF"/>
                 </a:solidFill>
               </a14:hiddenFill>
             </a:ext>
-            <a:ext uri="{91240B29-F687-4F45-9708-019B960494DF}">
+            <a:ext uri="{91240B29-F687-4f45-9708-019B960494DF}">
               <a14:hiddenLine xmlns:a14="http://schemas.microsoft.com/office/drawing/2010/main" w="9525">
                 <a:solidFill>
                   <a:srgbClr val="000000"/>
@@ -19272,6 +19345,13 @@
   <p:clrMapOvr>
     <a:masterClrMapping/>
   </p:clrMapOvr>
+  <p:timing>
+    <p:tnLst>
+      <p:par>
+        <p:cTn xmlns:p14="http://schemas.microsoft.com/office/powerpoint/2010/main" id="1" dur="indefinite" restart="never" nodeType="tmRoot"/>
+      </p:par>
+    </p:tnLst>
+  </p:timing>
 </p:sld>
 </file>
 
@@ -19341,14 +19421,14 @@
         <p:spPr bwMode="auto">
           <a:noFill/>
           <a:extLst>
-            <a:ext uri="{909E8E84-426E-40DD-AFC4-6F175D3DCCD1}">
+            <a:ext uri="{909E8E84-426E-40dd-AFC4-6F175D3DCCD1}">
               <a14:hiddenFill xmlns:a14="http://schemas.microsoft.com/office/drawing/2010/main">
                 <a:solidFill>
                   <a:srgbClr val="FFFFFF"/>
                 </a:solidFill>
               </a14:hiddenFill>
             </a:ext>
-            <a:ext uri="{91240B29-F687-4F45-9708-019B960494DF}">
+            <a:ext uri="{91240B29-F687-4f45-9708-019B960494DF}">
               <a14:hiddenLine xmlns:a14="http://schemas.microsoft.com/office/drawing/2010/main" w="9525">
                 <a:solidFill>
                   <a:srgbClr val="000000"/>
@@ -19559,14 +19639,14 @@
             <a:noFill/>
           </a:ln>
           <a:extLst>
-            <a:ext uri="{909E8E84-426E-40DD-AFC4-6F175D3DCCD1}">
+            <a:ext uri="{909E8E84-426E-40dd-AFC4-6F175D3DCCD1}">
               <a14:hiddenFill xmlns:a14="http://schemas.microsoft.com/office/drawing/2010/main">
                 <a:solidFill>
                   <a:schemeClr val="accent1"/>
                 </a:solidFill>
               </a14:hiddenFill>
             </a:ext>
-            <a:ext uri="{91240B29-F687-4F45-9708-019B960494DF}">
+            <a:ext uri="{91240B29-F687-4f45-9708-019B960494DF}">
               <a14:hiddenLine xmlns:a14="http://schemas.microsoft.com/office/drawing/2010/main" w="9525">
                 <a:solidFill>
                   <a:schemeClr val="tx1"/>
@@ -19584,6 +19664,13 @@
   <p:clrMapOvr>
     <a:masterClrMapping/>
   </p:clrMapOvr>
+  <p:timing>
+    <p:tnLst>
+      <p:par>
+        <p:cTn xmlns:p14="http://schemas.microsoft.com/office/powerpoint/2010/main" id="1" dur="indefinite" restart="never" nodeType="tmRoot"/>
+      </p:par>
+    </p:tnLst>
+  </p:timing>
 </p:sld>
 </file>
 
@@ -19755,14 +19842,14 @@
             <a:noFill/>
           </a:ln>
           <a:extLst>
-            <a:ext uri="{909E8E84-426E-40DD-AFC4-6F175D3DCCD1}">
+            <a:ext uri="{909E8E84-426E-40dd-AFC4-6F175D3DCCD1}">
               <a14:hiddenFill xmlns:a14="http://schemas.microsoft.com/office/drawing/2010/main">
                 <a:solidFill>
                   <a:srgbClr val="FFFFFF"/>
                 </a:solidFill>
               </a14:hiddenFill>
             </a:ext>
-            <a:ext uri="{91240B29-F687-4F45-9708-019B960494DF}">
+            <a:ext uri="{91240B29-F687-4f45-9708-019B960494DF}">
               <a14:hiddenLine xmlns:a14="http://schemas.microsoft.com/office/drawing/2010/main" w="9525">
                 <a:solidFill>
                   <a:srgbClr val="000000"/>
@@ -20080,14 +20167,14 @@
         <p:spPr bwMode="auto">
           <a:noFill/>
           <a:extLst>
-            <a:ext uri="{909E8E84-426E-40DD-AFC4-6F175D3DCCD1}">
+            <a:ext uri="{909E8E84-426E-40dd-AFC4-6F175D3DCCD1}">
               <a14:hiddenFill xmlns:a14="http://schemas.microsoft.com/office/drawing/2010/main">
                 <a:solidFill>
                   <a:srgbClr val="FFFFFF"/>
                 </a:solidFill>
               </a14:hiddenFill>
             </a:ext>
-            <a:ext uri="{91240B29-F687-4F45-9708-019B960494DF}">
+            <a:ext uri="{91240B29-F687-4f45-9708-019B960494DF}">
               <a14:hiddenLine xmlns:a14="http://schemas.microsoft.com/office/drawing/2010/main" w="9525">
                 <a:solidFill>
                   <a:srgbClr val="000000"/>
@@ -20249,7 +20336,7 @@
           <a:graphicData uri="http://schemas.openxmlformats.org/presentationml/2006/ole">
             <mc:AlternateContent xmlns:mc="http://schemas.openxmlformats.org/markup-compatibility/2006">
               <mc:Choice xmlns:v="urn:schemas-microsoft-com:vml" Requires="v">
-                <p:oleObj spid="_x0000_s2260" name="Equation" r:id="rId4" imgW="876300" imgH="393700" progId="Equation.DSMT4">
+                <p:oleObj spid="_x0000_s2273" name="Equation" r:id="rId4" imgW="876300" imgH="393700" progId="Equation.DSMT4">
                   <p:embed/>
                 </p:oleObj>
               </mc:Choice>
@@ -20306,7 +20393,7 @@
           <a:graphicData uri="http://schemas.openxmlformats.org/presentationml/2006/ole">
             <mc:AlternateContent xmlns:mc="http://schemas.openxmlformats.org/markup-compatibility/2006">
               <mc:Choice xmlns:v="urn:schemas-microsoft-com:vml" Requires="v">
-                <p:oleObj spid="_x0000_s2261" name="Equation" r:id="rId6" imgW="1066800" imgH="152400" progId="Equation.DSMT4">
+                <p:oleObj spid="_x0000_s2274" name="Equation" r:id="rId6" imgW="1066800" imgH="152400" progId="Equation.DSMT4">
                   <p:embed/>
                 </p:oleObj>
               </mc:Choice>
@@ -20363,7 +20450,7 @@
           <a:graphicData uri="http://schemas.openxmlformats.org/presentationml/2006/ole">
             <mc:AlternateContent xmlns:mc="http://schemas.openxmlformats.org/markup-compatibility/2006">
               <mc:Choice xmlns:v="urn:schemas-microsoft-com:vml" Requires="v">
-                <p:oleObj spid="_x0000_s2262" name="Equation" r:id="rId8" imgW="495300" imgH="152400" progId="Equation.DSMT4">
+                <p:oleObj spid="_x0000_s2275" name="Equation" r:id="rId8" imgW="495300" imgH="152400" progId="Equation.DSMT4">
                   <p:embed/>
                 </p:oleObj>
               </mc:Choice>
@@ -20403,6 +20490,13 @@
   <p:clrMapOvr>
     <a:masterClrMapping/>
   </p:clrMapOvr>
+  <p:timing>
+    <p:tnLst>
+      <p:par>
+        <p:cTn xmlns:p14="http://schemas.microsoft.com/office/powerpoint/2010/main" id="1" dur="indefinite" restart="never" nodeType="tmRoot"/>
+      </p:par>
+    </p:tnLst>
+  </p:timing>
 </p:sld>
 </file>
 
@@ -20428,7 +20522,7 @@
           <p:cNvPr id="2" name="Title 1">
             <a:extLst>
               <a:ext uri="{FF2B5EF4-FFF2-40B4-BE49-F238E27FC236}">
-                <a16:creationId xmlns:a16="http://schemas.microsoft.com/office/drawing/2014/main" id="{9396CC8D-EFAA-5344-9DDC-773342D375CF}"/>
+                <a16:creationId xmlns:a16="http://schemas.microsoft.com/office/drawing/2014/main" xmlns="" id="{9396CC8D-EFAA-5344-9DDC-773342D375CF}"/>
               </a:ext>
             </a:extLst>
           </p:cNvPr>
@@ -20456,25 +20550,25 @@
               <a:t>Spearman Correlation Coefficient</a:t>
             </a:r>
             <a:r>
-              <a:rPr lang="zh-Hans" altLang="en-US" dirty="0">
+              <a:rPr lang="zh-CHS" altLang="en-US" dirty="0">
                 <a:ea typeface="ＭＳ Ｐゴシック" charset="-128"/>
               </a:rPr>
               <a:t> </a:t>
             </a:r>
             <a:r>
-              <a:rPr lang="en-US" altLang="zh-Hans" dirty="0">
+              <a:rPr lang="en-US" altLang="zh-CHS" dirty="0">
                 <a:ea typeface="ＭＳ Ｐゴシック" charset="-128"/>
               </a:rPr>
               <a:t>in</a:t>
             </a:r>
             <a:r>
-              <a:rPr lang="zh-Hans" altLang="en-US" dirty="0">
+              <a:rPr lang="zh-CHS" altLang="en-US" dirty="0">
                 <a:ea typeface="ＭＳ Ｐゴシック" charset="-128"/>
               </a:rPr>
               <a:t> </a:t>
             </a:r>
             <a:r>
-              <a:rPr lang="en-US" altLang="zh-Hans" dirty="0">
+              <a:rPr lang="en-US" altLang="zh-CHS" dirty="0">
                 <a:ea typeface="ＭＳ Ｐゴシック" charset="-128"/>
               </a:rPr>
               <a:t>R</a:t>
@@ -20488,7 +20582,7 @@
           <p:cNvPr id="3" name="Content Placeholder 2">
             <a:extLst>
               <a:ext uri="{FF2B5EF4-FFF2-40B4-BE49-F238E27FC236}">
-                <a16:creationId xmlns:a16="http://schemas.microsoft.com/office/drawing/2014/main" id="{F5CD01D1-B984-D94D-B20D-B07A3383514E}"/>
+                <a16:creationId xmlns:a16="http://schemas.microsoft.com/office/drawing/2014/main" xmlns="" id="{F5CD01D1-B984-D94D-B20D-B07A3383514E}"/>
               </a:ext>
             </a:extLst>
           </p:cNvPr>
@@ -20567,7 +20661,7 @@
           <p:cNvPr id="4" name="Slide Number Placeholder 3">
             <a:extLst>
               <a:ext uri="{FF2B5EF4-FFF2-40B4-BE49-F238E27FC236}">
-                <a16:creationId xmlns:a16="http://schemas.microsoft.com/office/drawing/2014/main" id="{225DABFC-F400-D045-AE45-626BB2F3C77B}"/>
+                <a16:creationId xmlns:a16="http://schemas.microsoft.com/office/drawing/2014/main" xmlns="" id="{225DABFC-F400-D045-AE45-626BB2F3C77B}"/>
               </a:ext>
             </a:extLst>
           </p:cNvPr>
@@ -20602,7 +20696,7 @@
           <p:cNvPr id="5" name="Content Placeholder 2">
             <a:extLst>
               <a:ext uri="{FF2B5EF4-FFF2-40B4-BE49-F238E27FC236}">
-                <a16:creationId xmlns:a16="http://schemas.microsoft.com/office/drawing/2014/main" id="{397773BC-7B92-B94F-8F01-F3C67742EC43}"/>
+                <a16:creationId xmlns:a16="http://schemas.microsoft.com/office/drawing/2014/main" xmlns="" id="{397773BC-7B92-B94F-8F01-F3C67742EC43}"/>
               </a:ext>
             </a:extLst>
           </p:cNvPr>
@@ -20624,14 +20718,14 @@
             <a:noFill/>
           </a:ln>
           <a:extLst>
-            <a:ext uri="{909E8E84-426E-40DD-AFC4-6F175D3DCCD1}">
+            <a:ext uri="{909E8E84-426E-40dd-AFC4-6F175D3DCCD1}">
               <a14:hiddenFill xmlns:a14="http://schemas.microsoft.com/office/drawing/2010/main">
                 <a:solidFill>
                   <a:srgbClr val="FFFFFF"/>
                 </a:solidFill>
               </a14:hiddenFill>
             </a:ext>
-            <a:ext uri="{91240B29-F687-4F45-9708-019B960494DF}">
+            <a:ext uri="{91240B29-F687-4f45-9708-019B960494DF}">
               <a14:hiddenLine xmlns:a14="http://schemas.microsoft.com/office/drawing/2010/main" w="9525">
                 <a:solidFill>
                   <a:srgbClr val="000000"/>
@@ -20866,6 +20960,13 @@
   <p:clrMapOvr>
     <a:masterClrMapping/>
   </p:clrMapOvr>
+  <p:timing>
+    <p:tnLst>
+      <p:par>
+        <p:cTn xmlns:p14="http://schemas.microsoft.com/office/powerpoint/2010/main" id="1" dur="indefinite" restart="never" nodeType="tmRoot"/>
+      </p:par>
+    </p:tnLst>
+  </p:timing>
 </p:sld>
 </file>
 
@@ -20891,7 +20992,7 @@
           <p:cNvPr id="5" name="Title 4">
             <a:extLst>
               <a:ext uri="{FF2B5EF4-FFF2-40B4-BE49-F238E27FC236}">
-                <a16:creationId xmlns:a16="http://schemas.microsoft.com/office/drawing/2014/main" id="{C4922257-3556-3248-BFF5-7F9DD05B78C4}"/>
+                <a16:creationId xmlns:a16="http://schemas.microsoft.com/office/drawing/2014/main" xmlns="" id="{C4922257-3556-3248-BFF5-7F9DD05B78C4}"/>
               </a:ext>
             </a:extLst>
           </p:cNvPr>
@@ -20934,7 +21035,7 @@
           <p:cNvPr id="6" name="Subtitle 5">
             <a:extLst>
               <a:ext uri="{FF2B5EF4-FFF2-40B4-BE49-F238E27FC236}">
-                <a16:creationId xmlns:a16="http://schemas.microsoft.com/office/drawing/2014/main" id="{16A03DC1-4AA0-7440-8947-EB9ECA51F9AA}"/>
+                <a16:creationId xmlns:a16="http://schemas.microsoft.com/office/drawing/2014/main" xmlns="" id="{16A03DC1-4AA0-7440-8947-EB9ECA51F9AA}"/>
               </a:ext>
             </a:extLst>
           </p:cNvPr>
@@ -20959,7 +21060,7 @@
           <p:cNvPr id="4" name="Slide Number Placeholder 3">
             <a:extLst>
               <a:ext uri="{FF2B5EF4-FFF2-40B4-BE49-F238E27FC236}">
-                <a16:creationId xmlns:a16="http://schemas.microsoft.com/office/drawing/2014/main" id="{1262384D-A41C-444B-825E-5582E547F328}"/>
+                <a16:creationId xmlns:a16="http://schemas.microsoft.com/office/drawing/2014/main" xmlns="" id="{1262384D-A41C-444B-825E-5582E547F328}"/>
               </a:ext>
             </a:extLst>
           </p:cNvPr>
@@ -20999,6 +21100,13 @@
   <p:clrMapOvr>
     <a:masterClrMapping/>
   </p:clrMapOvr>
+  <p:timing>
+    <p:tnLst>
+      <p:par>
+        <p:cTn xmlns:p14="http://schemas.microsoft.com/office/powerpoint/2010/main" id="1" dur="indefinite" restart="never" nodeType="tmRoot"/>
+      </p:par>
+    </p:tnLst>
+  </p:timing>
 </p:sld>
 </file>
 
@@ -21134,14 +21242,14 @@
         <p:spPr bwMode="auto">
           <a:noFill/>
           <a:extLst>
-            <a:ext uri="{909E8E84-426E-40DD-AFC4-6F175D3DCCD1}">
+            <a:ext uri="{909E8E84-426E-40dd-AFC4-6F175D3DCCD1}">
               <a14:hiddenFill xmlns:a14="http://schemas.microsoft.com/office/drawing/2010/main">
                 <a:solidFill>
                   <a:srgbClr val="FFFFFF"/>
                 </a:solidFill>
               </a14:hiddenFill>
             </a:ext>
-            <a:ext uri="{91240B29-F687-4F45-9708-019B960494DF}">
+            <a:ext uri="{91240B29-F687-4f45-9708-019B960494DF}">
               <a14:hiddenLine xmlns:a14="http://schemas.microsoft.com/office/drawing/2010/main" w="9525">
                 <a:solidFill>
                   <a:srgbClr val="000000"/>
@@ -21467,14 +21575,14 @@
         <p:spPr bwMode="auto">
           <a:noFill/>
           <a:extLst>
-            <a:ext uri="{909E8E84-426E-40DD-AFC4-6F175D3DCCD1}">
+            <a:ext uri="{909E8E84-426E-40dd-AFC4-6F175D3DCCD1}">
               <a14:hiddenFill xmlns:a14="http://schemas.microsoft.com/office/drawing/2010/main">
                 <a:solidFill>
                   <a:srgbClr val="FFFFFF"/>
                 </a:solidFill>
               </a14:hiddenFill>
             </a:ext>
-            <a:ext uri="{91240B29-F687-4F45-9708-019B960494DF}">
+            <a:ext uri="{91240B29-F687-4f45-9708-019B960494DF}">
               <a14:hiddenLine xmlns:a14="http://schemas.microsoft.com/office/drawing/2010/main" w="9525">
                 <a:solidFill>
                   <a:srgbClr val="000000"/>
@@ -22700,7 +22808,7 @@
           <a:graphicData uri="http://schemas.openxmlformats.org/presentationml/2006/ole">
             <mc:AlternateContent xmlns:mc="http://schemas.openxmlformats.org/markup-compatibility/2006">
               <mc:Choice xmlns:v="urn:schemas-microsoft-com:vml" Requires="v">
-                <p:oleObj spid="_x0000_s8398" name="Equation" r:id="rId4" imgW="1257300" imgH="419100" progId="Equation.DSMT4">
+                <p:oleObj spid="_x0000_s8411" name="Equation" r:id="rId4" imgW="1257300" imgH="419100" progId="Equation.DSMT4">
                   <p:embed/>
                 </p:oleObj>
               </mc:Choice>
@@ -22757,7 +22865,7 @@
           <a:graphicData uri="http://schemas.openxmlformats.org/presentationml/2006/ole">
             <mc:AlternateContent xmlns:mc="http://schemas.openxmlformats.org/markup-compatibility/2006">
               <mc:Choice xmlns:v="urn:schemas-microsoft-com:vml" Requires="v">
-                <p:oleObj spid="_x0000_s8399" name="Equation" r:id="rId6" imgW="596900" imgH="419100" progId="Equation.DSMT4">
+                <p:oleObj spid="_x0000_s8412" name="Equation" r:id="rId6" imgW="596900" imgH="419100" progId="Equation.DSMT4">
                   <p:embed/>
                 </p:oleObj>
               </mc:Choice>
@@ -22814,7 +22922,7 @@
           <a:graphicData uri="http://schemas.openxmlformats.org/presentationml/2006/ole">
             <mc:AlternateContent xmlns:mc="http://schemas.openxmlformats.org/markup-compatibility/2006">
               <mc:Choice xmlns:v="urn:schemas-microsoft-com:vml" Requires="v">
-                <p:oleObj spid="_x0000_s8400" name="Equation" r:id="rId8" imgW="165100" imgH="228600" progId="Equation.DSMT4">
+                <p:oleObj spid="_x0000_s8413" name="Equation" r:id="rId8" imgW="165100" imgH="228600" progId="Equation.DSMT4">
                   <p:embed/>
                 </p:oleObj>
               </mc:Choice>
@@ -22854,6 +22962,13 @@
   <p:clrMapOvr>
     <a:masterClrMapping/>
   </p:clrMapOvr>
+  <p:timing>
+    <p:tnLst>
+      <p:par>
+        <p:cTn xmlns:p14="http://schemas.microsoft.com/office/powerpoint/2010/main" id="1" dur="indefinite" restart="never" nodeType="tmRoot"/>
+      </p:par>
+    </p:tnLst>
+  </p:timing>
 </p:sld>
 </file>
 
@@ -22993,14 +23108,14 @@
         <p:spPr bwMode="auto">
           <a:noFill/>
           <a:extLst>
-            <a:ext uri="{909E8E84-426E-40DD-AFC4-6F175D3DCCD1}">
+            <a:ext uri="{909E8E84-426E-40dd-AFC4-6F175D3DCCD1}">
               <a14:hiddenFill xmlns:a14="http://schemas.microsoft.com/office/drawing/2010/main">
                 <a:solidFill>
                   <a:srgbClr val="FFFFFF"/>
                 </a:solidFill>
               </a14:hiddenFill>
             </a:ext>
-            <a:ext uri="{91240B29-F687-4F45-9708-019B960494DF}">
+            <a:ext uri="{91240B29-F687-4f45-9708-019B960494DF}">
               <a14:hiddenLine xmlns:a14="http://schemas.microsoft.com/office/drawing/2010/main" w="9525">
                 <a:solidFill>
                   <a:srgbClr val="000000"/>
@@ -23174,14 +23289,14 @@
             <a:noFill/>
           </a:ln>
           <a:extLst>
-            <a:ext uri="{909E8E84-426E-40DD-AFC4-6F175D3DCCD1}">
+            <a:ext uri="{909E8E84-426E-40dd-AFC4-6F175D3DCCD1}">
               <a14:hiddenFill xmlns:a14="http://schemas.microsoft.com/office/drawing/2010/main">
                 <a:solidFill>
                   <a:schemeClr val="accent1"/>
                 </a:solidFill>
               </a14:hiddenFill>
             </a:ext>
-            <a:ext uri="{91240B29-F687-4F45-9708-019B960494DF}">
+            <a:ext uri="{91240B29-F687-4f45-9708-019B960494DF}">
               <a14:hiddenLine xmlns:a14="http://schemas.microsoft.com/office/drawing/2010/main" w="9525">
                 <a:solidFill>
                   <a:schemeClr val="tx1"/>
@@ -23199,6 +23314,13 @@
   <p:clrMapOvr>
     <a:masterClrMapping/>
   </p:clrMapOvr>
+  <p:timing>
+    <p:tnLst>
+      <p:par>
+        <p:cTn xmlns:p14="http://schemas.microsoft.com/office/powerpoint/2010/main" id="1" dur="indefinite" restart="never" nodeType="tmRoot"/>
+      </p:par>
+    </p:tnLst>
+  </p:timing>
 </p:sld>
 </file>
 
@@ -23340,14 +23462,14 @@
         <p:spPr bwMode="auto">
           <a:noFill/>
           <a:extLst>
-            <a:ext uri="{909E8E84-426E-40DD-AFC4-6F175D3DCCD1}">
+            <a:ext uri="{909E8E84-426E-40dd-AFC4-6F175D3DCCD1}">
               <a14:hiddenFill xmlns:a14="http://schemas.microsoft.com/office/drawing/2010/main">
                 <a:solidFill>
                   <a:srgbClr val="FFFFFF"/>
                 </a:solidFill>
               </a14:hiddenFill>
             </a:ext>
-            <a:ext uri="{91240B29-F687-4F45-9708-019B960494DF}">
+            <a:ext uri="{91240B29-F687-4f45-9708-019B960494DF}">
               <a14:hiddenLine xmlns:a14="http://schemas.microsoft.com/office/drawing/2010/main" w="9525">
                 <a:solidFill>
                   <a:srgbClr val="000000"/>
@@ -23509,7 +23631,7 @@
           <a:graphicData uri="http://schemas.openxmlformats.org/presentationml/2006/ole">
             <mc:AlternateContent xmlns:mc="http://schemas.openxmlformats.org/markup-compatibility/2006">
               <mc:Choice xmlns:v="urn:schemas-microsoft-com:vml" Requires="v">
-                <p:oleObj spid="_x0000_s3225" name="Equation" r:id="rId4" imgW="736600" imgH="355600" progId="Equation.DSMT4">
+                <p:oleObj spid="_x0000_s3234" name="Equation" r:id="rId4" imgW="736600" imgH="355600" progId="Equation.DSMT4">
                   <p:embed/>
                 </p:oleObj>
               </mc:Choice>
@@ -23566,7 +23688,7 @@
           <a:graphicData uri="http://schemas.openxmlformats.org/presentationml/2006/ole">
             <mc:AlternateContent xmlns:mc="http://schemas.openxmlformats.org/markup-compatibility/2006">
               <mc:Choice xmlns:v="urn:schemas-microsoft-com:vml" Requires="v">
-                <p:oleObj spid="_x0000_s3226" name="Equation" r:id="rId6" imgW="698500" imgH="177800" progId="Equation.DSMT4">
+                <p:oleObj spid="_x0000_s3235" name="Equation" r:id="rId6" imgW="698500" imgH="177800" progId="Equation.DSMT4">
                   <p:embed/>
                 </p:oleObj>
               </mc:Choice>
@@ -23606,6 +23728,13 @@
   <p:clrMapOvr>
     <a:masterClrMapping/>
   </p:clrMapOvr>
+  <p:timing>
+    <p:tnLst>
+      <p:par>
+        <p:cTn xmlns:p14="http://schemas.microsoft.com/office/powerpoint/2010/main" id="1" dur="indefinite" restart="never" nodeType="tmRoot"/>
+      </p:par>
+    </p:tnLst>
+  </p:timing>
 </p:sld>
 </file>
 
@@ -23675,14 +23804,14 @@
         <p:spPr bwMode="auto">
           <a:noFill/>
           <a:extLst>
-            <a:ext uri="{909E8E84-426E-40DD-AFC4-6F175D3DCCD1}">
+            <a:ext uri="{909E8E84-426E-40dd-AFC4-6F175D3DCCD1}">
               <a14:hiddenFill xmlns:a14="http://schemas.microsoft.com/office/drawing/2010/main">
                 <a:solidFill>
                   <a:srgbClr val="FFFFFF"/>
                 </a:solidFill>
               </a14:hiddenFill>
             </a:ext>
-            <a:ext uri="{91240B29-F687-4F45-9708-019B960494DF}">
+            <a:ext uri="{91240B29-F687-4f45-9708-019B960494DF}">
               <a14:hiddenLine xmlns:a14="http://schemas.microsoft.com/office/drawing/2010/main" w="9525">
                 <a:solidFill>
                   <a:srgbClr val="000000"/>
@@ -23890,6 +24019,13 @@
   <p:clrMapOvr>
     <a:masterClrMapping/>
   </p:clrMapOvr>
+  <p:timing>
+    <p:tnLst>
+      <p:par>
+        <p:cTn xmlns:p14="http://schemas.microsoft.com/office/powerpoint/2010/main" id="1" dur="indefinite" restart="never" nodeType="tmRoot"/>
+      </p:par>
+    </p:tnLst>
+  </p:timing>
 </p:sld>
 </file>
 
@@ -24094,14 +24230,14 @@
             <a:noFill/>
           </a:ln>
           <a:extLst>
-            <a:ext uri="{909E8E84-426E-40DD-AFC4-6F175D3DCCD1}">
+            <a:ext uri="{909E8E84-426E-40dd-AFC4-6F175D3DCCD1}">
               <a14:hiddenFill xmlns:a14="http://schemas.microsoft.com/office/drawing/2010/main">
                 <a:solidFill>
                   <a:srgbClr val="FFFFFF"/>
                 </a:solidFill>
               </a14:hiddenFill>
             </a:ext>
-            <a:ext uri="{91240B29-F687-4F45-9708-019B960494DF}">
+            <a:ext uri="{91240B29-F687-4f45-9708-019B960494DF}">
               <a14:hiddenLine xmlns:a14="http://schemas.microsoft.com/office/drawing/2010/main" w="9525">
                 <a:solidFill>
                   <a:srgbClr val="000000"/>
@@ -24345,14 +24481,14 @@
         <p:spPr bwMode="auto">
           <a:noFill/>
           <a:extLst>
-            <a:ext uri="{909E8E84-426E-40DD-AFC4-6F175D3DCCD1}">
+            <a:ext uri="{909E8E84-426E-40dd-AFC4-6F175D3DCCD1}">
               <a14:hiddenFill xmlns:a14="http://schemas.microsoft.com/office/drawing/2010/main">
                 <a:solidFill>
                   <a:srgbClr val="FFFFFF"/>
                 </a:solidFill>
               </a14:hiddenFill>
             </a:ext>
-            <a:ext uri="{91240B29-F687-4F45-9708-019B960494DF}">
+            <a:ext uri="{91240B29-F687-4f45-9708-019B960494DF}">
               <a14:hiddenLine xmlns:a14="http://schemas.microsoft.com/office/drawing/2010/main" w="9525">
                 <a:solidFill>
                   <a:srgbClr val="000000"/>
@@ -25656,7 +25792,7 @@
           <a:graphicData uri="http://schemas.openxmlformats.org/presentationml/2006/ole">
             <mc:AlternateContent xmlns:mc="http://schemas.openxmlformats.org/markup-compatibility/2006">
               <mc:Choice xmlns:v="urn:schemas-microsoft-com:vml" Requires="v">
-                <p:oleObj spid="_x0000_s9356" name="Equation" r:id="rId4" imgW="1600200" imgH="419100" progId="Equation.DSMT4">
+                <p:oleObj spid="_x0000_s9365" name="Equation" r:id="rId4" imgW="1600200" imgH="419100" progId="Equation.DSMT4">
                   <p:embed/>
                 </p:oleObj>
               </mc:Choice>
@@ -25713,7 +25849,7 @@
           <a:graphicData uri="http://schemas.openxmlformats.org/presentationml/2006/ole">
             <mc:AlternateContent xmlns:mc="http://schemas.openxmlformats.org/markup-compatibility/2006">
               <mc:Choice xmlns:v="urn:schemas-microsoft-com:vml" Requires="v">
-                <p:oleObj spid="_x0000_s9357" name="Equation" r:id="rId6" imgW="3022600" imgH="419100" progId="Equation.DSMT4">
+                <p:oleObj spid="_x0000_s9366" name="Equation" r:id="rId6" imgW="3022600" imgH="419100" progId="Equation.DSMT4">
                   <p:embed/>
                 </p:oleObj>
               </mc:Choice>
@@ -25756,7 +25892,7 @@
   <p:timing>
     <p:tnLst>
       <p:par>
-        <p:cTn id="1" dur="indefinite" restart="never" nodeType="tmRoot">
+        <p:cTn xmlns:p14="http://schemas.microsoft.com/office/powerpoint/2010/main" id="1" dur="indefinite" restart="never" nodeType="tmRoot">
           <p:childTnLst>
             <p:seq concurrent="1" nextAc="seek">
               <p:cTn id="2" dur="indefinite" nodeType="mainSeq">
@@ -25852,7 +25988,7 @@
           <p:cNvPr id="2" name="Title 1">
             <a:extLst>
               <a:ext uri="{FF2B5EF4-FFF2-40B4-BE49-F238E27FC236}">
-                <a16:creationId xmlns:a16="http://schemas.microsoft.com/office/drawing/2014/main" id="{55035BCF-87C6-6646-A421-D60C0B692C3E}"/>
+                <a16:creationId xmlns:a16="http://schemas.microsoft.com/office/drawing/2014/main" xmlns="" id="{55035BCF-87C6-6646-A421-D60C0B692C3E}"/>
               </a:ext>
             </a:extLst>
           </p:cNvPr>
@@ -25881,25 +26017,25 @@
               <a:t> Correlation Coefficient</a:t>
             </a:r>
             <a:r>
-              <a:rPr lang="zh-Hans" altLang="en-US" dirty="0">
+              <a:rPr lang="zh-CHS" altLang="en-US" dirty="0">
                 <a:ea typeface="ＭＳ Ｐゴシック" charset="-128"/>
               </a:rPr>
               <a:t> </a:t>
             </a:r>
             <a:r>
-              <a:rPr lang="en-US" altLang="zh-Hans" dirty="0">
+              <a:rPr lang="en-US" altLang="zh-CHS" dirty="0">
                 <a:ea typeface="ＭＳ Ｐゴシック" charset="-128"/>
               </a:rPr>
               <a:t>in</a:t>
             </a:r>
             <a:r>
-              <a:rPr lang="zh-Hans" altLang="en-US" dirty="0">
+              <a:rPr lang="zh-CHS" altLang="en-US" dirty="0">
                 <a:ea typeface="ＭＳ Ｐゴシック" charset="-128"/>
               </a:rPr>
               <a:t> </a:t>
             </a:r>
             <a:r>
-              <a:rPr lang="en-US" altLang="zh-Hans" dirty="0">
+              <a:rPr lang="en-US" altLang="zh-CHS" dirty="0">
                 <a:ea typeface="ＭＳ Ｐゴシック" charset="-128"/>
               </a:rPr>
               <a:t>R</a:t>
@@ -25913,7 +26049,7 @@
           <p:cNvPr id="3" name="Content Placeholder 2">
             <a:extLst>
               <a:ext uri="{FF2B5EF4-FFF2-40B4-BE49-F238E27FC236}">
-                <a16:creationId xmlns:a16="http://schemas.microsoft.com/office/drawing/2014/main" id="{815EFA95-D049-1142-B0EB-530A7E81DCDC}"/>
+                <a16:creationId xmlns:a16="http://schemas.microsoft.com/office/drawing/2014/main" xmlns="" id="{815EFA95-D049-1142-B0EB-530A7E81DCDC}"/>
               </a:ext>
             </a:extLst>
           </p:cNvPr>
@@ -26012,7 +26148,7 @@
           <p:cNvPr id="4" name="Slide Number Placeholder 3">
             <a:extLst>
               <a:ext uri="{FF2B5EF4-FFF2-40B4-BE49-F238E27FC236}">
-                <a16:creationId xmlns:a16="http://schemas.microsoft.com/office/drawing/2014/main" id="{C4FB3C3C-C155-FC44-9110-77A79815BB2D}"/>
+                <a16:creationId xmlns:a16="http://schemas.microsoft.com/office/drawing/2014/main" xmlns="" id="{C4FB3C3C-C155-FC44-9110-77A79815BB2D}"/>
               </a:ext>
             </a:extLst>
           </p:cNvPr>
@@ -26052,6 +26188,13 @@
   <p:clrMapOvr>
     <a:masterClrMapping/>
   </p:clrMapOvr>
+  <p:timing>
+    <p:tnLst>
+      <p:par>
+        <p:cTn xmlns:p14="http://schemas.microsoft.com/office/powerpoint/2010/main" id="1" dur="indefinite" restart="never" nodeType="tmRoot"/>
+      </p:par>
+    </p:tnLst>
+  </p:timing>
 </p:sld>
 </file>
 
@@ -26077,7 +26220,7 @@
           <p:cNvPr id="5" name="Title 4">
             <a:extLst>
               <a:ext uri="{FF2B5EF4-FFF2-40B4-BE49-F238E27FC236}">
-                <a16:creationId xmlns:a16="http://schemas.microsoft.com/office/drawing/2014/main" id="{B1A3E749-817C-D74B-98B7-F655DE4087AF}"/>
+                <a16:creationId xmlns:a16="http://schemas.microsoft.com/office/drawing/2014/main" xmlns="" id="{B1A3E749-817C-D74B-98B7-F655DE4087AF}"/>
               </a:ext>
             </a:extLst>
           </p:cNvPr>
@@ -26108,7 +26251,7 @@
           <p:cNvPr id="6" name="Subtitle 5">
             <a:extLst>
               <a:ext uri="{FF2B5EF4-FFF2-40B4-BE49-F238E27FC236}">
-                <a16:creationId xmlns:a16="http://schemas.microsoft.com/office/drawing/2014/main" id="{EB41B3D4-38AA-AF45-803E-F8773C004F38}"/>
+                <a16:creationId xmlns:a16="http://schemas.microsoft.com/office/drawing/2014/main" xmlns="" id="{EB41B3D4-38AA-AF45-803E-F8773C004F38}"/>
               </a:ext>
             </a:extLst>
           </p:cNvPr>
@@ -26133,7 +26276,7 @@
           <p:cNvPr id="4" name="Slide Number Placeholder 3">
             <a:extLst>
               <a:ext uri="{FF2B5EF4-FFF2-40B4-BE49-F238E27FC236}">
-                <a16:creationId xmlns:a16="http://schemas.microsoft.com/office/drawing/2014/main" id="{C429173F-3D6B-FF42-9C5F-FA3244DB4420}"/>
+                <a16:creationId xmlns:a16="http://schemas.microsoft.com/office/drawing/2014/main" xmlns="" id="{C429173F-3D6B-FF42-9C5F-FA3244DB4420}"/>
               </a:ext>
             </a:extLst>
           </p:cNvPr>
@@ -26173,6 +26316,13 @@
   <p:clrMapOvr>
     <a:masterClrMapping/>
   </p:clrMapOvr>
+  <p:timing>
+    <p:tnLst>
+      <p:par>
+        <p:cTn xmlns:p14="http://schemas.microsoft.com/office/powerpoint/2010/main" id="1" dur="indefinite" restart="never" nodeType="tmRoot"/>
+      </p:par>
+    </p:tnLst>
+  </p:timing>
 </p:sld>
 </file>
 
@@ -26325,14 +26475,14 @@
         <p:spPr bwMode="auto">
           <a:noFill/>
           <a:extLst>
-            <a:ext uri="{909E8E84-426E-40DD-AFC4-6F175D3DCCD1}">
+            <a:ext uri="{909E8E84-426E-40dd-AFC4-6F175D3DCCD1}">
               <a14:hiddenFill xmlns:a14="http://schemas.microsoft.com/office/drawing/2010/main">
                 <a:solidFill>
                   <a:srgbClr val="FFFFFF"/>
                 </a:solidFill>
               </a14:hiddenFill>
             </a:ext>
-            <a:ext uri="{91240B29-F687-4F45-9708-019B960494DF}">
+            <a:ext uri="{91240B29-F687-4f45-9708-019B960494DF}">
               <a14:hiddenLine xmlns:a14="http://schemas.microsoft.com/office/drawing/2010/main" w="9525">
                 <a:solidFill>
                   <a:srgbClr val="000000"/>
@@ -26494,7 +26644,7 @@
           <a:graphicData uri="http://schemas.openxmlformats.org/presentationml/2006/ole">
             <mc:AlternateContent xmlns:mc="http://schemas.openxmlformats.org/markup-compatibility/2006">
               <mc:Choice xmlns:v="urn:schemas-microsoft-com:vml" Requires="v">
-                <p:oleObj spid="_x0000_s16515" name="Equation" r:id="rId4" imgW="127000" imgH="228600" progId="Equation.DSMT4">
+                <p:oleObj spid="_x0000_s16524" name="Equation" r:id="rId4" imgW="127000" imgH="228600" progId="Equation.DSMT4">
                   <p:embed/>
                 </p:oleObj>
               </mc:Choice>
@@ -26551,7 +26701,7 @@
           <a:graphicData uri="http://schemas.openxmlformats.org/presentationml/2006/ole">
             <mc:AlternateContent xmlns:mc="http://schemas.openxmlformats.org/markup-compatibility/2006">
               <mc:Choice xmlns:v="urn:schemas-microsoft-com:vml" Requires="v">
-                <p:oleObj spid="_x0000_s16516" name="Equation" r:id="rId6" imgW="723900" imgH="393700" progId="Equation.DSMT4">
+                <p:oleObj spid="_x0000_s16525" name="Equation" r:id="rId6" imgW="723900" imgH="393700" progId="Equation.DSMT4">
                   <p:embed/>
                 </p:oleObj>
               </mc:Choice>
@@ -26620,14 +26770,14 @@
             <a:noFill/>
           </a:ln>
           <a:extLst>
-            <a:ext uri="{909E8E84-426E-40DD-AFC4-6F175D3DCCD1}">
+            <a:ext uri="{909E8E84-426E-40dd-AFC4-6F175D3DCCD1}">
               <a14:hiddenFill xmlns:a14="http://schemas.microsoft.com/office/drawing/2010/main">
                 <a:solidFill>
                   <a:schemeClr val="accent1"/>
                 </a:solidFill>
               </a14:hiddenFill>
             </a:ext>
-            <a:ext uri="{91240B29-F687-4F45-9708-019B960494DF}">
+            <a:ext uri="{91240B29-F687-4f45-9708-019B960494DF}">
               <a14:hiddenLine xmlns:a14="http://schemas.microsoft.com/office/drawing/2010/main" w="9525">
                 <a:solidFill>
                   <a:schemeClr val="tx1"/>
@@ -26645,6 +26795,13 @@
   <p:clrMapOvr>
     <a:masterClrMapping/>
   </p:clrMapOvr>
+  <p:timing>
+    <p:tnLst>
+      <p:par>
+        <p:cTn xmlns:p14="http://schemas.microsoft.com/office/powerpoint/2010/main" id="1" dur="indefinite" restart="never" nodeType="tmRoot"/>
+      </p:par>
+    </p:tnLst>
+  </p:timing>
 </p:sld>
 </file>
 
@@ -26746,14 +26903,14 @@
         <p:spPr bwMode="auto">
           <a:noFill/>
           <a:extLst>
-            <a:ext uri="{909E8E84-426E-40DD-AFC4-6F175D3DCCD1}">
+            <a:ext uri="{909E8E84-426E-40dd-AFC4-6F175D3DCCD1}">
               <a14:hiddenFill xmlns:a14="http://schemas.microsoft.com/office/drawing/2010/main">
                 <a:solidFill>
                   <a:srgbClr val="FFFFFF"/>
                 </a:solidFill>
               </a14:hiddenFill>
             </a:ext>
-            <a:ext uri="{91240B29-F687-4F45-9708-019B960494DF}">
+            <a:ext uri="{91240B29-F687-4f45-9708-019B960494DF}">
               <a14:hiddenLine xmlns:a14="http://schemas.microsoft.com/office/drawing/2010/main" w="9525">
                 <a:solidFill>
                   <a:srgbClr val="000000"/>
@@ -26927,14 +27084,14 @@
             <a:noFill/>
           </a:ln>
           <a:extLst>
-            <a:ext uri="{909E8E84-426E-40DD-AFC4-6F175D3DCCD1}">
+            <a:ext uri="{909E8E84-426E-40dd-AFC4-6F175D3DCCD1}">
               <a14:hiddenFill xmlns:a14="http://schemas.microsoft.com/office/drawing/2010/main">
                 <a:solidFill>
                   <a:schemeClr val="accent1"/>
                 </a:solidFill>
               </a14:hiddenFill>
             </a:ext>
-            <a:ext uri="{91240B29-F687-4F45-9708-019B960494DF}">
+            <a:ext uri="{91240B29-F687-4f45-9708-019B960494DF}">
               <a14:hiddenLine xmlns:a14="http://schemas.microsoft.com/office/drawing/2010/main" w="9525">
                 <a:solidFill>
                   <a:schemeClr val="tx1"/>
@@ -26952,6 +27109,13 @@
   <p:clrMapOvr>
     <a:masterClrMapping/>
   </p:clrMapOvr>
+  <p:timing>
+    <p:tnLst>
+      <p:par>
+        <p:cTn xmlns:p14="http://schemas.microsoft.com/office/powerpoint/2010/main" id="1" dur="indefinite" restart="never" nodeType="tmRoot"/>
+      </p:par>
+    </p:tnLst>
+  </p:timing>
 </p:sld>
 </file>
 
@@ -27089,7 +27253,7 @@
           <a:graphicData uri="http://schemas.openxmlformats.org/presentationml/2006/ole">
             <mc:AlternateContent xmlns:mc="http://schemas.openxmlformats.org/markup-compatibility/2006">
               <mc:Choice xmlns:v="urn:schemas-microsoft-com:vml" Requires="v">
-                <p:oleObj spid="_x0000_s4176" name="Equation" r:id="rId4" imgW="1943100" imgH="381000" progId="Equation.3">
+                <p:oleObj spid="_x0000_s4181" name="Equation" r:id="rId4" imgW="1943100" imgH="381000" progId="Equation.3">
                   <p:embed/>
                 </p:oleObj>
               </mc:Choice>
@@ -27131,14 +27295,14 @@
                       </a:ln>
                       <a:effectLst/>
                       <a:extLst>
-                        <a:ext uri="{909E8E84-426E-40DD-AFC4-6F175D3DCCD1}">
+                        <a:ext uri="{909E8E84-426E-40dd-AFC4-6F175D3DCCD1}">
                           <a14:hiddenFill xmlns:a14="http://schemas.microsoft.com/office/drawing/2010/main">
                             <a:solidFill>
                               <a:schemeClr val="accent1"/>
                             </a:solidFill>
                           </a14:hiddenFill>
                         </a:ext>
-                        <a:ext uri="{91240B29-F687-4F45-9708-019B960494DF}">
+                        <a:ext uri="{91240B29-F687-4f45-9708-019B960494DF}">
                           <a14:hiddenLine xmlns:a14="http://schemas.microsoft.com/office/drawing/2010/main" w="9525">
                             <a:solidFill>
                               <a:schemeClr val="tx1"/>
@@ -27148,7 +27312,7 @@
                             <a:tailEnd/>
                           </a14:hiddenLine>
                         </a:ext>
-                        <a:ext uri="{AF507438-7753-43E0-B8FC-AC1667EBCBE1}">
+                        <a:ext uri="{AF507438-7753-43e0-B8FC-AC1667EBCBE1}">
                           <a14:hiddenEffects xmlns:a14="http://schemas.microsoft.com/office/drawing/2010/main">
                             <a:effectLst>
                               <a:outerShdw dist="35921" dir="2700000" algn="ctr" rotWithShape="0">
@@ -27181,14 +27345,14 @@
         <p:spPr bwMode="auto">
           <a:noFill/>
           <a:extLst>
-            <a:ext uri="{909E8E84-426E-40DD-AFC4-6F175D3DCCD1}">
+            <a:ext uri="{909E8E84-426E-40dd-AFC4-6F175D3DCCD1}">
               <a14:hiddenFill xmlns:a14="http://schemas.microsoft.com/office/drawing/2010/main">
                 <a:solidFill>
                   <a:srgbClr val="FFFFFF"/>
                 </a:solidFill>
               </a14:hiddenFill>
             </a:ext>
-            <a:ext uri="{91240B29-F687-4F45-9708-019B960494DF}">
+            <a:ext uri="{91240B29-F687-4f45-9708-019B960494DF}">
               <a14:hiddenLine xmlns:a14="http://schemas.microsoft.com/office/drawing/2010/main" w="9525">
                 <a:solidFill>
                   <a:srgbClr val="000000"/>
@@ -27333,6 +27497,13 @@
   <p:clrMapOvr>
     <a:masterClrMapping/>
   </p:clrMapOvr>
+  <p:timing>
+    <p:tnLst>
+      <p:par>
+        <p:cTn xmlns:p14="http://schemas.microsoft.com/office/powerpoint/2010/main" id="1" dur="indefinite" restart="never" nodeType="tmRoot"/>
+      </p:par>
+    </p:tnLst>
+  </p:timing>
 </p:sld>
 </file>
 
@@ -27482,14 +27653,14 @@
         <p:spPr bwMode="auto">
           <a:noFill/>
           <a:extLst>
-            <a:ext uri="{909E8E84-426E-40DD-AFC4-6F175D3DCCD1}">
+            <a:ext uri="{909E8E84-426E-40dd-AFC4-6F175D3DCCD1}">
               <a14:hiddenFill xmlns:a14="http://schemas.microsoft.com/office/drawing/2010/main">
                 <a:solidFill>
                   <a:srgbClr val="FFFFFF"/>
                 </a:solidFill>
               </a14:hiddenFill>
             </a:ext>
-            <a:ext uri="{91240B29-F687-4F45-9708-019B960494DF}">
+            <a:ext uri="{91240B29-F687-4f45-9708-019B960494DF}">
               <a14:hiddenLine xmlns:a14="http://schemas.microsoft.com/office/drawing/2010/main" w="9525">
                 <a:solidFill>
                   <a:srgbClr val="000000"/>
@@ -27659,7 +27830,7 @@
           <p:cNvPr id="2" name="Title 1">
             <a:extLst>
               <a:ext uri="{FF2B5EF4-FFF2-40B4-BE49-F238E27FC236}">
-                <a16:creationId xmlns:a16="http://schemas.microsoft.com/office/drawing/2014/main" id="{5EEA26ED-3EB5-FB41-95FB-DF7165C197CD}"/>
+                <a16:creationId xmlns:a16="http://schemas.microsoft.com/office/drawing/2014/main" xmlns="" id="{5EEA26ED-3EB5-FB41-95FB-DF7165C197CD}"/>
               </a:ext>
             </a:extLst>
           </p:cNvPr>
@@ -27682,25 +27853,25 @@
               <a:t>Phi Correlation Coefficient</a:t>
             </a:r>
             <a:r>
-              <a:rPr lang="zh-Hans" altLang="en-US" dirty="0">
+              <a:rPr lang="zh-CHS" altLang="en-US" dirty="0">
                 <a:ea typeface="ＭＳ Ｐゴシック" charset="-128"/>
               </a:rPr>
               <a:t> </a:t>
             </a:r>
             <a:r>
-              <a:rPr lang="en-US" altLang="zh-Hans" dirty="0">
+              <a:rPr lang="en-US" altLang="zh-CHS" dirty="0">
                 <a:ea typeface="ＭＳ Ｐゴシック" charset="-128"/>
               </a:rPr>
               <a:t>in</a:t>
             </a:r>
             <a:r>
-              <a:rPr lang="zh-Hans" altLang="en-US" dirty="0">
+              <a:rPr lang="zh-CHS" altLang="en-US" dirty="0">
                 <a:ea typeface="ＭＳ Ｐゴシック" charset="-128"/>
               </a:rPr>
               <a:t> </a:t>
             </a:r>
             <a:r>
-              <a:rPr lang="en-US" altLang="zh-Hans" dirty="0">
+              <a:rPr lang="en-US" altLang="zh-CHS" dirty="0">
                 <a:ea typeface="ＭＳ Ｐゴシック" charset="-128"/>
               </a:rPr>
               <a:t>R</a:t>
@@ -27714,7 +27885,7 @@
           <p:cNvPr id="3" name="Content Placeholder 2">
             <a:extLst>
               <a:ext uri="{FF2B5EF4-FFF2-40B4-BE49-F238E27FC236}">
-                <a16:creationId xmlns:a16="http://schemas.microsoft.com/office/drawing/2014/main" id="{38AAD0C9-F5CF-7A46-938F-9A5525347728}"/>
+                <a16:creationId xmlns:a16="http://schemas.microsoft.com/office/drawing/2014/main" xmlns="" id="{38AAD0C9-F5CF-7A46-938F-9A5525347728}"/>
               </a:ext>
             </a:extLst>
           </p:cNvPr>
@@ -27731,19 +27902,19 @@
           <a:lstStyle/>
           <a:p>
             <a:r>
-              <a:rPr lang="en-US" altLang="zh-Hans" dirty="0"/>
+              <a:rPr lang="en-US" altLang="zh-CHS" dirty="0"/>
               <a:t># https://personality-</a:t>
             </a:r>
             <a:r>
-              <a:rPr lang="en-US" altLang="zh-Hans" dirty="0" err="1"/>
+              <a:rPr lang="en-US" altLang="zh-CHS" dirty="0" err="1"/>
               <a:t>project.org</a:t>
             </a:r>
             <a:r>
-              <a:rPr lang="en-US" altLang="zh-Hans" dirty="0"/>
+              <a:rPr lang="en-US" altLang="zh-CHS" dirty="0"/>
               <a:t>/r/html/</a:t>
             </a:r>
             <a:r>
-              <a:rPr lang="en-US" altLang="zh-Hans" dirty="0" err="1"/>
+              <a:rPr lang="en-US" altLang="zh-CHS" dirty="0" err="1"/>
               <a:t>phi.html</a:t>
             </a:r>
             <a:endParaRPr lang="en-US" dirty="0"/>
@@ -27810,7 +27981,7 @@
           <p:cNvPr id="4" name="Slide Number Placeholder 3">
             <a:extLst>
               <a:ext uri="{FF2B5EF4-FFF2-40B4-BE49-F238E27FC236}">
-                <a16:creationId xmlns:a16="http://schemas.microsoft.com/office/drawing/2014/main" id="{EC13BD65-3EF0-7D43-B7F3-805AC1CE3546}"/>
+                <a16:creationId xmlns:a16="http://schemas.microsoft.com/office/drawing/2014/main" xmlns="" id="{EC13BD65-3EF0-7D43-B7F3-805AC1CE3546}"/>
               </a:ext>
             </a:extLst>
           </p:cNvPr>
@@ -27850,6 +28021,13 @@
   <p:clrMapOvr>
     <a:masterClrMapping/>
   </p:clrMapOvr>
+  <p:timing>
+    <p:tnLst>
+      <p:par>
+        <p:cTn xmlns:p14="http://schemas.microsoft.com/office/powerpoint/2010/main" id="1" dur="indefinite" restart="never" nodeType="tmRoot"/>
+      </p:par>
+    </p:tnLst>
+  </p:timing>
 </p:sld>
 </file>
 
@@ -28029,14 +28207,14 @@
         <p:spPr bwMode="auto">
           <a:noFill/>
           <a:extLst>
-            <a:ext uri="{909E8E84-426E-40DD-AFC4-6F175D3DCCD1}">
+            <a:ext uri="{909E8E84-426E-40dd-AFC4-6F175D3DCCD1}">
               <a14:hiddenFill xmlns:a14="http://schemas.microsoft.com/office/drawing/2010/main">
                 <a:solidFill>
                   <a:srgbClr val="FFFFFF"/>
                 </a:solidFill>
               </a14:hiddenFill>
             </a:ext>
-            <a:ext uri="{91240B29-F687-4F45-9708-019B960494DF}">
+            <a:ext uri="{91240B29-F687-4f45-9708-019B960494DF}">
               <a14:hiddenLine xmlns:a14="http://schemas.microsoft.com/office/drawing/2010/main" w="9525">
                 <a:solidFill>
                   <a:srgbClr val="000000"/>
@@ -28198,7 +28376,7 @@
           <a:graphicData uri="http://schemas.openxmlformats.org/presentationml/2006/ole">
             <mc:AlternateContent xmlns:mc="http://schemas.openxmlformats.org/markup-compatibility/2006">
               <mc:Choice xmlns:v="urn:schemas-microsoft-com:vml" Requires="v">
-                <p:oleObj spid="_x0000_s13444" name="Equation" r:id="rId4" imgW="1549400" imgH="241300" progId="Equation.DSMT4">
+                <p:oleObj spid="_x0000_s13453" name="Equation" r:id="rId4" imgW="1549400" imgH="241300" progId="Equation.DSMT4">
                   <p:embed/>
                 </p:oleObj>
               </mc:Choice>
@@ -28255,7 +28433,7 @@
           <a:graphicData uri="http://schemas.openxmlformats.org/presentationml/2006/ole">
             <mc:AlternateContent xmlns:mc="http://schemas.openxmlformats.org/markup-compatibility/2006">
               <mc:Choice xmlns:v="urn:schemas-microsoft-com:vml" Requires="v">
-                <p:oleObj spid="_x0000_s13445" name="Equation" r:id="rId6" imgW="165100" imgH="215900" progId="Equation.DSMT4">
+                <p:oleObj spid="_x0000_s13454" name="Equation" r:id="rId6" imgW="165100" imgH="215900" progId="Equation.DSMT4">
                   <p:embed/>
                 </p:oleObj>
               </mc:Choice>
@@ -28295,6 +28473,13 @@
   <p:clrMapOvr>
     <a:masterClrMapping/>
   </p:clrMapOvr>
+  <p:timing>
+    <p:tnLst>
+      <p:par>
+        <p:cTn xmlns:p14="http://schemas.microsoft.com/office/powerpoint/2010/main" id="1" dur="indefinite" restart="never" nodeType="tmRoot"/>
+      </p:par>
+    </p:tnLst>
+  </p:timing>
 </p:sld>
 </file>
 
@@ -28353,14 +28538,14 @@
         <p:spPr bwMode="auto">
           <a:noFill/>
           <a:extLst>
-            <a:ext uri="{909E8E84-426E-40DD-AFC4-6F175D3DCCD1}">
+            <a:ext uri="{909E8E84-426E-40dd-AFC4-6F175D3DCCD1}">
               <a14:hiddenFill xmlns:a14="http://schemas.microsoft.com/office/drawing/2010/main">
                 <a:solidFill>
                   <a:srgbClr val="FFFFFF"/>
                 </a:solidFill>
               </a14:hiddenFill>
             </a:ext>
-            <a:ext uri="{91240B29-F687-4F45-9708-019B960494DF}">
+            <a:ext uri="{91240B29-F687-4f45-9708-019B960494DF}">
               <a14:hiddenLine xmlns:a14="http://schemas.microsoft.com/office/drawing/2010/main" w="9525">
                 <a:solidFill>
                   <a:srgbClr val="000000"/>
@@ -28521,14 +28706,14 @@
             <a:noFill/>
           </a:ln>
           <a:extLst>
-            <a:ext uri="{909E8E84-426E-40DD-AFC4-6F175D3DCCD1}">
+            <a:ext uri="{909E8E84-426E-40dd-AFC4-6F175D3DCCD1}">
               <a14:hiddenFill xmlns:a14="http://schemas.microsoft.com/office/drawing/2010/main">
                 <a:solidFill>
                   <a:srgbClr val="FFFFFF"/>
                 </a:solidFill>
               </a14:hiddenFill>
             </a:ext>
-            <a:ext uri="{91240B29-F687-4F45-9708-019B960494DF}">
+            <a:ext uri="{91240B29-F687-4f45-9708-019B960494DF}">
               <a14:hiddenLine xmlns:a14="http://schemas.microsoft.com/office/drawing/2010/main" w="9525">
                 <a:solidFill>
                   <a:srgbClr val="000000"/>
@@ -28706,14 +28891,14 @@
             <a:noFill/>
           </a:ln>
           <a:extLst>
-            <a:ext uri="{909E8E84-426E-40DD-AFC4-6F175D3DCCD1}">
+            <a:ext uri="{909E8E84-426E-40dd-AFC4-6F175D3DCCD1}">
               <a14:hiddenFill xmlns:a14="http://schemas.microsoft.com/office/drawing/2010/main">
                 <a:solidFill>
                   <a:schemeClr val="accent1"/>
                 </a:solidFill>
               </a14:hiddenFill>
             </a:ext>
-            <a:ext uri="{91240B29-F687-4F45-9708-019B960494DF}">
+            <a:ext uri="{91240B29-F687-4f45-9708-019B960494DF}">
               <a14:hiddenLine xmlns:a14="http://schemas.microsoft.com/office/drawing/2010/main" w="9525">
                 <a:solidFill>
                   <a:schemeClr val="tx1"/>
@@ -28731,6 +28916,13 @@
   <p:clrMapOvr>
     <a:masterClrMapping/>
   </p:clrMapOvr>
+  <p:timing>
+    <p:tnLst>
+      <p:par>
+        <p:cTn xmlns:p14="http://schemas.microsoft.com/office/powerpoint/2010/main" id="1" dur="indefinite" restart="never" nodeType="tmRoot"/>
+      </p:par>
+    </p:tnLst>
+  </p:timing>
 </p:sld>
 </file>
 
@@ -28866,14 +29058,14 @@
         <p:spPr bwMode="auto">
           <a:noFill/>
           <a:extLst>
-            <a:ext uri="{909E8E84-426E-40DD-AFC4-6F175D3DCCD1}">
+            <a:ext uri="{909E8E84-426E-40dd-AFC4-6F175D3DCCD1}">
               <a14:hiddenFill xmlns:a14="http://schemas.microsoft.com/office/drawing/2010/main">
                 <a:solidFill>
                   <a:srgbClr val="FFFFFF"/>
                 </a:solidFill>
               </a14:hiddenFill>
             </a:ext>
-            <a:ext uri="{91240B29-F687-4F45-9708-019B960494DF}">
+            <a:ext uri="{91240B29-F687-4f45-9708-019B960494DF}">
               <a14:hiddenLine xmlns:a14="http://schemas.microsoft.com/office/drawing/2010/main" w="9525">
                 <a:solidFill>
                   <a:srgbClr val="000000"/>
@@ -29047,14 +29239,14 @@
             <a:noFill/>
           </a:ln>
           <a:extLst>
-            <a:ext uri="{909E8E84-426E-40DD-AFC4-6F175D3DCCD1}">
+            <a:ext uri="{909E8E84-426E-40dd-AFC4-6F175D3DCCD1}">
               <a14:hiddenFill xmlns:a14="http://schemas.microsoft.com/office/drawing/2010/main">
                 <a:solidFill>
                   <a:schemeClr val="accent1"/>
                 </a:solidFill>
               </a14:hiddenFill>
             </a:ext>
-            <a:ext uri="{91240B29-F687-4F45-9708-019B960494DF}">
+            <a:ext uri="{91240B29-F687-4f45-9708-019B960494DF}">
               <a14:hiddenLine xmlns:a14="http://schemas.microsoft.com/office/drawing/2010/main" w="9525">
                 <a:solidFill>
                   <a:schemeClr val="tx1"/>
@@ -29072,6 +29264,13 @@
   <p:clrMapOvr>
     <a:masterClrMapping/>
   </p:clrMapOvr>
+  <p:timing>
+    <p:tnLst>
+      <p:par>
+        <p:cTn xmlns:p14="http://schemas.microsoft.com/office/powerpoint/2010/main" id="1" dur="indefinite" restart="never" nodeType="tmRoot"/>
+      </p:par>
+    </p:tnLst>
+  </p:timing>
 </p:sld>
 </file>
 
@@ -29234,14 +29433,14 @@
         <p:spPr bwMode="auto">
           <a:noFill/>
           <a:extLst>
-            <a:ext uri="{909E8E84-426E-40DD-AFC4-6F175D3DCCD1}">
+            <a:ext uri="{909E8E84-426E-40dd-AFC4-6F175D3DCCD1}">
               <a14:hiddenFill xmlns:a14="http://schemas.microsoft.com/office/drawing/2010/main">
                 <a:solidFill>
                   <a:srgbClr val="FFFFFF"/>
                 </a:solidFill>
               </a14:hiddenFill>
             </a:ext>
-            <a:ext uri="{91240B29-F687-4F45-9708-019B960494DF}">
+            <a:ext uri="{91240B29-F687-4f45-9708-019B960494DF}">
               <a14:hiddenLine xmlns:a14="http://schemas.microsoft.com/office/drawing/2010/main" w="9525">
                 <a:solidFill>
                   <a:srgbClr val="000000"/>
@@ -29531,14 +29730,14 @@
         <p:spPr bwMode="auto">
           <a:noFill/>
           <a:extLst>
-            <a:ext uri="{909E8E84-426E-40DD-AFC4-6F175D3DCCD1}">
+            <a:ext uri="{909E8E84-426E-40dd-AFC4-6F175D3DCCD1}">
               <a14:hiddenFill xmlns:a14="http://schemas.microsoft.com/office/drawing/2010/main">
                 <a:solidFill>
                   <a:srgbClr val="FFFFFF"/>
                 </a:solidFill>
               </a14:hiddenFill>
             </a:ext>
-            <a:ext uri="{91240B29-F687-4F45-9708-019B960494DF}">
+            <a:ext uri="{91240B29-F687-4f45-9708-019B960494DF}">
               <a14:hiddenLine xmlns:a14="http://schemas.microsoft.com/office/drawing/2010/main" w="9525">
                 <a:solidFill>
                   <a:srgbClr val="000000"/>
@@ -29712,14 +29911,14 @@
             <a:noFill/>
           </a:ln>
           <a:extLst>
-            <a:ext uri="{909E8E84-426E-40DD-AFC4-6F175D3DCCD1}">
+            <a:ext uri="{909E8E84-426E-40dd-AFC4-6F175D3DCCD1}">
               <a14:hiddenFill xmlns:a14="http://schemas.microsoft.com/office/drawing/2010/main">
                 <a:solidFill>
                   <a:schemeClr val="accent1"/>
                 </a:solidFill>
               </a14:hiddenFill>
             </a:ext>
-            <a:ext uri="{91240B29-F687-4F45-9708-019B960494DF}">
+            <a:ext uri="{91240B29-F687-4f45-9708-019B960494DF}">
               <a14:hiddenLine xmlns:a14="http://schemas.microsoft.com/office/drawing/2010/main" w="9525">
                 <a:solidFill>
                   <a:schemeClr val="tx1"/>
@@ -29882,14 +30081,14 @@
         <p:spPr bwMode="auto">
           <a:noFill/>
           <a:extLst>
-            <a:ext uri="{909E8E84-426E-40DD-AFC4-6F175D3DCCD1}">
+            <a:ext uri="{909E8E84-426E-40dd-AFC4-6F175D3DCCD1}">
               <a14:hiddenFill xmlns:a14="http://schemas.microsoft.com/office/drawing/2010/main">
                 <a:solidFill>
                   <a:srgbClr val="FFFFFF"/>
                 </a:solidFill>
               </a14:hiddenFill>
             </a:ext>
-            <a:ext uri="{91240B29-F687-4F45-9708-019B960494DF}">
+            <a:ext uri="{91240B29-F687-4f45-9708-019B960494DF}">
               <a14:hiddenLine xmlns:a14="http://schemas.microsoft.com/office/drawing/2010/main" w="9525">
                 <a:solidFill>
                   <a:srgbClr val="000000"/>
@@ -30063,14 +30262,14 @@
             <a:noFill/>
           </a:ln>
           <a:extLst>
-            <a:ext uri="{909E8E84-426E-40DD-AFC4-6F175D3DCCD1}">
+            <a:ext uri="{909E8E84-426E-40dd-AFC4-6F175D3DCCD1}">
               <a14:hiddenFill xmlns:a14="http://schemas.microsoft.com/office/drawing/2010/main">
                 <a:solidFill>
                   <a:schemeClr val="accent1"/>
                 </a:solidFill>
               </a14:hiddenFill>
             </a:ext>
-            <a:ext uri="{91240B29-F687-4F45-9708-019B960494DF}">
+            <a:ext uri="{91240B29-F687-4f45-9708-019B960494DF}">
               <a14:hiddenLine xmlns:a14="http://schemas.microsoft.com/office/drawing/2010/main" w="9525">
                 <a:solidFill>
                   <a:schemeClr val="tx1"/>
@@ -30236,14 +30435,14 @@
         <p:spPr bwMode="auto">
           <a:noFill/>
           <a:extLst>
-            <a:ext uri="{909E8E84-426E-40DD-AFC4-6F175D3DCCD1}">
+            <a:ext uri="{909E8E84-426E-40dd-AFC4-6F175D3DCCD1}">
               <a14:hiddenFill xmlns:a14="http://schemas.microsoft.com/office/drawing/2010/main">
                 <a:solidFill>
                   <a:srgbClr val="FFFFFF"/>
                 </a:solidFill>
               </a14:hiddenFill>
             </a:ext>
-            <a:ext uri="{91240B29-F687-4F45-9708-019B960494DF}">
+            <a:ext uri="{91240B29-F687-4f45-9708-019B960494DF}">
               <a14:hiddenLine xmlns:a14="http://schemas.microsoft.com/office/drawing/2010/main" w="9525">
                 <a:solidFill>
                   <a:srgbClr val="000000"/>
@@ -30451,14 +30650,14 @@
         <p:spPr bwMode="auto">
           <a:noFill/>
           <a:extLst>
-            <a:ext uri="{909E8E84-426E-40DD-AFC4-6F175D3DCCD1}">
+            <a:ext uri="{909E8E84-426E-40dd-AFC4-6F175D3DCCD1}">
               <a14:hiddenFill xmlns:a14="http://schemas.microsoft.com/office/drawing/2010/main">
                 <a:solidFill>
                   <a:srgbClr val="FFFFFF"/>
                 </a:solidFill>
               </a14:hiddenFill>
             </a:ext>
-            <a:ext uri="{91240B29-F687-4F45-9708-019B960494DF}">
+            <a:ext uri="{91240B29-F687-4f45-9708-019B960494DF}">
               <a14:hiddenLine xmlns:a14="http://schemas.microsoft.com/office/drawing/2010/main" w="9525">
                 <a:solidFill>
                   <a:srgbClr val="000000"/>
@@ -30632,14 +30831,14 @@
             <a:noFill/>
           </a:ln>
           <a:extLst>
-            <a:ext uri="{909E8E84-426E-40DD-AFC4-6F175D3DCCD1}">
+            <a:ext uri="{909E8E84-426E-40dd-AFC4-6F175D3DCCD1}">
               <a14:hiddenFill xmlns:a14="http://schemas.microsoft.com/office/drawing/2010/main">
                 <a:solidFill>
                   <a:schemeClr val="accent1"/>
                 </a:solidFill>
               </a14:hiddenFill>
             </a:ext>
-            <a:ext uri="{91240B29-F687-4F45-9708-019B960494DF}">
+            <a:ext uri="{91240B29-F687-4f45-9708-019B960494DF}">
               <a14:hiddenLine xmlns:a14="http://schemas.microsoft.com/office/drawing/2010/main" w="9525">
                 <a:solidFill>
                   <a:schemeClr val="tx1"/>
@@ -30686,14 +30885,14 @@
             <a:noFill/>
           </a:ln>
           <a:extLst>
-            <a:ext uri="{909E8E84-426E-40DD-AFC4-6F175D3DCCD1}">
+            <a:ext uri="{909E8E84-426E-40dd-AFC4-6F175D3DCCD1}">
               <a14:hiddenFill xmlns:a14="http://schemas.microsoft.com/office/drawing/2010/main">
                 <a:solidFill>
                   <a:schemeClr val="accent1"/>
                 </a:solidFill>
               </a14:hiddenFill>
             </a:ext>
-            <a:ext uri="{91240B29-F687-4F45-9708-019B960494DF}">
+            <a:ext uri="{91240B29-F687-4f45-9708-019B960494DF}">
               <a14:hiddenLine xmlns:a14="http://schemas.microsoft.com/office/drawing/2010/main" w="9525">
                 <a:solidFill>
                   <a:schemeClr val="tx1"/>

</xml_diff>

<commit_message>
revise lecture 9. slide 19
</commit_message>
<xml_diff>
--- a/Lecture 6- Correlation/Lecture 6.2 - Correlation.pptx
+++ b/Lecture 6- Correlation/Lecture 6.2 - Correlation.pptx
@@ -187,7 +187,7 @@
   </p:defaultTextStyle>
   <p:extLst>
     <p:ext uri="{EFAFB233-063F-42B5-8137-9DF3F51BA10A}">
-      <p15:sldGuideLst xmlns:p15="http://schemas.microsoft.com/office/powerpoint/2012/main" xmlns="">
+      <p15:sldGuideLst xmlns="" xmlns:p15="http://schemas.microsoft.com/office/powerpoint/2012/main">
         <p15:guide id="1" orient="horz" pos="2160">
           <p15:clr>
             <a:srgbClr val="A4A3A4"/>
@@ -12580,7 +12580,7 @@
           <a:graphicData uri="http://schemas.openxmlformats.org/presentationml/2006/ole">
             <mc:AlternateContent xmlns:mc="http://schemas.openxmlformats.org/markup-compatibility/2006">
               <mc:Choice xmlns:v="urn:schemas-microsoft-com:vml" Requires="v">
-                <p:oleObj spid="_x0000_s5268" name="Equation" r:id="rId4" imgW="127000" imgH="203200" progId="Equation.DSMT4">
+                <p:oleObj spid="_x0000_s5271" name="Equation" r:id="rId4" imgW="127000" imgH="203200" progId="Equation.DSMT4">
                   <p:embed/>
                 </p:oleObj>
               </mc:Choice>
@@ -12637,12 +12637,12 @@
           <a:graphicData uri="http://schemas.openxmlformats.org/presentationml/2006/ole">
             <mc:AlternateContent xmlns:mc="http://schemas.openxmlformats.org/markup-compatibility/2006">
               <mc:Choice xmlns:v="urn:schemas-microsoft-com:vml" Requires="v">
-                <p:oleObj spid="_x0000_s5269" name="Equation" r:id="rId6" imgW="736600" imgH="431800" progId="Equation.DSMT4">
+                <p:oleObj spid="_x0000_s5272" name="Equation" r:id="rId6" imgW="736600" imgH="431800" progId="Equation.3">
                   <p:embed/>
                 </p:oleObj>
               </mc:Choice>
               <mc:Fallback>
-                <p:oleObj name="Equation" r:id="rId6" imgW="736600" imgH="431800" progId="Equation.DSMT4">
+                <p:oleObj name="Equation" r:id="rId6" imgW="736600" imgH="431800" progId="Equation.3">
                   <p:embed/>
                   <p:pic>
                     <p:nvPicPr>
@@ -14093,7 +14093,7 @@
           <a:graphicData uri="http://schemas.openxmlformats.org/presentationml/2006/ole">
             <mc:AlternateContent xmlns:mc="http://schemas.openxmlformats.org/markup-compatibility/2006">
               <mc:Choice xmlns:v="urn:schemas-microsoft-com:vml" Requires="v">
-                <p:oleObj spid="_x0000_s6220" name="Equation" r:id="rId4" imgW="1993900" imgH="431800" progId="Equation.DSMT4">
+                <p:oleObj spid="_x0000_s6222" name="Equation" r:id="rId4" imgW="1993900" imgH="431800" progId="Equation.DSMT4">
                   <p:embed/>
                 </p:oleObj>
               </mc:Choice>
@@ -14522,7 +14522,7 @@
           <a:graphicData uri="http://schemas.openxmlformats.org/presentationml/2006/ole">
             <mc:AlternateContent xmlns:mc="http://schemas.openxmlformats.org/markup-compatibility/2006">
               <mc:Choice xmlns:v="urn:schemas-microsoft-com:vml" Requires="v">
-                <p:oleObj spid="_x0000_s14407" name="Equation" r:id="rId4" imgW="1181100" imgH="215900" progId="Equation.DSMT4">
+                <p:oleObj spid="_x0000_s14409" name="Equation" r:id="rId4" imgW="1181100" imgH="215900" progId="Equation.DSMT4">
                   <p:embed/>
                 </p:oleObj>
               </mc:Choice>
@@ -15242,7 +15242,7 @@
           <a:graphicData uri="http://schemas.openxmlformats.org/presentationml/2006/ole">
             <mc:AlternateContent xmlns:mc="http://schemas.openxmlformats.org/markup-compatibility/2006">
               <mc:Choice xmlns:v="urn:schemas-microsoft-com:vml" Requires="v">
-                <p:oleObj spid="_x0000_s15638" name="Equation" r:id="rId4" imgW="546100" imgH="215900" progId="Equation.DSMT4">
+                <p:oleObj spid="_x0000_s15643" name="Equation" r:id="rId4" imgW="546100" imgH="215900" progId="Equation.DSMT4">
                   <p:embed/>
                 </p:oleObj>
               </mc:Choice>
@@ -15299,7 +15299,7 @@
           <a:graphicData uri="http://schemas.openxmlformats.org/presentationml/2006/ole">
             <mc:AlternateContent xmlns:mc="http://schemas.openxmlformats.org/markup-compatibility/2006">
               <mc:Choice xmlns:v="urn:schemas-microsoft-com:vml" Requires="v">
-                <p:oleObj spid="_x0000_s15639" name="Equation" r:id="rId6" imgW="533400" imgH="215900" progId="Equation.DSMT4">
+                <p:oleObj spid="_x0000_s15644" name="Equation" r:id="rId6" imgW="533400" imgH="215900" progId="Equation.DSMT4">
                   <p:embed/>
                 </p:oleObj>
               </mc:Choice>
@@ -15356,7 +15356,7 @@
           <a:graphicData uri="http://schemas.openxmlformats.org/presentationml/2006/ole">
             <mc:AlternateContent xmlns:mc="http://schemas.openxmlformats.org/markup-compatibility/2006">
               <mc:Choice xmlns:v="urn:schemas-microsoft-com:vml" Requires="v">
-                <p:oleObj spid="_x0000_s15640" name="Equation" r:id="rId8" imgW="584200" imgH="152400" progId="Equation.DSMT4">
+                <p:oleObj spid="_x0000_s15645" name="Equation" r:id="rId8" imgW="584200" imgH="152400" progId="Equation.DSMT4">
                   <p:embed/>
                 </p:oleObj>
               </mc:Choice>
@@ -15413,7 +15413,7 @@
           <a:graphicData uri="http://schemas.openxmlformats.org/presentationml/2006/ole">
             <mc:AlternateContent xmlns:mc="http://schemas.openxmlformats.org/markup-compatibility/2006">
               <mc:Choice xmlns:v="urn:schemas-microsoft-com:vml" Requires="v">
-                <p:oleObj spid="_x0000_s15641" name="Equation" r:id="rId10" imgW="584200" imgH="152400" progId="Equation.DSMT4">
+                <p:oleObj spid="_x0000_s15646" name="Equation" r:id="rId10" imgW="584200" imgH="152400" progId="Equation.DSMT4">
                   <p:embed/>
                 </p:oleObj>
               </mc:Choice>
@@ -17871,7 +17871,7 @@
           <p:cNvPr id="5" name="Title 4">
             <a:extLst>
               <a:ext uri="{FF2B5EF4-FFF2-40B4-BE49-F238E27FC236}">
-                <a16:creationId xmlns:a16="http://schemas.microsoft.com/office/drawing/2014/main" xmlns="" id="{9340556A-634D-E44F-A4D7-C88613D88CAF}"/>
+                <a16:creationId xmlns="" xmlns:a16="http://schemas.microsoft.com/office/drawing/2014/main" id="{9340556A-634D-E44F-A4D7-C88613D88CAF}"/>
               </a:ext>
             </a:extLst>
           </p:cNvPr>
@@ -17902,7 +17902,7 @@
           <p:cNvPr id="6" name="Subtitle 5">
             <a:extLst>
               <a:ext uri="{FF2B5EF4-FFF2-40B4-BE49-F238E27FC236}">
-                <a16:creationId xmlns:a16="http://schemas.microsoft.com/office/drawing/2014/main" xmlns="" id="{73D2F005-1BF1-CC48-8D30-5C7CF131F208}"/>
+                <a16:creationId xmlns="" xmlns:a16="http://schemas.microsoft.com/office/drawing/2014/main" id="{73D2F005-1BF1-CC48-8D30-5C7CF131F208}"/>
               </a:ext>
             </a:extLst>
           </p:cNvPr>
@@ -17970,7 +17970,7 @@
           <p:cNvPr id="4" name="Slide Number Placeholder 3">
             <a:extLst>
               <a:ext uri="{FF2B5EF4-FFF2-40B4-BE49-F238E27FC236}">
-                <a16:creationId xmlns:a16="http://schemas.microsoft.com/office/drawing/2014/main" xmlns="" id="{EE5467BF-2EC5-E64D-977E-94261661C9DC}"/>
+                <a16:creationId xmlns="" xmlns:a16="http://schemas.microsoft.com/office/drawing/2014/main" id="{EE5467BF-2EC5-E64D-977E-94261661C9DC}"/>
               </a:ext>
             </a:extLst>
           </p:cNvPr>
@@ -18390,7 +18390,7 @@
           <a:graphicData uri="http://schemas.openxmlformats.org/presentationml/2006/ole">
             <mc:AlternateContent xmlns:mc="http://schemas.openxmlformats.org/markup-compatibility/2006">
               <mc:Choice xmlns:v="urn:schemas-microsoft-com:vml" Requires="v">
-                <p:oleObj spid="_x0000_s7244" name="Equation" r:id="rId4" imgW="863600" imgH="419100" progId="Equation.DSMT4">
+                <p:oleObj spid="_x0000_s7246" name="Equation" r:id="rId4" imgW="863600" imgH="419100" progId="Equation.DSMT4">
                   <p:embed/>
                 </p:oleObj>
               </mc:Choice>
@@ -18531,19 +18531,7 @@
               <a:rPr lang="en-US" altLang="en-US" sz="1800" dirty="0" smtClean="0">
                 <a:ea typeface="ＭＳ Ｐゴシック" charset="-128"/>
               </a:rPr>
-              <a:t>eight</a:t>
-            </a:r>
-            <a:r>
-              <a:rPr lang="en-US" altLang="en-US" sz="1800" dirty="0" smtClean="0">
-                <a:ea typeface="ＭＳ Ｐゴシック" charset="-128"/>
-              </a:rPr>
-              <a:t> </a:t>
-            </a:r>
-            <a:r>
-              <a:rPr lang="en-US" altLang="en-US" sz="1800" dirty="0" smtClean="0">
-                <a:ea typeface="ＭＳ Ｐゴシック" charset="-128"/>
-              </a:rPr>
-              <a:t>mice </a:t>
+              <a:t>eight mice </a:t>
             </a:r>
             <a:r>
               <a:rPr lang="en-US" altLang="en-US" sz="1800" dirty="0">
@@ -18902,7 +18890,7 @@
           <a:graphicData uri="http://schemas.openxmlformats.org/presentationml/2006/ole">
             <mc:AlternateContent xmlns:mc="http://schemas.openxmlformats.org/markup-compatibility/2006">
               <mc:Choice xmlns:v="urn:schemas-microsoft-com:vml" Requires="v">
-                <p:oleObj spid="_x0000_s1185" name="Equation" r:id="rId4" imgW="1765300" imgH="444500" progId="Equation.3">
+                <p:oleObj spid="_x0000_s1188" name="Equation" r:id="rId4" imgW="1765300" imgH="444500" progId="Equation.3">
                   <p:embed/>
                 </p:oleObj>
               </mc:Choice>
@@ -18997,7 +18985,7 @@
           <a:graphicData uri="http://schemas.openxmlformats.org/presentationml/2006/ole">
             <mc:AlternateContent xmlns:mc="http://schemas.openxmlformats.org/markup-compatibility/2006">
               <mc:Choice xmlns:v="urn:schemas-microsoft-com:vml" Requires="v">
-                <p:oleObj spid="_x0000_s1186" name="Equation" r:id="rId6" imgW="762000" imgH="368300" progId="Equation.3">
+                <p:oleObj spid="_x0000_s1189" name="Equation" r:id="rId6" imgW="762000" imgH="368300" progId="Equation.3">
                   <p:embed/>
                 </p:oleObj>
               </mc:Choice>
@@ -20336,7 +20324,7 @@
           <a:graphicData uri="http://schemas.openxmlformats.org/presentationml/2006/ole">
             <mc:AlternateContent xmlns:mc="http://schemas.openxmlformats.org/markup-compatibility/2006">
               <mc:Choice xmlns:v="urn:schemas-microsoft-com:vml" Requires="v">
-                <p:oleObj spid="_x0000_s2273" name="Equation" r:id="rId4" imgW="876300" imgH="393700" progId="Equation.DSMT4">
+                <p:oleObj spid="_x0000_s2277" name="Equation" r:id="rId4" imgW="876300" imgH="393700" progId="Equation.DSMT4">
                   <p:embed/>
                 </p:oleObj>
               </mc:Choice>
@@ -20393,7 +20381,7 @@
           <a:graphicData uri="http://schemas.openxmlformats.org/presentationml/2006/ole">
             <mc:AlternateContent xmlns:mc="http://schemas.openxmlformats.org/markup-compatibility/2006">
               <mc:Choice xmlns:v="urn:schemas-microsoft-com:vml" Requires="v">
-                <p:oleObj spid="_x0000_s2274" name="Equation" r:id="rId6" imgW="1066800" imgH="152400" progId="Equation.DSMT4">
+                <p:oleObj spid="_x0000_s2278" name="Equation" r:id="rId6" imgW="1066800" imgH="152400" progId="Equation.DSMT4">
                   <p:embed/>
                 </p:oleObj>
               </mc:Choice>
@@ -20450,7 +20438,7 @@
           <a:graphicData uri="http://schemas.openxmlformats.org/presentationml/2006/ole">
             <mc:AlternateContent xmlns:mc="http://schemas.openxmlformats.org/markup-compatibility/2006">
               <mc:Choice xmlns:v="urn:schemas-microsoft-com:vml" Requires="v">
-                <p:oleObj spid="_x0000_s2275" name="Equation" r:id="rId8" imgW="495300" imgH="152400" progId="Equation.DSMT4">
+                <p:oleObj spid="_x0000_s2279" name="Equation" r:id="rId8" imgW="495300" imgH="152400" progId="Equation.DSMT4">
                   <p:embed/>
                 </p:oleObj>
               </mc:Choice>
@@ -20522,7 +20510,7 @@
           <p:cNvPr id="2" name="Title 1">
             <a:extLst>
               <a:ext uri="{FF2B5EF4-FFF2-40B4-BE49-F238E27FC236}">
-                <a16:creationId xmlns:a16="http://schemas.microsoft.com/office/drawing/2014/main" xmlns="" id="{9396CC8D-EFAA-5344-9DDC-773342D375CF}"/>
+                <a16:creationId xmlns="" xmlns:a16="http://schemas.microsoft.com/office/drawing/2014/main" id="{9396CC8D-EFAA-5344-9DDC-773342D375CF}"/>
               </a:ext>
             </a:extLst>
           </p:cNvPr>
@@ -20582,7 +20570,7 @@
           <p:cNvPr id="3" name="Content Placeholder 2">
             <a:extLst>
               <a:ext uri="{FF2B5EF4-FFF2-40B4-BE49-F238E27FC236}">
-                <a16:creationId xmlns:a16="http://schemas.microsoft.com/office/drawing/2014/main" xmlns="" id="{F5CD01D1-B984-D94D-B20D-B07A3383514E}"/>
+                <a16:creationId xmlns="" xmlns:a16="http://schemas.microsoft.com/office/drawing/2014/main" id="{F5CD01D1-B984-D94D-B20D-B07A3383514E}"/>
               </a:ext>
             </a:extLst>
           </p:cNvPr>
@@ -20661,7 +20649,7 @@
           <p:cNvPr id="4" name="Slide Number Placeholder 3">
             <a:extLst>
               <a:ext uri="{FF2B5EF4-FFF2-40B4-BE49-F238E27FC236}">
-                <a16:creationId xmlns:a16="http://schemas.microsoft.com/office/drawing/2014/main" xmlns="" id="{225DABFC-F400-D045-AE45-626BB2F3C77B}"/>
+                <a16:creationId xmlns="" xmlns:a16="http://schemas.microsoft.com/office/drawing/2014/main" id="{225DABFC-F400-D045-AE45-626BB2F3C77B}"/>
               </a:ext>
             </a:extLst>
           </p:cNvPr>
@@ -20696,7 +20684,7 @@
           <p:cNvPr id="5" name="Content Placeholder 2">
             <a:extLst>
               <a:ext uri="{FF2B5EF4-FFF2-40B4-BE49-F238E27FC236}">
-                <a16:creationId xmlns:a16="http://schemas.microsoft.com/office/drawing/2014/main" xmlns="" id="{397773BC-7B92-B94F-8F01-F3C67742EC43}"/>
+                <a16:creationId xmlns="" xmlns:a16="http://schemas.microsoft.com/office/drawing/2014/main" id="{397773BC-7B92-B94F-8F01-F3C67742EC43}"/>
               </a:ext>
             </a:extLst>
           </p:cNvPr>
@@ -20992,7 +20980,7 @@
           <p:cNvPr id="5" name="Title 4">
             <a:extLst>
               <a:ext uri="{FF2B5EF4-FFF2-40B4-BE49-F238E27FC236}">
-                <a16:creationId xmlns:a16="http://schemas.microsoft.com/office/drawing/2014/main" xmlns="" id="{C4922257-3556-3248-BFF5-7F9DD05B78C4}"/>
+                <a16:creationId xmlns="" xmlns:a16="http://schemas.microsoft.com/office/drawing/2014/main" id="{C4922257-3556-3248-BFF5-7F9DD05B78C4}"/>
               </a:ext>
             </a:extLst>
           </p:cNvPr>
@@ -21035,7 +21023,7 @@
           <p:cNvPr id="6" name="Subtitle 5">
             <a:extLst>
               <a:ext uri="{FF2B5EF4-FFF2-40B4-BE49-F238E27FC236}">
-                <a16:creationId xmlns:a16="http://schemas.microsoft.com/office/drawing/2014/main" xmlns="" id="{16A03DC1-4AA0-7440-8947-EB9ECA51F9AA}"/>
+                <a16:creationId xmlns="" xmlns:a16="http://schemas.microsoft.com/office/drawing/2014/main" id="{16A03DC1-4AA0-7440-8947-EB9ECA51F9AA}"/>
               </a:ext>
             </a:extLst>
           </p:cNvPr>
@@ -21060,7 +21048,7 @@
           <p:cNvPr id="4" name="Slide Number Placeholder 3">
             <a:extLst>
               <a:ext uri="{FF2B5EF4-FFF2-40B4-BE49-F238E27FC236}">
-                <a16:creationId xmlns:a16="http://schemas.microsoft.com/office/drawing/2014/main" xmlns="" id="{1262384D-A41C-444B-825E-5582E547F328}"/>
+                <a16:creationId xmlns="" xmlns:a16="http://schemas.microsoft.com/office/drawing/2014/main" id="{1262384D-A41C-444B-825E-5582E547F328}"/>
               </a:ext>
             </a:extLst>
           </p:cNvPr>
@@ -22808,7 +22796,7 @@
           <a:graphicData uri="http://schemas.openxmlformats.org/presentationml/2006/ole">
             <mc:AlternateContent xmlns:mc="http://schemas.openxmlformats.org/markup-compatibility/2006">
               <mc:Choice xmlns:v="urn:schemas-microsoft-com:vml" Requires="v">
-                <p:oleObj spid="_x0000_s8411" name="Equation" r:id="rId4" imgW="1257300" imgH="419100" progId="Equation.DSMT4">
+                <p:oleObj spid="_x0000_s8415" name="Equation" r:id="rId4" imgW="1257300" imgH="419100" progId="Equation.DSMT4">
                   <p:embed/>
                 </p:oleObj>
               </mc:Choice>
@@ -22865,7 +22853,7 @@
           <a:graphicData uri="http://schemas.openxmlformats.org/presentationml/2006/ole">
             <mc:AlternateContent xmlns:mc="http://schemas.openxmlformats.org/markup-compatibility/2006">
               <mc:Choice xmlns:v="urn:schemas-microsoft-com:vml" Requires="v">
-                <p:oleObj spid="_x0000_s8412" name="Equation" r:id="rId6" imgW="596900" imgH="419100" progId="Equation.DSMT4">
+                <p:oleObj spid="_x0000_s8416" name="Equation" r:id="rId6" imgW="596900" imgH="419100" progId="Equation.DSMT4">
                   <p:embed/>
                 </p:oleObj>
               </mc:Choice>
@@ -22922,7 +22910,7 @@
           <a:graphicData uri="http://schemas.openxmlformats.org/presentationml/2006/ole">
             <mc:AlternateContent xmlns:mc="http://schemas.openxmlformats.org/markup-compatibility/2006">
               <mc:Choice xmlns:v="urn:schemas-microsoft-com:vml" Requires="v">
-                <p:oleObj spid="_x0000_s8413" name="Equation" r:id="rId8" imgW="165100" imgH="228600" progId="Equation.DSMT4">
+                <p:oleObj spid="_x0000_s8417" name="Equation" r:id="rId8" imgW="165100" imgH="228600" progId="Equation.DSMT4">
                   <p:embed/>
                 </p:oleObj>
               </mc:Choice>
@@ -23631,7 +23619,7 @@
           <a:graphicData uri="http://schemas.openxmlformats.org/presentationml/2006/ole">
             <mc:AlternateContent xmlns:mc="http://schemas.openxmlformats.org/markup-compatibility/2006">
               <mc:Choice xmlns:v="urn:schemas-microsoft-com:vml" Requires="v">
-                <p:oleObj spid="_x0000_s3234" name="Equation" r:id="rId4" imgW="736600" imgH="355600" progId="Equation.DSMT4">
+                <p:oleObj spid="_x0000_s3237" name="Equation" r:id="rId4" imgW="736600" imgH="355600" progId="Equation.DSMT4">
                   <p:embed/>
                 </p:oleObj>
               </mc:Choice>
@@ -23688,7 +23676,7 @@
           <a:graphicData uri="http://schemas.openxmlformats.org/presentationml/2006/ole">
             <mc:AlternateContent xmlns:mc="http://schemas.openxmlformats.org/markup-compatibility/2006">
               <mc:Choice xmlns:v="urn:schemas-microsoft-com:vml" Requires="v">
-                <p:oleObj spid="_x0000_s3235" name="Equation" r:id="rId6" imgW="698500" imgH="177800" progId="Equation.DSMT4">
+                <p:oleObj spid="_x0000_s3238" name="Equation" r:id="rId6" imgW="698500" imgH="177800" progId="Equation.DSMT4">
                   <p:embed/>
                 </p:oleObj>
               </mc:Choice>
@@ -25792,7 +25780,7 @@
           <a:graphicData uri="http://schemas.openxmlformats.org/presentationml/2006/ole">
             <mc:AlternateContent xmlns:mc="http://schemas.openxmlformats.org/markup-compatibility/2006">
               <mc:Choice xmlns:v="urn:schemas-microsoft-com:vml" Requires="v">
-                <p:oleObj spid="_x0000_s9365" name="Equation" r:id="rId4" imgW="1600200" imgH="419100" progId="Equation.DSMT4">
+                <p:oleObj spid="_x0000_s9368" name="Equation" r:id="rId4" imgW="1600200" imgH="419100" progId="Equation.DSMT4">
                   <p:embed/>
                 </p:oleObj>
               </mc:Choice>
@@ -25849,7 +25837,7 @@
           <a:graphicData uri="http://schemas.openxmlformats.org/presentationml/2006/ole">
             <mc:AlternateContent xmlns:mc="http://schemas.openxmlformats.org/markup-compatibility/2006">
               <mc:Choice xmlns:v="urn:schemas-microsoft-com:vml" Requires="v">
-                <p:oleObj spid="_x0000_s9366" name="Equation" r:id="rId6" imgW="3022600" imgH="419100" progId="Equation.DSMT4">
+                <p:oleObj spid="_x0000_s9369" name="Equation" r:id="rId6" imgW="3022600" imgH="419100" progId="Equation.DSMT4">
                   <p:embed/>
                 </p:oleObj>
               </mc:Choice>
@@ -25988,7 +25976,7 @@
           <p:cNvPr id="2" name="Title 1">
             <a:extLst>
               <a:ext uri="{FF2B5EF4-FFF2-40B4-BE49-F238E27FC236}">
-                <a16:creationId xmlns:a16="http://schemas.microsoft.com/office/drawing/2014/main" xmlns="" id="{55035BCF-87C6-6646-A421-D60C0B692C3E}"/>
+                <a16:creationId xmlns="" xmlns:a16="http://schemas.microsoft.com/office/drawing/2014/main" id="{55035BCF-87C6-6646-A421-D60C0B692C3E}"/>
               </a:ext>
             </a:extLst>
           </p:cNvPr>
@@ -26049,7 +26037,7 @@
           <p:cNvPr id="3" name="Content Placeholder 2">
             <a:extLst>
               <a:ext uri="{FF2B5EF4-FFF2-40B4-BE49-F238E27FC236}">
-                <a16:creationId xmlns:a16="http://schemas.microsoft.com/office/drawing/2014/main" xmlns="" id="{815EFA95-D049-1142-B0EB-530A7E81DCDC}"/>
+                <a16:creationId xmlns="" xmlns:a16="http://schemas.microsoft.com/office/drawing/2014/main" id="{815EFA95-D049-1142-B0EB-530A7E81DCDC}"/>
               </a:ext>
             </a:extLst>
           </p:cNvPr>
@@ -26148,7 +26136,7 @@
           <p:cNvPr id="4" name="Slide Number Placeholder 3">
             <a:extLst>
               <a:ext uri="{FF2B5EF4-FFF2-40B4-BE49-F238E27FC236}">
-                <a16:creationId xmlns:a16="http://schemas.microsoft.com/office/drawing/2014/main" xmlns="" id="{C4FB3C3C-C155-FC44-9110-77A79815BB2D}"/>
+                <a16:creationId xmlns="" xmlns:a16="http://schemas.microsoft.com/office/drawing/2014/main" id="{C4FB3C3C-C155-FC44-9110-77A79815BB2D}"/>
               </a:ext>
             </a:extLst>
           </p:cNvPr>
@@ -26220,7 +26208,7 @@
           <p:cNvPr id="5" name="Title 4">
             <a:extLst>
               <a:ext uri="{FF2B5EF4-FFF2-40B4-BE49-F238E27FC236}">
-                <a16:creationId xmlns:a16="http://schemas.microsoft.com/office/drawing/2014/main" xmlns="" id="{B1A3E749-817C-D74B-98B7-F655DE4087AF}"/>
+                <a16:creationId xmlns="" xmlns:a16="http://schemas.microsoft.com/office/drawing/2014/main" id="{B1A3E749-817C-D74B-98B7-F655DE4087AF}"/>
               </a:ext>
             </a:extLst>
           </p:cNvPr>
@@ -26251,7 +26239,7 @@
           <p:cNvPr id="6" name="Subtitle 5">
             <a:extLst>
               <a:ext uri="{FF2B5EF4-FFF2-40B4-BE49-F238E27FC236}">
-                <a16:creationId xmlns:a16="http://schemas.microsoft.com/office/drawing/2014/main" xmlns="" id="{EB41B3D4-38AA-AF45-803E-F8773C004F38}"/>
+                <a16:creationId xmlns="" xmlns:a16="http://schemas.microsoft.com/office/drawing/2014/main" id="{EB41B3D4-38AA-AF45-803E-F8773C004F38}"/>
               </a:ext>
             </a:extLst>
           </p:cNvPr>
@@ -26276,7 +26264,7 @@
           <p:cNvPr id="4" name="Slide Number Placeholder 3">
             <a:extLst>
               <a:ext uri="{FF2B5EF4-FFF2-40B4-BE49-F238E27FC236}">
-                <a16:creationId xmlns:a16="http://schemas.microsoft.com/office/drawing/2014/main" xmlns="" id="{C429173F-3D6B-FF42-9C5F-FA3244DB4420}"/>
+                <a16:creationId xmlns="" xmlns:a16="http://schemas.microsoft.com/office/drawing/2014/main" id="{C429173F-3D6B-FF42-9C5F-FA3244DB4420}"/>
               </a:ext>
             </a:extLst>
           </p:cNvPr>
@@ -26644,7 +26632,7 @@
           <a:graphicData uri="http://schemas.openxmlformats.org/presentationml/2006/ole">
             <mc:AlternateContent xmlns:mc="http://schemas.openxmlformats.org/markup-compatibility/2006">
               <mc:Choice xmlns:v="urn:schemas-microsoft-com:vml" Requires="v">
-                <p:oleObj spid="_x0000_s16524" name="Equation" r:id="rId4" imgW="127000" imgH="228600" progId="Equation.DSMT4">
+                <p:oleObj spid="_x0000_s16527" name="Equation" r:id="rId4" imgW="127000" imgH="228600" progId="Equation.DSMT4">
                   <p:embed/>
                 </p:oleObj>
               </mc:Choice>
@@ -26701,7 +26689,7 @@
           <a:graphicData uri="http://schemas.openxmlformats.org/presentationml/2006/ole">
             <mc:AlternateContent xmlns:mc="http://schemas.openxmlformats.org/markup-compatibility/2006">
               <mc:Choice xmlns:v="urn:schemas-microsoft-com:vml" Requires="v">
-                <p:oleObj spid="_x0000_s16525" name="Equation" r:id="rId6" imgW="723900" imgH="393700" progId="Equation.DSMT4">
+                <p:oleObj spid="_x0000_s16528" name="Equation" r:id="rId6" imgW="723900" imgH="393700" progId="Equation.DSMT4">
                   <p:embed/>
                 </p:oleObj>
               </mc:Choice>
@@ -27253,7 +27241,7 @@
           <a:graphicData uri="http://schemas.openxmlformats.org/presentationml/2006/ole">
             <mc:AlternateContent xmlns:mc="http://schemas.openxmlformats.org/markup-compatibility/2006">
               <mc:Choice xmlns:v="urn:schemas-microsoft-com:vml" Requires="v">
-                <p:oleObj spid="_x0000_s4181" name="Equation" r:id="rId4" imgW="1943100" imgH="381000" progId="Equation.3">
+                <p:oleObj spid="_x0000_s4183" name="Equation" r:id="rId4" imgW="1943100" imgH="381000" progId="Equation.3">
                   <p:embed/>
                 </p:oleObj>
               </mc:Choice>
@@ -27830,7 +27818,7 @@
           <p:cNvPr id="2" name="Title 1">
             <a:extLst>
               <a:ext uri="{FF2B5EF4-FFF2-40B4-BE49-F238E27FC236}">
-                <a16:creationId xmlns:a16="http://schemas.microsoft.com/office/drawing/2014/main" xmlns="" id="{5EEA26ED-3EB5-FB41-95FB-DF7165C197CD}"/>
+                <a16:creationId xmlns="" xmlns:a16="http://schemas.microsoft.com/office/drawing/2014/main" id="{5EEA26ED-3EB5-FB41-95FB-DF7165C197CD}"/>
               </a:ext>
             </a:extLst>
           </p:cNvPr>
@@ -27885,7 +27873,7 @@
           <p:cNvPr id="3" name="Content Placeholder 2">
             <a:extLst>
               <a:ext uri="{FF2B5EF4-FFF2-40B4-BE49-F238E27FC236}">
-                <a16:creationId xmlns:a16="http://schemas.microsoft.com/office/drawing/2014/main" xmlns="" id="{38AAD0C9-F5CF-7A46-938F-9A5525347728}"/>
+                <a16:creationId xmlns="" xmlns:a16="http://schemas.microsoft.com/office/drawing/2014/main" id="{38AAD0C9-F5CF-7A46-938F-9A5525347728}"/>
               </a:ext>
             </a:extLst>
           </p:cNvPr>
@@ -27981,7 +27969,7 @@
           <p:cNvPr id="4" name="Slide Number Placeholder 3">
             <a:extLst>
               <a:ext uri="{FF2B5EF4-FFF2-40B4-BE49-F238E27FC236}">
-                <a16:creationId xmlns:a16="http://schemas.microsoft.com/office/drawing/2014/main" xmlns="" id="{EC13BD65-3EF0-7D43-B7F3-805AC1CE3546}"/>
+                <a16:creationId xmlns="" xmlns:a16="http://schemas.microsoft.com/office/drawing/2014/main" id="{EC13BD65-3EF0-7D43-B7F3-805AC1CE3546}"/>
               </a:ext>
             </a:extLst>
           </p:cNvPr>
@@ -28376,7 +28364,7 @@
           <a:graphicData uri="http://schemas.openxmlformats.org/presentationml/2006/ole">
             <mc:AlternateContent xmlns:mc="http://schemas.openxmlformats.org/markup-compatibility/2006">
               <mc:Choice xmlns:v="urn:schemas-microsoft-com:vml" Requires="v">
-                <p:oleObj spid="_x0000_s13453" name="Equation" r:id="rId4" imgW="1549400" imgH="241300" progId="Equation.DSMT4">
+                <p:oleObj spid="_x0000_s13456" name="Equation" r:id="rId4" imgW="1549400" imgH="241300" progId="Equation.DSMT4">
                   <p:embed/>
                 </p:oleObj>
               </mc:Choice>
@@ -28433,7 +28421,7 @@
           <a:graphicData uri="http://schemas.openxmlformats.org/presentationml/2006/ole">
             <mc:AlternateContent xmlns:mc="http://schemas.openxmlformats.org/markup-compatibility/2006">
               <mc:Choice xmlns:v="urn:schemas-microsoft-com:vml" Requires="v">
-                <p:oleObj spid="_x0000_s13454" name="Equation" r:id="rId6" imgW="165100" imgH="215900" progId="Equation.DSMT4">
+                <p:oleObj spid="_x0000_s13457" name="Equation" r:id="rId6" imgW="165100" imgH="215900" progId="Equation.DSMT4">
                   <p:embed/>
                 </p:oleObj>
               </mc:Choice>

</xml_diff>